<commit_message>
Add explicit line to PNA figure for user-defined metadata ... ... that goes around the inline extern in the net-to-host direction.
</commit_message>
<xml_diff>
--- a/figs/pna-block-diagram.pptx
+++ b/figs/pna-block-diagram.pptx
@@ -115,8 +115,7 @@
 <file path=ppt/revisionInfo.xml><?xml version="1.0" encoding="utf-8"?>
 <p1510:revInfo xmlns:a="http://schemas.openxmlformats.org/drawingml/2006/main" xmlns:r="http://schemas.openxmlformats.org/officeDocument/2006/relationships" xmlns:p1510="http://schemas.microsoft.com/office/powerpoint/2015/10/main">
   <p1510:revLst>
-    <p1510:client id="{AB275EFB-7DC9-4E6C-884D-530FD05132B0}" v="19" dt="2020-11-13T02:40:44.173"/>
-    <p1510:client id="{FA5602D7-A0D3-4013-A653-8499FBA519D5}" v="1" dt="2020-11-13T03:06:00.859"/>
+    <p1510:client id="{4F0530BD-8DBC-4E4A-AD8B-324142F9DCDB}" v="5" dt="2020-11-22T04:19:39.261"/>
   </p1510:revLst>
 </p1510:revInfo>
 </file>
@@ -702,6 +701,214 @@
             <pc:docMk/>
             <pc:sldMk cId="1091789387" sldId="273"/>
             <ac:cxnSpMk id="181" creationId="{90B81CF6-C291-4A3A-8CFF-4322DFD54B64}"/>
+          </ac:cxnSpMkLst>
+        </pc:cxnChg>
+      </pc:sldChg>
+    </pc:docChg>
+  </pc:docChgLst>
+  <pc:docChgLst>
+    <pc:chgData name="Fingerhut, John Andy" userId="6ad675d3-541e-4813-9336-4804cd571dc7" providerId="ADAL" clId="{4F0530BD-8DBC-4E4A-AD8B-324142F9DCDB}"/>
+    <pc:docChg chg="undo modSld">
+      <pc:chgData name="Fingerhut, John Andy" userId="6ad675d3-541e-4813-9336-4804cd571dc7" providerId="ADAL" clId="{4F0530BD-8DBC-4E4A-AD8B-324142F9DCDB}" dt="2020-11-22T04:20:54.462" v="49" actId="1076"/>
+      <pc:docMkLst>
+        <pc:docMk/>
+      </pc:docMkLst>
+      <pc:sldChg chg="addSp delSp modSp">
+        <pc:chgData name="Fingerhut, John Andy" userId="6ad675d3-541e-4813-9336-4804cd571dc7" providerId="ADAL" clId="{4F0530BD-8DBC-4E4A-AD8B-324142F9DCDB}" dt="2020-11-22T04:20:54.462" v="49" actId="1076"/>
+        <pc:sldMkLst>
+          <pc:docMk/>
+          <pc:sldMk cId="1091789387" sldId="273"/>
+        </pc:sldMkLst>
+        <pc:spChg chg="mod">
+          <ac:chgData name="Fingerhut, John Andy" userId="6ad675d3-541e-4813-9336-4804cd571dc7" providerId="ADAL" clId="{4F0530BD-8DBC-4E4A-AD8B-324142F9DCDB}" dt="2020-11-22T04:17:51.475" v="13" actId="1076"/>
+          <ac:spMkLst>
+            <pc:docMk/>
+            <pc:sldMk cId="1091789387" sldId="273"/>
+            <ac:spMk id="110" creationId="{CBF41200-6B39-49A7-85D4-64606C55105F}"/>
+          </ac:spMkLst>
+        </pc:spChg>
+        <pc:spChg chg="mod">
+          <ac:chgData name="Fingerhut, John Andy" userId="6ad675d3-541e-4813-9336-4804cd571dc7" providerId="ADAL" clId="{4F0530BD-8DBC-4E4A-AD8B-324142F9DCDB}" dt="2020-11-22T04:17:51.475" v="13" actId="1076"/>
+          <ac:spMkLst>
+            <pc:docMk/>
+            <pc:sldMk cId="1091789387" sldId="273"/>
+            <ac:spMk id="111" creationId="{8EF40A48-3C9D-4A24-A40E-E4870584BA66}"/>
+          </ac:spMkLst>
+        </pc:spChg>
+        <pc:spChg chg="mod">
+          <ac:chgData name="Fingerhut, John Andy" userId="6ad675d3-541e-4813-9336-4804cd571dc7" providerId="ADAL" clId="{4F0530BD-8DBC-4E4A-AD8B-324142F9DCDB}" dt="2020-11-22T04:17:51.475" v="13" actId="1076"/>
+          <ac:spMkLst>
+            <pc:docMk/>
+            <pc:sldMk cId="1091789387" sldId="273"/>
+            <ac:spMk id="113" creationId="{58FA7448-7B0F-43F4-A246-03BDB307CBC0}"/>
+          </ac:spMkLst>
+        </pc:spChg>
+        <pc:spChg chg="mod">
+          <ac:chgData name="Fingerhut, John Andy" userId="6ad675d3-541e-4813-9336-4804cd571dc7" providerId="ADAL" clId="{4F0530BD-8DBC-4E4A-AD8B-324142F9DCDB}" dt="2020-11-22T04:17:51.475" v="13" actId="1076"/>
+          <ac:spMkLst>
+            <pc:docMk/>
+            <pc:sldMk cId="1091789387" sldId="273"/>
+            <ac:spMk id="114" creationId="{8981AA32-2977-41CF-9174-51C16EB7A3C1}"/>
+          </ac:spMkLst>
+        </pc:spChg>
+        <pc:spChg chg="add del">
+          <ac:chgData name="Fingerhut, John Andy" userId="6ad675d3-541e-4813-9336-4804cd571dc7" providerId="ADAL" clId="{4F0530BD-8DBC-4E4A-AD8B-324142F9DCDB}" dt="2020-11-22T04:19:37.666" v="21"/>
+          <ac:spMkLst>
+            <pc:docMk/>
+            <pc:sldMk cId="1091789387" sldId="273"/>
+            <ac:spMk id="119" creationId="{88E29AD1-43B3-485D-B363-3F6436D907E7}"/>
+          </ac:spMkLst>
+        </pc:spChg>
+        <pc:spChg chg="add mod">
+          <ac:chgData name="Fingerhut, John Andy" userId="6ad675d3-541e-4813-9336-4804cd571dc7" providerId="ADAL" clId="{4F0530BD-8DBC-4E4A-AD8B-324142F9DCDB}" dt="2020-11-22T04:20:54.462" v="49" actId="1076"/>
+          <ac:spMkLst>
+            <pc:docMk/>
+            <pc:sldMk cId="1091789387" sldId="273"/>
+            <ac:spMk id="122" creationId="{AAFB021B-F573-4955-A61C-CA26210E375D}"/>
+          </ac:spMkLst>
+        </pc:spChg>
+        <pc:spChg chg="mod">
+          <ac:chgData name="Fingerhut, John Andy" userId="6ad675d3-541e-4813-9336-4804cd571dc7" providerId="ADAL" clId="{4F0530BD-8DBC-4E4A-AD8B-324142F9DCDB}" dt="2020-11-22T04:17:51.475" v="13" actId="1076"/>
+          <ac:spMkLst>
+            <pc:docMk/>
+            <pc:sldMk cId="1091789387" sldId="273"/>
+            <ac:spMk id="148" creationId="{0E3FF64B-C6A6-4736-9847-96B6371F20AE}"/>
+          </ac:spMkLst>
+        </pc:spChg>
+        <pc:spChg chg="mod">
+          <ac:chgData name="Fingerhut, John Andy" userId="6ad675d3-541e-4813-9336-4804cd571dc7" providerId="ADAL" clId="{4F0530BD-8DBC-4E4A-AD8B-324142F9DCDB}" dt="2020-11-22T04:17:51.475" v="13" actId="1076"/>
+          <ac:spMkLst>
+            <pc:docMk/>
+            <pc:sldMk cId="1091789387" sldId="273"/>
+            <ac:spMk id="200" creationId="{6143778A-3CAF-4C20-AA59-3CC193DB8BCB}"/>
+          </ac:spMkLst>
+        </pc:spChg>
+        <pc:grpChg chg="mod">
+          <ac:chgData name="Fingerhut, John Andy" userId="6ad675d3-541e-4813-9336-4804cd571dc7" providerId="ADAL" clId="{4F0530BD-8DBC-4E4A-AD8B-324142F9DCDB}" dt="2020-11-22T04:17:51.475" v="13" actId="1076"/>
+          <ac:grpSpMkLst>
+            <pc:docMk/>
+            <pc:sldMk cId="1091789387" sldId="273"/>
+            <ac:grpSpMk id="25" creationId="{D3A54630-E9F6-45DD-998F-E5DC0F14A399}"/>
+          </ac:grpSpMkLst>
+        </pc:grpChg>
+        <pc:grpChg chg="mod">
+          <ac:chgData name="Fingerhut, John Andy" userId="6ad675d3-541e-4813-9336-4804cd571dc7" providerId="ADAL" clId="{4F0530BD-8DBC-4E4A-AD8B-324142F9DCDB}" dt="2020-11-22T04:17:51.475" v="13" actId="1076"/>
+          <ac:grpSpMkLst>
+            <pc:docMk/>
+            <pc:sldMk cId="1091789387" sldId="273"/>
+            <ac:grpSpMk id="83" creationId="{1C834900-1FBA-4F79-9BAA-4729CB027B15}"/>
+          </ac:grpSpMkLst>
+        </pc:grpChg>
+        <pc:grpChg chg="mod">
+          <ac:chgData name="Fingerhut, John Andy" userId="6ad675d3-541e-4813-9336-4804cd571dc7" providerId="ADAL" clId="{4F0530BD-8DBC-4E4A-AD8B-324142F9DCDB}" dt="2020-11-22T04:18:39.163" v="17" actId="14100"/>
+          <ac:grpSpMkLst>
+            <pc:docMk/>
+            <pc:sldMk cId="1091789387" sldId="273"/>
+            <ac:grpSpMk id="163" creationId="{8608615B-EB0D-4D19-94C6-BA8F0B161E4B}"/>
+          </ac:grpSpMkLst>
+        </pc:grpChg>
+        <pc:grpChg chg="mod">
+          <ac:chgData name="Fingerhut, John Andy" userId="6ad675d3-541e-4813-9336-4804cd571dc7" providerId="ADAL" clId="{4F0530BD-8DBC-4E4A-AD8B-324142F9DCDB}" dt="2020-11-22T04:17:51.475" v="13" actId="1076"/>
+          <ac:grpSpMkLst>
+            <pc:docMk/>
+            <pc:sldMk cId="1091789387" sldId="273"/>
+            <ac:grpSpMk id="177" creationId="{AAC1F68D-05B8-4B51-8587-059500FE3478}"/>
+          </ac:grpSpMkLst>
+        </pc:grpChg>
+        <pc:cxnChg chg="mod">
+          <ac:chgData name="Fingerhut, John Andy" userId="6ad675d3-541e-4813-9336-4804cd571dc7" providerId="ADAL" clId="{4F0530BD-8DBC-4E4A-AD8B-324142F9DCDB}" dt="2020-11-22T04:18:22.037" v="15" actId="14100"/>
+          <ac:cxnSpMkLst>
+            <pc:docMk/>
+            <pc:sldMk cId="1091789387" sldId="273"/>
+            <ac:cxnSpMk id="80" creationId="{236BE345-2EA6-45DD-85B2-ACD4C19A91F5}"/>
+          </ac:cxnSpMkLst>
+        </pc:cxnChg>
+        <pc:cxnChg chg="add mod">
+          <ac:chgData name="Fingerhut, John Andy" userId="6ad675d3-541e-4813-9336-4804cd571dc7" providerId="ADAL" clId="{4F0530BD-8DBC-4E4A-AD8B-324142F9DCDB}" dt="2020-11-22T04:18:53.447" v="18" actId="692"/>
+          <ac:cxnSpMkLst>
+            <pc:docMk/>
+            <pc:sldMk cId="1091789387" sldId="273"/>
+            <ac:cxnSpMk id="99" creationId="{ADD4493A-5BBC-4D15-B581-A433EADD11C6}"/>
+          </ac:cxnSpMkLst>
+        </pc:cxnChg>
+        <pc:cxnChg chg="mod">
+          <ac:chgData name="Fingerhut, John Andy" userId="6ad675d3-541e-4813-9336-4804cd571dc7" providerId="ADAL" clId="{4F0530BD-8DBC-4E4A-AD8B-324142F9DCDB}" dt="2020-11-22T04:17:51.475" v="13" actId="1076"/>
+          <ac:cxnSpMkLst>
+            <pc:docMk/>
+            <pc:sldMk cId="1091789387" sldId="273"/>
+            <ac:cxnSpMk id="100" creationId="{F4860C18-D645-4EE6-BCDB-79FE3B828918}"/>
+          </ac:cxnSpMkLst>
+        </pc:cxnChg>
+        <pc:cxnChg chg="add mod">
+          <ac:chgData name="Fingerhut, John Andy" userId="6ad675d3-541e-4813-9336-4804cd571dc7" providerId="ADAL" clId="{4F0530BD-8DBC-4E4A-AD8B-324142F9DCDB}" dt="2020-11-22T04:19:12.110" v="19" actId="14100"/>
+          <ac:cxnSpMkLst>
+            <pc:docMk/>
+            <pc:sldMk cId="1091789387" sldId="273"/>
+            <ac:cxnSpMk id="106" creationId="{16B1E8FE-E0AE-4FF6-AC2B-2BC0EAF5B4C8}"/>
+          </ac:cxnSpMkLst>
+        </pc:cxnChg>
+        <pc:cxnChg chg="mod">
+          <ac:chgData name="Fingerhut, John Andy" userId="6ad675d3-541e-4813-9336-4804cd571dc7" providerId="ADAL" clId="{4F0530BD-8DBC-4E4A-AD8B-324142F9DCDB}" dt="2020-11-22T04:17:51.475" v="13" actId="1076"/>
+          <ac:cxnSpMkLst>
+            <pc:docMk/>
+            <pc:sldMk cId="1091789387" sldId="273"/>
+            <ac:cxnSpMk id="112" creationId="{C64DEB71-3093-431E-88AF-4C2BE81668EF}"/>
+          </ac:cxnSpMkLst>
+        </pc:cxnChg>
+        <pc:cxnChg chg="mod">
+          <ac:chgData name="Fingerhut, John Andy" userId="6ad675d3-541e-4813-9336-4804cd571dc7" providerId="ADAL" clId="{4F0530BD-8DBC-4E4A-AD8B-324142F9DCDB}" dt="2020-11-22T04:17:51.475" v="13" actId="1076"/>
+          <ac:cxnSpMkLst>
+            <pc:docMk/>
+            <pc:sldMk cId="1091789387" sldId="273"/>
+            <ac:cxnSpMk id="115" creationId="{368C70F1-7509-412A-8F1A-A518E73EEB07}"/>
+          </ac:cxnSpMkLst>
+        </pc:cxnChg>
+        <pc:cxnChg chg="mod">
+          <ac:chgData name="Fingerhut, John Andy" userId="6ad675d3-541e-4813-9336-4804cd571dc7" providerId="ADAL" clId="{4F0530BD-8DBC-4E4A-AD8B-324142F9DCDB}" dt="2020-11-22T04:17:51.475" v="13" actId="1076"/>
+          <ac:cxnSpMkLst>
+            <pc:docMk/>
+            <pc:sldMk cId="1091789387" sldId="273"/>
+            <ac:cxnSpMk id="116" creationId="{D6EAE7FF-ED18-4376-A74D-07B093B5896D}"/>
+          </ac:cxnSpMkLst>
+        </pc:cxnChg>
+        <pc:cxnChg chg="mod">
+          <ac:chgData name="Fingerhut, John Andy" userId="6ad675d3-541e-4813-9336-4804cd571dc7" providerId="ADAL" clId="{4F0530BD-8DBC-4E4A-AD8B-324142F9DCDB}" dt="2020-11-22T04:17:51.475" v="13" actId="1076"/>
+          <ac:cxnSpMkLst>
+            <pc:docMk/>
+            <pc:sldMk cId="1091789387" sldId="273"/>
+            <ac:cxnSpMk id="117" creationId="{2B8B9C9F-8E4C-4C30-AB47-9A5A956DF566}"/>
+          </ac:cxnSpMkLst>
+        </pc:cxnChg>
+        <pc:cxnChg chg="mod">
+          <ac:chgData name="Fingerhut, John Andy" userId="6ad675d3-541e-4813-9336-4804cd571dc7" providerId="ADAL" clId="{4F0530BD-8DBC-4E4A-AD8B-324142F9DCDB}" dt="2020-11-22T04:17:51.475" v="13" actId="1076"/>
+          <ac:cxnSpMkLst>
+            <pc:docMk/>
+            <pc:sldMk cId="1091789387" sldId="273"/>
+            <ac:cxnSpMk id="118" creationId="{40462665-FCF8-4E8C-943A-0EF224BA3563}"/>
+          </ac:cxnSpMkLst>
+        </pc:cxnChg>
+        <pc:cxnChg chg="mod">
+          <ac:chgData name="Fingerhut, John Andy" userId="6ad675d3-541e-4813-9336-4804cd571dc7" providerId="ADAL" clId="{4F0530BD-8DBC-4E4A-AD8B-324142F9DCDB}" dt="2020-11-22T04:17:51.475" v="13" actId="1076"/>
+          <ac:cxnSpMkLst>
+            <pc:docMk/>
+            <pc:sldMk cId="1091789387" sldId="273"/>
+            <ac:cxnSpMk id="123" creationId="{64C4D15B-D90A-42A1-857E-79AACC8E1ED6}"/>
+          </ac:cxnSpMkLst>
+        </pc:cxnChg>
+        <pc:cxnChg chg="mod">
+          <ac:chgData name="Fingerhut, John Andy" userId="6ad675d3-541e-4813-9336-4804cd571dc7" providerId="ADAL" clId="{4F0530BD-8DBC-4E4A-AD8B-324142F9DCDB}" dt="2020-11-22T04:18:13.381" v="14" actId="14100"/>
+          <ac:cxnSpMkLst>
+            <pc:docMk/>
+            <pc:sldMk cId="1091789387" sldId="273"/>
+            <ac:cxnSpMk id="196" creationId="{C4648FD0-BE39-49B2-A297-6987E7ED42BA}"/>
+          </ac:cxnSpMkLst>
+        </pc:cxnChg>
+        <pc:cxnChg chg="mod">
+          <ac:chgData name="Fingerhut, John Andy" userId="6ad675d3-541e-4813-9336-4804cd571dc7" providerId="ADAL" clId="{4F0530BD-8DBC-4E4A-AD8B-324142F9DCDB}" dt="2020-11-22T04:17:51.475" v="13" actId="1076"/>
+          <ac:cxnSpMkLst>
+            <pc:docMk/>
+            <pc:sldMk cId="1091789387" sldId="273"/>
+            <ac:cxnSpMk id="199" creationId="{9B56D066-03B7-4AA5-AE48-439E5D95D240}"/>
           </ac:cxnSpMkLst>
         </pc:cxnChg>
       </pc:sldChg>
@@ -857,7 +1064,7 @@
           <a:p>
             <a:fld id="{B72825D7-6CAC-4DD9-81D1-F420B7F343C3}" type="datetimeFigureOut">
               <a:rPr lang="en-US" smtClean="0"/>
-              <a:t>11/12/2020</a:t>
+              <a:t>11/21/2020</a:t>
             </a:fld>
             <a:endParaRPr lang="en-US"/>
           </a:p>
@@ -1055,7 +1262,7 @@
           <a:p>
             <a:fld id="{B72825D7-6CAC-4DD9-81D1-F420B7F343C3}" type="datetimeFigureOut">
               <a:rPr lang="en-US" smtClean="0"/>
-              <a:t>11/12/2020</a:t>
+              <a:t>11/21/2020</a:t>
             </a:fld>
             <a:endParaRPr lang="en-US"/>
           </a:p>
@@ -1263,7 +1470,7 @@
           <a:p>
             <a:fld id="{B72825D7-6CAC-4DD9-81D1-F420B7F343C3}" type="datetimeFigureOut">
               <a:rPr lang="en-US" smtClean="0"/>
-              <a:t>11/12/2020</a:t>
+              <a:t>11/21/2020</a:t>
             </a:fld>
             <a:endParaRPr lang="en-US"/>
           </a:p>
@@ -1461,7 +1668,7 @@
           <a:p>
             <a:fld id="{B72825D7-6CAC-4DD9-81D1-F420B7F343C3}" type="datetimeFigureOut">
               <a:rPr lang="en-US" smtClean="0"/>
-              <a:t>11/12/2020</a:t>
+              <a:t>11/21/2020</a:t>
             </a:fld>
             <a:endParaRPr lang="en-US"/>
           </a:p>
@@ -1736,7 +1943,7 @@
           <a:p>
             <a:fld id="{B72825D7-6CAC-4DD9-81D1-F420B7F343C3}" type="datetimeFigureOut">
               <a:rPr lang="en-US" smtClean="0"/>
-              <a:t>11/12/2020</a:t>
+              <a:t>11/21/2020</a:t>
             </a:fld>
             <a:endParaRPr lang="en-US"/>
           </a:p>
@@ -2001,7 +2208,7 @@
           <a:p>
             <a:fld id="{B72825D7-6CAC-4DD9-81D1-F420B7F343C3}" type="datetimeFigureOut">
               <a:rPr lang="en-US" smtClean="0"/>
-              <a:t>11/12/2020</a:t>
+              <a:t>11/21/2020</a:t>
             </a:fld>
             <a:endParaRPr lang="en-US"/>
           </a:p>
@@ -2413,7 +2620,7 @@
           <a:p>
             <a:fld id="{B72825D7-6CAC-4DD9-81D1-F420B7F343C3}" type="datetimeFigureOut">
               <a:rPr lang="en-US" smtClean="0"/>
-              <a:t>11/12/2020</a:t>
+              <a:t>11/21/2020</a:t>
             </a:fld>
             <a:endParaRPr lang="en-US"/>
           </a:p>
@@ -2554,7 +2761,7 @@
           <a:p>
             <a:fld id="{B72825D7-6CAC-4DD9-81D1-F420B7F343C3}" type="datetimeFigureOut">
               <a:rPr lang="en-US" smtClean="0"/>
-              <a:t>11/12/2020</a:t>
+              <a:t>11/21/2020</a:t>
             </a:fld>
             <a:endParaRPr lang="en-US"/>
           </a:p>
@@ -2667,7 +2874,7 @@
           <a:p>
             <a:fld id="{B72825D7-6CAC-4DD9-81D1-F420B7F343C3}" type="datetimeFigureOut">
               <a:rPr lang="en-US" smtClean="0"/>
-              <a:t>11/12/2020</a:t>
+              <a:t>11/21/2020</a:t>
             </a:fld>
             <a:endParaRPr lang="en-US"/>
           </a:p>
@@ -2978,7 +3185,7 @@
           <a:p>
             <a:fld id="{B72825D7-6CAC-4DD9-81D1-F420B7F343C3}" type="datetimeFigureOut">
               <a:rPr lang="en-US" smtClean="0"/>
-              <a:t>11/12/2020</a:t>
+              <a:t>11/21/2020</a:t>
             </a:fld>
             <a:endParaRPr lang="en-US"/>
           </a:p>
@@ -3266,7 +3473,7 @@
           <a:p>
             <a:fld id="{B72825D7-6CAC-4DD9-81D1-F420B7F343C3}" type="datetimeFigureOut">
               <a:rPr lang="en-US" smtClean="0"/>
-              <a:t>11/12/2020</a:t>
+              <a:t>11/21/2020</a:t>
             </a:fld>
             <a:endParaRPr lang="en-US"/>
           </a:p>
@@ -3507,7 +3714,7 @@
           <a:p>
             <a:fld id="{B72825D7-6CAC-4DD9-81D1-F420B7F343C3}" type="datetimeFigureOut">
               <a:rPr lang="en-US" smtClean="0"/>
-              <a:t>11/12/2020</a:t>
+              <a:t>11/21/2020</a:t>
             </a:fld>
             <a:endParaRPr lang="en-US"/>
           </a:p>
@@ -3938,7 +4145,7 @@
         </p:nvSpPr>
         <p:spPr>
           <a:xfrm rot="16200000">
-            <a:off x="8943956" y="3937957"/>
+            <a:off x="8767177" y="3937957"/>
             <a:ext cx="2276178" cy="392105"/>
           </a:xfrm>
           <a:prstGeom prst="rect">
@@ -3994,7 +4201,7 @@
         </p:nvGrpSpPr>
         <p:grpSpPr>
           <a:xfrm rot="16200000">
-            <a:off x="5978999" y="2927995"/>
+            <a:off x="5802220" y="2927995"/>
             <a:ext cx="1676833" cy="1661997"/>
             <a:chOff x="6523829" y="1695985"/>
             <a:chExt cx="1676833" cy="1661997"/>
@@ -5714,12 +5921,12 @@
         </p:nvCxnSpPr>
         <p:spPr>
           <a:xfrm flipH="1">
-            <a:off x="5136366" y="4202678"/>
-            <a:ext cx="2512048" cy="692733"/>
+            <a:off x="5109450" y="4202678"/>
+            <a:ext cx="2362185" cy="713269"/>
           </a:xfrm>
           <a:prstGeom prst="bentConnector3">
             <a:avLst>
-              <a:gd name="adj1" fmla="val -16496"/>
+              <a:gd name="adj1" fmla="val -17543"/>
             </a:avLst>
           </a:prstGeom>
           <a:ln>
@@ -5755,7 +5962,7 @@
         </p:nvGrpSpPr>
         <p:grpSpPr>
           <a:xfrm rot="10800000">
-            <a:off x="7933098" y="2996747"/>
+            <a:off x="7756319" y="2996747"/>
             <a:ext cx="1036865" cy="660688"/>
             <a:chOff x="7162255" y="2438057"/>
             <a:chExt cx="1036865" cy="660688"/>
@@ -6421,7 +6628,7 @@
         </p:nvCxnSpPr>
         <p:spPr>
           <a:xfrm flipV="1">
-            <a:off x="7641726" y="3345998"/>
+            <a:off x="7464947" y="3345998"/>
             <a:ext cx="323076" cy="8859"/>
           </a:xfrm>
           <a:prstGeom prst="bentConnector3">
@@ -6585,7 +6792,7 @@
         <p:spPr>
           <a:xfrm>
             <a:off x="5414189" y="3326298"/>
-            <a:ext cx="572229" cy="12700"/>
+            <a:ext cx="395450" cy="12700"/>
           </a:xfrm>
           <a:prstGeom prst="bentConnector3">
             <a:avLst>
@@ -7096,12 +7303,12 @@
         </p:nvCxnSpPr>
         <p:spPr>
           <a:xfrm rot="10800000">
-            <a:off x="5995528" y="4150013"/>
+            <a:off x="5818749" y="4150013"/>
             <a:ext cx="3153055" cy="793647"/>
           </a:xfrm>
           <a:prstGeom prst="bentConnector3">
             <a:avLst>
-              <a:gd name="adj1" fmla="val 117413"/>
+              <a:gd name="adj1" fmla="val 112217"/>
             </a:avLst>
           </a:prstGeom>
           <a:ln>
@@ -7140,7 +7347,7 @@
         </p:nvCxnSpPr>
         <p:spPr>
           <a:xfrm flipV="1">
-            <a:off x="10278098" y="4129140"/>
+            <a:off x="10101319" y="4129140"/>
             <a:ext cx="311385" cy="4870"/>
           </a:xfrm>
           <a:prstGeom prst="straightConnector1">
@@ -7180,7 +7387,7 @@
         </p:nvSpPr>
         <p:spPr>
           <a:xfrm rot="16200000">
-            <a:off x="9635974" y="3945025"/>
+            <a:off x="9459195" y="3945025"/>
             <a:ext cx="2276179" cy="368228"/>
           </a:xfrm>
           <a:prstGeom prst="rect">
@@ -7238,7 +7445,7 @@
         </p:nvSpPr>
         <p:spPr>
           <a:xfrm>
-            <a:off x="8868924" y="2113631"/>
+            <a:off x="8692145" y="2113631"/>
             <a:ext cx="2089254" cy="224589"/>
           </a:xfrm>
           <a:prstGeom prst="rect">
@@ -7290,7 +7497,7 @@
         </p:nvSpPr>
         <p:spPr>
           <a:xfrm>
-            <a:off x="8868924" y="2348203"/>
+            <a:off x="8692145" y="2348203"/>
             <a:ext cx="2089254" cy="240643"/>
           </a:xfrm>
           <a:prstGeom prst="rect">
@@ -7391,7 +7598,7 @@
         </p:nvSpPr>
         <p:spPr>
           <a:xfrm rot="16200000">
-            <a:off x="8934338" y="4829463"/>
+            <a:off x="8757559" y="4829463"/>
             <a:ext cx="656879" cy="228392"/>
           </a:xfrm>
           <a:prstGeom prst="triangle">
@@ -7445,7 +7652,7 @@
         </p:nvSpPr>
         <p:spPr>
           <a:xfrm rot="16200000">
-            <a:off x="8934338" y="3218231"/>
+            <a:off x="8757559" y="3218231"/>
             <a:ext cx="656879" cy="228392"/>
           </a:xfrm>
           <a:prstGeom prst="triangle">
@@ -7501,7 +7708,7 @@
         </p:nvCxnSpPr>
         <p:spPr>
           <a:xfrm rot="5400000" flipV="1">
-            <a:off x="9169856" y="3726372"/>
+            <a:off x="8993077" y="3726372"/>
             <a:ext cx="715787" cy="301552"/>
           </a:xfrm>
           <a:prstGeom prst="bentConnector3">
@@ -7544,7 +7751,7 @@
         </p:nvCxnSpPr>
         <p:spPr>
           <a:xfrm rot="16200000" flipH="1" flipV="1">
-            <a:off x="9249064" y="4344340"/>
+            <a:off x="9072285" y="4344340"/>
             <a:ext cx="554346" cy="298527"/>
           </a:xfrm>
           <a:prstGeom prst="bentConnector3">
@@ -7587,7 +7794,7 @@
         </p:nvCxnSpPr>
         <p:spPr>
           <a:xfrm rot="10800000">
-            <a:off x="9381355" y="5095376"/>
+            <a:off x="9204576" y="5095376"/>
             <a:ext cx="494377" cy="1"/>
           </a:xfrm>
           <a:prstGeom prst="straightConnector1">
@@ -7628,7 +7835,7 @@
         </p:nvCxnSpPr>
         <p:spPr>
           <a:xfrm rot="10800000" flipH="1">
-            <a:off x="9381355" y="3180321"/>
+            <a:off x="9204576" y="3180321"/>
             <a:ext cx="487249" cy="0"/>
           </a:xfrm>
           <a:prstGeom prst="straightConnector1">
@@ -7671,7 +7878,7 @@
         </p:nvCxnSpPr>
         <p:spPr>
           <a:xfrm>
-            <a:off x="8969964" y="3328996"/>
+            <a:off x="8793185" y="3328996"/>
             <a:ext cx="178618" cy="3431"/>
           </a:xfrm>
           <a:prstGeom prst="straightConnector1">
@@ -7710,7 +7917,7 @@
         </p:nvGrpSpPr>
         <p:grpSpPr>
           <a:xfrm>
-            <a:off x="5782914" y="2733762"/>
+            <a:off x="5606135" y="2733762"/>
             <a:ext cx="2092231" cy="410729"/>
             <a:chOff x="5782914" y="2733762"/>
             <a:chExt cx="2092231" cy="410729"/>
@@ -7853,7 +8060,7 @@
         </p:nvGrpSpPr>
         <p:grpSpPr>
           <a:xfrm flipV="1">
-            <a:off x="5780613" y="4343679"/>
+            <a:off x="5603834" y="4343679"/>
             <a:ext cx="2092231" cy="410729"/>
             <a:chOff x="5782914" y="2733762"/>
             <a:chExt cx="2092231" cy="410729"/>
@@ -7982,6 +8189,135 @@
           </p:style>
         </p:cxnSp>
       </p:grpSp>
+      <p:cxnSp>
+        <p:nvCxnSpPr>
+          <p:cNvPr id="99" name="Connector: Elbow 98">
+            <a:extLst>
+              <a:ext uri="{FF2B5EF4-FFF2-40B4-BE49-F238E27FC236}">
+                <a16:creationId xmlns:a16="http://schemas.microsoft.com/office/drawing/2014/main" id="{ADD4493A-5BBC-4D15-B581-A433EADD11C6}"/>
+              </a:ext>
+            </a:extLst>
+          </p:cNvPr>
+          <p:cNvCxnSpPr>
+            <a:cxnSpLocks/>
+          </p:cNvCxnSpPr>
+          <p:nvPr/>
+        </p:nvCxnSpPr>
+        <p:spPr>
+          <a:xfrm>
+            <a:off x="3685686" y="3429000"/>
+            <a:ext cx="935132" cy="302094"/>
+          </a:xfrm>
+          <a:prstGeom prst="bentConnector3">
+            <a:avLst>
+              <a:gd name="adj1" fmla="val 18424"/>
+            </a:avLst>
+          </a:prstGeom>
+          <a:ln>
+            <a:tailEnd type="none"/>
+          </a:ln>
+        </p:spPr>
+        <p:style>
+          <a:lnRef idx="1">
+            <a:schemeClr val="accent1"/>
+          </a:lnRef>
+          <a:fillRef idx="0">
+            <a:schemeClr val="accent1"/>
+          </a:fillRef>
+          <a:effectRef idx="0">
+            <a:schemeClr val="accent1"/>
+          </a:effectRef>
+          <a:fontRef idx="minor">
+            <a:schemeClr val="tx1"/>
+          </a:fontRef>
+        </p:style>
+      </p:cxnSp>
+      <p:cxnSp>
+        <p:nvCxnSpPr>
+          <p:cNvPr id="106" name="Connector: Elbow 105">
+            <a:extLst>
+              <a:ext uri="{FF2B5EF4-FFF2-40B4-BE49-F238E27FC236}">
+                <a16:creationId xmlns:a16="http://schemas.microsoft.com/office/drawing/2014/main" id="{16B1E8FE-E0AE-4FF6-AC2B-2BC0EAF5B4C8}"/>
+              </a:ext>
+            </a:extLst>
+          </p:cNvPr>
+          <p:cNvCxnSpPr>
+            <a:cxnSpLocks/>
+          </p:cNvCxnSpPr>
+          <p:nvPr/>
+        </p:nvCxnSpPr>
+        <p:spPr>
+          <a:xfrm flipV="1">
+            <a:off x="4444039" y="3429000"/>
+            <a:ext cx="1374708" cy="302094"/>
+          </a:xfrm>
+          <a:prstGeom prst="bentConnector3">
+            <a:avLst>
+              <a:gd name="adj1" fmla="val 79619"/>
+            </a:avLst>
+          </a:prstGeom>
+          <a:ln>
+            <a:tailEnd type="triangle"/>
+          </a:ln>
+        </p:spPr>
+        <p:style>
+          <a:lnRef idx="1">
+            <a:schemeClr val="accent1"/>
+          </a:lnRef>
+          <a:fillRef idx="0">
+            <a:schemeClr val="accent1"/>
+          </a:fillRef>
+          <a:effectRef idx="0">
+            <a:schemeClr val="accent1"/>
+          </a:effectRef>
+          <a:fontRef idx="minor">
+            <a:schemeClr val="tx1"/>
+          </a:fontRef>
+        </p:style>
+      </p:cxnSp>
+      <p:sp>
+        <p:nvSpPr>
+          <p:cNvPr id="122" name="TextBox 121">
+            <a:extLst>
+              <a:ext uri="{FF2B5EF4-FFF2-40B4-BE49-F238E27FC236}">
+                <a16:creationId xmlns:a16="http://schemas.microsoft.com/office/drawing/2014/main" id="{AAFB021B-F573-4955-A61C-CA26210E375D}"/>
+              </a:ext>
+            </a:extLst>
+          </p:cNvPr>
+          <p:cNvSpPr txBox="1"/>
+          <p:nvPr/>
+        </p:nvSpPr>
+        <p:spPr>
+          <a:xfrm>
+            <a:off x="4192463" y="3743997"/>
+            <a:ext cx="898003" cy="415498"/>
+          </a:xfrm>
+          <a:prstGeom prst="rect">
+            <a:avLst/>
+          </a:prstGeom>
+          <a:noFill/>
+        </p:spPr>
+        <p:txBody>
+          <a:bodyPr wrap="none" rtlCol="0">
+            <a:spAutoFit/>
+          </a:bodyPr>
+          <a:lstStyle/>
+          <a:p>
+            <a:pPr algn="ctr"/>
+            <a:r>
+              <a:rPr lang="en-US" sz="1050" dirty="0"/>
+              <a:t>User-defined</a:t>
+            </a:r>
+          </a:p>
+          <a:p>
+            <a:pPr algn="ctr"/>
+            <a:r>
+              <a:rPr lang="en-US" sz="1050" dirty="0"/>
+              <a:t>metadata</a:t>
+            </a:r>
+          </a:p>
+        </p:txBody>
+      </p:sp>
     </p:spTree>
     <p:extLst>
       <p:ext uri="{BB962C8B-B14F-4D97-AF65-F5344CB8AC3E}">
@@ -8291,6 +8627,21 @@
 </file>
 
 <file path=customXml/item1.xml><?xml version="1.0" encoding="utf-8"?>
+<p:properties xmlns:p="http://schemas.microsoft.com/office/2006/metadata/properties" xmlns:xsi="http://www.w3.org/2001/XMLSchema-instance" xmlns:pc="http://schemas.microsoft.com/office/infopath/2007/PartnerControls">
+  <documentManagement/>
+</p:properties>
+</file>
+
+<file path=customXml/item2.xml><?xml version="1.0" encoding="utf-8"?>
+<?mso-contentType ?>
+<FormTemplates xmlns="http://schemas.microsoft.com/sharepoint/v3/contenttype/forms">
+  <Display>DocumentLibraryForm</Display>
+  <Edit>DocumentLibraryForm</Edit>
+  <New>DocumentLibraryForm</New>
+</FormTemplates>
+</file>
+
+<file path=customXml/item3.xml><?xml version="1.0" encoding="utf-8"?>
 <ct:contentTypeSchema xmlns:ct="http://schemas.microsoft.com/office/2006/metadata/contentType" xmlns:ma="http://schemas.microsoft.com/office/2006/metadata/properties/metaAttributes" ct:_="" ma:_="" ma:contentTypeName="Document" ma:contentTypeID="0x01010074D2001F796B5842ACB4675D256F8FDC" ma:contentTypeVersion="12" ma:contentTypeDescription="Create a new document." ma:contentTypeScope="" ma:versionID="c85e048fa781f40110e66b592c02dbca">
   <xsd:schema xmlns:xsd="http://www.w3.org/2001/XMLSchema" xmlns:xs="http://www.w3.org/2001/XMLSchema" xmlns:p="http://schemas.microsoft.com/office/2006/metadata/properties" xmlns:ns3="88a3e169-3f2e-4cb2-84e3-0f816f3920de" xmlns:ns4="6d44ab1e-4f7a-423e-9215-d8d8e61f56e6" targetNamespace="http://schemas.microsoft.com/office/2006/metadata/properties" ma:root="true" ma:fieldsID="6538c91a1e992d8cfb9fb30155d82126" ns3:_="" ns4:_="">
     <xsd:import namespace="88a3e169-3f2e-4cb2-84e3-0f816f3920de"/>
@@ -8507,22 +8858,24 @@
 </ct:contentTypeSchema>
 </file>
 
-<file path=customXml/item2.xml><?xml version="1.0" encoding="utf-8"?>
-<?mso-contentType ?>
-<FormTemplates xmlns="http://schemas.microsoft.com/sharepoint/v3/contenttype/forms">
-  <Display>DocumentLibraryForm</Display>
-  <Edit>DocumentLibraryForm</Edit>
-  <New>DocumentLibraryForm</New>
-</FormTemplates>
+<file path=customXml/itemProps1.xml><?xml version="1.0" encoding="utf-8"?>
+<ds:datastoreItem xmlns:ds="http://schemas.openxmlformats.org/officeDocument/2006/customXml" ds:itemID="{05F4B324-A6F8-4FC0-BBBB-05E2337781BA}">
+  <ds:schemaRefs>
+    <ds:schemaRef ds:uri="http://schemas.microsoft.com/office/2006/metadata/properties"/>
+    <ds:schemaRef ds:uri="http://schemas.microsoft.com/office/infopath/2007/PartnerControls"/>
+  </ds:schemaRefs>
+</ds:datastoreItem>
 </file>
 
-<file path=customXml/item3.xml><?xml version="1.0" encoding="utf-8"?>
-<p:properties xmlns:p="http://schemas.microsoft.com/office/2006/metadata/properties" xmlns:xsi="http://www.w3.org/2001/XMLSchema-instance" xmlns:pc="http://schemas.microsoft.com/office/infopath/2007/PartnerControls">
-  <documentManagement/>
-</p:properties>
+<file path=customXml/itemProps2.xml><?xml version="1.0" encoding="utf-8"?>
+<ds:datastoreItem xmlns:ds="http://schemas.openxmlformats.org/officeDocument/2006/customXml" ds:itemID="{7F29137C-F1C0-4930-80A0-A7C0C38F3D82}">
+  <ds:schemaRefs>
+    <ds:schemaRef ds:uri="http://schemas.microsoft.com/sharepoint/v3/contenttype/forms"/>
+  </ds:schemaRefs>
+</ds:datastoreItem>
 </file>
 
-<file path=customXml/itemProps1.xml><?xml version="1.0" encoding="utf-8"?>
+<file path=customXml/itemProps3.xml><?xml version="1.0" encoding="utf-8"?>
 <ds:datastoreItem xmlns:ds="http://schemas.openxmlformats.org/officeDocument/2006/customXml" ds:itemID="{BE4DBC62-83C7-4C26-A85C-6023E4D35A02}">
   <ds:schemaRefs>
     <ds:schemaRef ds:uri="http://schemas.microsoft.com/office/2006/metadata/contentType"/>
@@ -8539,21 +8892,4 @@
     <ds:schemaRef ds:uri="http://schemas.microsoft.com/internal/obd"/>
   </ds:schemaRefs>
 </ds:datastoreItem>
-</file>
-
-<file path=customXml/itemProps2.xml><?xml version="1.0" encoding="utf-8"?>
-<ds:datastoreItem xmlns:ds="http://schemas.openxmlformats.org/officeDocument/2006/customXml" ds:itemID="{7F29137C-F1C0-4930-80A0-A7C0C38F3D82}">
-  <ds:schemaRefs>
-    <ds:schemaRef ds:uri="http://schemas.microsoft.com/sharepoint/v3/contenttype/forms"/>
-  </ds:schemaRefs>
-</ds:datastoreItem>
-</file>
-
-<file path=customXml/itemProps3.xml><?xml version="1.0" encoding="utf-8"?>
-<ds:datastoreItem xmlns:ds="http://schemas.openxmlformats.org/officeDocument/2006/customXml" ds:itemID="{05F4B324-A6F8-4FC0-BBBB-05E2337781BA}">
-  <ds:schemaRefs>
-    <ds:schemaRef ds:uri="http://schemas.microsoft.com/office/2006/metadata/properties"/>
-    <ds:schemaRef ds:uri="http://schemas.microsoft.com/office/infopath/2007/PartnerControls"/>
-  </ds:schemaRefs>
-</ds:datastoreItem>
 </file>
</xml_diff>

<commit_message>
Changed the one host in the figure to N hosts Also updated the text in the introduction to mention that one or more of these hosts could be one or more CPU cores within the NIC itself.
</commit_message>
<xml_diff>
--- a/figs/pna-block-diagram.pptx
+++ b/figs/pna-block-diagram.pptx
@@ -115,7 +115,7 @@
 <file path=ppt/revisionInfo.xml><?xml version="1.0" encoding="utf-8"?>
 <p1510:revInfo xmlns:a="http://schemas.openxmlformats.org/drawingml/2006/main" xmlns:r="http://schemas.openxmlformats.org/officeDocument/2006/relationships" xmlns:p1510="http://schemas.microsoft.com/office/powerpoint/2015/10/main">
   <p1510:revLst>
-    <p1510:client id="{4F0530BD-8DBC-4E4A-AD8B-324142F9DCDB}" v="5" dt="2020-11-22T04:19:39.261"/>
+    <p1510:client id="{4F0530BD-8DBC-4E4A-AD8B-324142F9DCDB}" v="8" dt="2020-11-22T04:39:36.875"/>
   </p1510:revLst>
 </p1510:revInfo>
 </file>
@@ -708,17 +708,33 @@
   </pc:docChgLst>
   <pc:docChgLst>
     <pc:chgData name="Fingerhut, John Andy" userId="6ad675d3-541e-4813-9336-4804cd571dc7" providerId="ADAL" clId="{4F0530BD-8DBC-4E4A-AD8B-324142F9DCDB}"/>
-    <pc:docChg chg="undo modSld">
-      <pc:chgData name="Fingerhut, John Andy" userId="6ad675d3-541e-4813-9336-4804cd571dc7" providerId="ADAL" clId="{4F0530BD-8DBC-4E4A-AD8B-324142F9DCDB}" dt="2020-11-22T04:20:54.462" v="49" actId="1076"/>
+    <pc:docChg chg="undo custSel modSld">
+      <pc:chgData name="Fingerhut, John Andy" userId="6ad675d3-541e-4813-9336-4804cd571dc7" providerId="ADAL" clId="{4F0530BD-8DBC-4E4A-AD8B-324142F9DCDB}" dt="2020-11-22T04:40:14.518" v="93" actId="14100"/>
       <pc:docMkLst>
         <pc:docMk/>
       </pc:docMkLst>
       <pc:sldChg chg="addSp delSp modSp">
-        <pc:chgData name="Fingerhut, John Andy" userId="6ad675d3-541e-4813-9336-4804cd571dc7" providerId="ADAL" clId="{4F0530BD-8DBC-4E4A-AD8B-324142F9DCDB}" dt="2020-11-22T04:20:54.462" v="49" actId="1076"/>
+        <pc:chgData name="Fingerhut, John Andy" userId="6ad675d3-541e-4813-9336-4804cd571dc7" providerId="ADAL" clId="{4F0530BD-8DBC-4E4A-AD8B-324142F9DCDB}" dt="2020-11-22T04:40:14.518" v="93" actId="14100"/>
         <pc:sldMkLst>
           <pc:docMk/>
           <pc:sldMk cId="1091789387" sldId="273"/>
         </pc:sldMkLst>
+        <pc:spChg chg="add mod">
+          <ac:chgData name="Fingerhut, John Andy" userId="6ad675d3-541e-4813-9336-4804cd571dc7" providerId="ADAL" clId="{4F0530BD-8DBC-4E4A-AD8B-324142F9DCDB}" dt="2020-11-22T04:38:32.021" v="73" actId="20577"/>
+          <ac:spMkLst>
+            <pc:docMk/>
+            <pc:sldMk cId="1091789387" sldId="273"/>
+            <ac:spMk id="101" creationId="{5BEE2C53-F970-432C-9EF0-B16395497DDB}"/>
+          </ac:spMkLst>
+        </pc:spChg>
+        <pc:spChg chg="add mod">
+          <ac:chgData name="Fingerhut, John Andy" userId="6ad675d3-541e-4813-9336-4804cd571dc7" providerId="ADAL" clId="{4F0530BD-8DBC-4E4A-AD8B-324142F9DCDB}" dt="2020-11-22T04:40:14.518" v="93" actId="14100"/>
+          <ac:spMkLst>
+            <pc:docMk/>
+            <pc:sldMk cId="1091789387" sldId="273"/>
+            <ac:spMk id="107" creationId="{A6F5D3B7-9CD0-4224-9762-C76C79E1371B}"/>
+          </ac:spMkLst>
+        </pc:spChg>
         <pc:spChg chg="mod">
           <ac:chgData name="Fingerhut, John Andy" userId="6ad675d3-541e-4813-9336-4804cd571dc7" providerId="ADAL" clId="{4F0530BD-8DBC-4E4A-AD8B-324142F9DCDB}" dt="2020-11-22T04:17:51.475" v="13" actId="1076"/>
           <ac:spMkLst>
@@ -776,7 +792,7 @@
           </ac:spMkLst>
         </pc:spChg>
         <pc:spChg chg="mod">
-          <ac:chgData name="Fingerhut, John Andy" userId="6ad675d3-541e-4813-9336-4804cd571dc7" providerId="ADAL" clId="{4F0530BD-8DBC-4E4A-AD8B-324142F9DCDB}" dt="2020-11-22T04:17:51.475" v="13" actId="1076"/>
+          <ac:chgData name="Fingerhut, John Andy" userId="6ad675d3-541e-4813-9336-4804cd571dc7" providerId="ADAL" clId="{4F0530BD-8DBC-4E4A-AD8B-324142F9DCDB}" dt="2020-11-22T04:38:36.499" v="75" actId="20577"/>
           <ac:spMkLst>
             <pc:docMk/>
             <pc:sldMk cId="1091789387" sldId="273"/>
@@ -840,6 +856,14 @@
           </ac:cxnSpMkLst>
         </pc:cxnChg>
         <pc:cxnChg chg="add mod">
+          <ac:chgData name="Fingerhut, John Andy" userId="6ad675d3-541e-4813-9336-4804cd571dc7" providerId="ADAL" clId="{4F0530BD-8DBC-4E4A-AD8B-324142F9DCDB}" dt="2020-11-22T04:39:04.966" v="80" actId="14100"/>
+          <ac:cxnSpMkLst>
+            <pc:docMk/>
+            <pc:sldMk cId="1091789387" sldId="273"/>
+            <ac:cxnSpMk id="102" creationId="{EB96FCB9-19D5-432B-B874-01E971C45BF4}"/>
+          </ac:cxnSpMkLst>
+        </pc:cxnChg>
+        <pc:cxnChg chg="add mod">
           <ac:chgData name="Fingerhut, John Andy" userId="6ad675d3-541e-4813-9336-4804cd571dc7" providerId="ADAL" clId="{4F0530BD-8DBC-4E4A-AD8B-324142F9DCDB}" dt="2020-11-22T04:19:12.110" v="19" actId="14100"/>
           <ac:cxnSpMkLst>
             <pc:docMk/>
@@ -904,7 +928,7 @@
           </ac:cxnSpMkLst>
         </pc:cxnChg>
         <pc:cxnChg chg="mod">
-          <ac:chgData name="Fingerhut, John Andy" userId="6ad675d3-541e-4813-9336-4804cd571dc7" providerId="ADAL" clId="{4F0530BD-8DBC-4E4A-AD8B-324142F9DCDB}" dt="2020-11-22T04:17:51.475" v="13" actId="1076"/>
+          <ac:chgData name="Fingerhut, John Andy" userId="6ad675d3-541e-4813-9336-4804cd571dc7" providerId="ADAL" clId="{4F0530BD-8DBC-4E4A-AD8B-324142F9DCDB}" dt="2020-11-22T04:39:19.462" v="82" actId="14100"/>
           <ac:cxnSpMkLst>
             <pc:docMk/>
             <pc:sldMk cId="1091789387" sldId="273"/>
@@ -7341,14 +7365,14 @@
           </p:cNvPr>
           <p:cNvCxnSpPr>
             <a:cxnSpLocks/>
-            <a:stCxn id="148" idx="2"/>
+            <a:endCxn id="200" idx="0"/>
           </p:cNvCxnSpPr>
           <p:nvPr/>
         </p:nvCxnSpPr>
         <p:spPr>
-          <a:xfrm flipV="1">
-            <a:off x="10101319" y="4129140"/>
-            <a:ext cx="311385" cy="4870"/>
+          <a:xfrm>
+            <a:off x="10101319" y="3502272"/>
+            <a:ext cx="311852" cy="0"/>
           </a:xfrm>
           <a:prstGeom prst="straightConnector1">
             <a:avLst/>
@@ -7387,8 +7411,8 @@
         </p:nvSpPr>
         <p:spPr>
           <a:xfrm rot="16200000">
-            <a:off x="9459195" y="3945025"/>
-            <a:ext cx="2276179" cy="368228"/>
+            <a:off x="10086062" y="3318158"/>
+            <a:ext cx="1022445" cy="368228"/>
           </a:xfrm>
           <a:prstGeom prst="rect">
             <a:avLst/>
@@ -7426,7 +7450,7 @@
                   <a:schemeClr val="tx1"/>
                 </a:solidFill>
               </a:rPr>
-              <a:t>Host</a:t>
+              <a:t>Host 1</a:t>
             </a:r>
           </a:p>
         </p:txBody>
@@ -8314,6 +8338,143 @@
             <a:r>
               <a:rPr lang="en-US" sz="1050" dirty="0"/>
               <a:t>metadata</a:t>
+            </a:r>
+          </a:p>
+        </p:txBody>
+      </p:sp>
+      <p:sp>
+        <p:nvSpPr>
+          <p:cNvPr id="101" name="Rectangle 100">
+            <a:extLst>
+              <a:ext uri="{FF2B5EF4-FFF2-40B4-BE49-F238E27FC236}">
+                <a16:creationId xmlns:a16="http://schemas.microsoft.com/office/drawing/2014/main" id="{5BEE2C53-F970-432C-9EF0-B16395497DDB}"/>
+              </a:ext>
+            </a:extLst>
+          </p:cNvPr>
+          <p:cNvSpPr/>
+          <p:nvPr/>
+        </p:nvSpPr>
+        <p:spPr>
+          <a:xfrm rot="16200000">
+            <a:off x="10086062" y="4578852"/>
+            <a:ext cx="1022445" cy="368228"/>
+          </a:xfrm>
+          <a:prstGeom prst="rect">
+            <a:avLst/>
+          </a:prstGeom>
+          <a:solidFill>
+            <a:schemeClr val="bg2">
+              <a:lumMod val="90000"/>
+            </a:schemeClr>
+          </a:solidFill>
+        </p:spPr>
+        <p:style>
+          <a:lnRef idx="2">
+            <a:schemeClr val="accent1">
+              <a:shade val="50000"/>
+            </a:schemeClr>
+          </a:lnRef>
+          <a:fillRef idx="1">
+            <a:schemeClr val="accent1"/>
+          </a:fillRef>
+          <a:effectRef idx="0">
+            <a:schemeClr val="accent1"/>
+          </a:effectRef>
+          <a:fontRef idx="minor">
+            <a:schemeClr val="lt1"/>
+          </a:fontRef>
+        </p:style>
+        <p:txBody>
+          <a:bodyPr rtlCol="0" anchor="ctr"/>
+          <a:lstStyle/>
+          <a:p>
+            <a:pPr algn="ctr"/>
+            <a:r>
+              <a:rPr lang="en-US" dirty="0">
+                <a:solidFill>
+                  <a:schemeClr val="tx1"/>
+                </a:solidFill>
+              </a:rPr>
+              <a:t>Host N</a:t>
+            </a:r>
+          </a:p>
+        </p:txBody>
+      </p:sp>
+      <p:cxnSp>
+        <p:nvCxnSpPr>
+          <p:cNvPr id="102" name="Straight Arrow Connector 101">
+            <a:extLst>
+              <a:ext uri="{FF2B5EF4-FFF2-40B4-BE49-F238E27FC236}">
+                <a16:creationId xmlns:a16="http://schemas.microsoft.com/office/drawing/2014/main" id="{EB96FCB9-19D5-432B-B874-01E971C45BF4}"/>
+              </a:ext>
+            </a:extLst>
+          </p:cNvPr>
+          <p:cNvCxnSpPr>
+            <a:cxnSpLocks/>
+            <a:endCxn id="101" idx="0"/>
+          </p:cNvCxnSpPr>
+          <p:nvPr/>
+        </p:nvCxnSpPr>
+        <p:spPr>
+          <a:xfrm>
+            <a:off x="10101319" y="4762966"/>
+            <a:ext cx="311852" cy="0"/>
+          </a:xfrm>
+          <a:prstGeom prst="straightConnector1">
+            <a:avLst/>
+          </a:prstGeom>
+          <a:ln>
+            <a:headEnd type="triangle"/>
+            <a:tailEnd type="triangle"/>
+          </a:ln>
+        </p:spPr>
+        <p:style>
+          <a:lnRef idx="1">
+            <a:schemeClr val="accent1"/>
+          </a:lnRef>
+          <a:fillRef idx="0">
+            <a:schemeClr val="accent1"/>
+          </a:fillRef>
+          <a:effectRef idx="0">
+            <a:schemeClr val="accent1"/>
+          </a:effectRef>
+          <a:fontRef idx="minor">
+            <a:schemeClr val="tx1"/>
+          </a:fontRef>
+        </p:style>
+      </p:cxnSp>
+      <p:sp>
+        <p:nvSpPr>
+          <p:cNvPr id="107" name="TextBox 106">
+            <a:extLst>
+              <a:ext uri="{FF2B5EF4-FFF2-40B4-BE49-F238E27FC236}">
+                <a16:creationId xmlns:a16="http://schemas.microsoft.com/office/drawing/2014/main" id="{A6F5D3B7-9CD0-4224-9762-C76C79E1371B}"/>
+              </a:ext>
+            </a:extLst>
+          </p:cNvPr>
+          <p:cNvSpPr txBox="1"/>
+          <p:nvPr/>
+        </p:nvSpPr>
+        <p:spPr>
+          <a:xfrm rot="16200000">
+            <a:off x="10444675" y="4005660"/>
+            <a:ext cx="238248" cy="253916"/>
+          </a:xfrm>
+          <a:prstGeom prst="rect">
+            <a:avLst/>
+          </a:prstGeom>
+          <a:noFill/>
+        </p:spPr>
+        <p:txBody>
+          <a:bodyPr wrap="square" rtlCol="0">
+            <a:spAutoFit/>
+          </a:bodyPr>
+          <a:lstStyle/>
+          <a:p>
+            <a:pPr algn="ctr"/>
+            <a:r>
+              <a:rPr lang="en-US" sz="1050" dirty="0"/>
+              <a:t>…</a:t>
             </a:r>
           </a:p>
         </p:txBody>
@@ -8627,21 +8788,6 @@
 </file>
 
 <file path=customXml/item1.xml><?xml version="1.0" encoding="utf-8"?>
-<p:properties xmlns:p="http://schemas.microsoft.com/office/2006/metadata/properties" xmlns:xsi="http://www.w3.org/2001/XMLSchema-instance" xmlns:pc="http://schemas.microsoft.com/office/infopath/2007/PartnerControls">
-  <documentManagement/>
-</p:properties>
-</file>
-
-<file path=customXml/item2.xml><?xml version="1.0" encoding="utf-8"?>
-<?mso-contentType ?>
-<FormTemplates xmlns="http://schemas.microsoft.com/sharepoint/v3/contenttype/forms">
-  <Display>DocumentLibraryForm</Display>
-  <Edit>DocumentLibraryForm</Edit>
-  <New>DocumentLibraryForm</New>
-</FormTemplates>
-</file>
-
-<file path=customXml/item3.xml><?xml version="1.0" encoding="utf-8"?>
 <ct:contentTypeSchema xmlns:ct="http://schemas.microsoft.com/office/2006/metadata/contentType" xmlns:ma="http://schemas.microsoft.com/office/2006/metadata/properties/metaAttributes" ct:_="" ma:_="" ma:contentTypeName="Document" ma:contentTypeID="0x01010074D2001F796B5842ACB4675D256F8FDC" ma:contentTypeVersion="12" ma:contentTypeDescription="Create a new document." ma:contentTypeScope="" ma:versionID="c85e048fa781f40110e66b592c02dbca">
   <xsd:schema xmlns:xsd="http://www.w3.org/2001/XMLSchema" xmlns:xs="http://www.w3.org/2001/XMLSchema" xmlns:p="http://schemas.microsoft.com/office/2006/metadata/properties" xmlns:ns3="88a3e169-3f2e-4cb2-84e3-0f816f3920de" xmlns:ns4="6d44ab1e-4f7a-423e-9215-d8d8e61f56e6" targetNamespace="http://schemas.microsoft.com/office/2006/metadata/properties" ma:root="true" ma:fieldsID="6538c91a1e992d8cfb9fb30155d82126" ns3:_="" ns4:_="">
     <xsd:import namespace="88a3e169-3f2e-4cb2-84e3-0f816f3920de"/>
@@ -8858,24 +9004,22 @@
 </ct:contentTypeSchema>
 </file>
 
-<file path=customXml/itemProps1.xml><?xml version="1.0" encoding="utf-8"?>
-<ds:datastoreItem xmlns:ds="http://schemas.openxmlformats.org/officeDocument/2006/customXml" ds:itemID="{05F4B324-A6F8-4FC0-BBBB-05E2337781BA}">
-  <ds:schemaRefs>
-    <ds:schemaRef ds:uri="http://schemas.microsoft.com/office/2006/metadata/properties"/>
-    <ds:schemaRef ds:uri="http://schemas.microsoft.com/office/infopath/2007/PartnerControls"/>
-  </ds:schemaRefs>
-</ds:datastoreItem>
+<file path=customXml/item2.xml><?xml version="1.0" encoding="utf-8"?>
+<?mso-contentType ?>
+<FormTemplates xmlns="http://schemas.microsoft.com/sharepoint/v3/contenttype/forms">
+  <Display>DocumentLibraryForm</Display>
+  <Edit>DocumentLibraryForm</Edit>
+  <New>DocumentLibraryForm</New>
+</FormTemplates>
 </file>
 
-<file path=customXml/itemProps2.xml><?xml version="1.0" encoding="utf-8"?>
-<ds:datastoreItem xmlns:ds="http://schemas.openxmlformats.org/officeDocument/2006/customXml" ds:itemID="{7F29137C-F1C0-4930-80A0-A7C0C38F3D82}">
-  <ds:schemaRefs>
-    <ds:schemaRef ds:uri="http://schemas.microsoft.com/sharepoint/v3/contenttype/forms"/>
-  </ds:schemaRefs>
-</ds:datastoreItem>
+<file path=customXml/item3.xml><?xml version="1.0" encoding="utf-8"?>
+<p:properties xmlns:p="http://schemas.microsoft.com/office/2006/metadata/properties" xmlns:xsi="http://www.w3.org/2001/XMLSchema-instance" xmlns:pc="http://schemas.microsoft.com/office/infopath/2007/PartnerControls">
+  <documentManagement/>
+</p:properties>
 </file>
 
-<file path=customXml/itemProps3.xml><?xml version="1.0" encoding="utf-8"?>
+<file path=customXml/itemProps1.xml><?xml version="1.0" encoding="utf-8"?>
 <ds:datastoreItem xmlns:ds="http://schemas.openxmlformats.org/officeDocument/2006/customXml" ds:itemID="{BE4DBC62-83C7-4C26-A85C-6023E4D35A02}">
   <ds:schemaRefs>
     <ds:schemaRef ds:uri="http://schemas.microsoft.com/office/2006/metadata/contentType"/>
@@ -8892,4 +9036,21 @@
     <ds:schemaRef ds:uri="http://schemas.microsoft.com/internal/obd"/>
   </ds:schemaRefs>
 </ds:datastoreItem>
+</file>
+
+<file path=customXml/itemProps2.xml><?xml version="1.0" encoding="utf-8"?>
+<ds:datastoreItem xmlns:ds="http://schemas.openxmlformats.org/officeDocument/2006/customXml" ds:itemID="{7F29137C-F1C0-4930-80A0-A7C0C38F3D82}">
+  <ds:schemaRefs>
+    <ds:schemaRef ds:uri="http://schemas.microsoft.com/sharepoint/v3/contenttype/forms"/>
+  </ds:schemaRefs>
+</ds:datastoreItem>
+</file>
+
+<file path=customXml/itemProps3.xml><?xml version="1.0" encoding="utf-8"?>
+<ds:datastoreItem xmlns:ds="http://schemas.openxmlformats.org/officeDocument/2006/customXml" ds:itemID="{05F4B324-A6F8-4FC0-BBBB-05E2337781BA}">
+  <ds:schemaRefs>
+    <ds:schemaRef ds:uri="http://schemas.microsoft.com/office/2006/metadata/properties"/>
+    <ds:schemaRef ds:uri="http://schemas.microsoft.com/office/infopath/2007/PartnerControls"/>
+  </ds:schemaRefs>
+</ds:datastoreItem>
 </file>
</xml_diff>

<commit_message>
Pass over rest of Introduction
* Wordsmithing

* Left a few comments to address

* Tweaked architecture Figure to clearly depict Message block as future extension. Hence, we can talk about the 4 (not 5) PNA blocks. Also regenerated PDF and PNG from PPTX.
</commit_message>
<xml_diff>
--- a/figs/pna-block-diagram.pptx
+++ b/figs/pna-block-diagram.pptx
@@ -127,100 +127,44 @@
 <file path=ppt/changesInfos/changesInfo1.xml><?xml version="1.0" encoding="utf-8"?>
 <pc:chgInfo xmlns:a="http://schemas.openxmlformats.org/drawingml/2006/main" xmlns:r="http://schemas.openxmlformats.org/officeDocument/2006/relationships" xmlns:ac="http://schemas.microsoft.com/office/drawing/2013/main/command" xmlns:pc="http://schemas.microsoft.com/office/powerpoint/2013/main/command">
   <pc:docChgLst>
-    <pc:chgData name="Fingerhut, John Andy" userId="6ad675d3-541e-4813-9336-4804cd571dc7" providerId="ADAL" clId="{AB275EFB-7DC9-4E6C-884D-530FD05132B0}"/>
+    <pc:chgData name="Fingerhut, John Andy" userId="6ad675d3-541e-4813-9336-4804cd571dc7" providerId="ADAL" clId="{4F0530BD-8DBC-4E4A-AD8B-324142F9DCDB}"/>
     <pc:docChg chg="undo custSel modSld">
-      <pc:chgData name="Fingerhut, John Andy" userId="6ad675d3-541e-4813-9336-4804cd571dc7" providerId="ADAL" clId="{AB275EFB-7DC9-4E6C-884D-530FD05132B0}" dt="2020-11-13T02:43:14.555" v="143" actId="1076"/>
+      <pc:chgData name="Fingerhut, John Andy" userId="6ad675d3-541e-4813-9336-4804cd571dc7" providerId="ADAL" clId="{4F0530BD-8DBC-4E4A-AD8B-324142F9DCDB}" dt="2020-11-22T04:40:14.518" v="93" actId="14100"/>
       <pc:docMkLst>
         <pc:docMk/>
       </pc:docMkLst>
       <pc:sldChg chg="addSp delSp modSp">
-        <pc:chgData name="Fingerhut, John Andy" userId="6ad675d3-541e-4813-9336-4804cd571dc7" providerId="ADAL" clId="{AB275EFB-7DC9-4E6C-884D-530FD05132B0}" dt="2020-11-13T02:43:14.555" v="143" actId="1076"/>
+        <pc:chgData name="Fingerhut, John Andy" userId="6ad675d3-541e-4813-9336-4804cd571dc7" providerId="ADAL" clId="{4F0530BD-8DBC-4E4A-AD8B-324142F9DCDB}" dt="2020-11-22T04:40:14.518" v="93" actId="14100"/>
         <pc:sldMkLst>
           <pc:docMk/>
           <pc:sldMk cId="1091789387" sldId="273"/>
         </pc:sldMkLst>
-        <pc:spChg chg="del">
-          <ac:chgData name="Fingerhut, John Andy" userId="6ad675d3-541e-4813-9336-4804cd571dc7" providerId="ADAL" clId="{AB275EFB-7DC9-4E6C-884D-530FD05132B0}" dt="2020-11-12T20:44:50.112" v="0" actId="478"/>
+        <pc:spChg chg="add mod">
+          <ac:chgData name="Fingerhut, John Andy" userId="6ad675d3-541e-4813-9336-4804cd571dc7" providerId="ADAL" clId="{4F0530BD-8DBC-4E4A-AD8B-324142F9DCDB}" dt="2020-11-22T04:38:32.021" v="73" actId="20577"/>
           <ac:spMkLst>
             <pc:docMk/>
             <pc:sldMk cId="1091789387" sldId="273"/>
-            <ac:spMk id="2" creationId="{2AEA91F8-E15F-47F9-A642-B540FBB86354}"/>
+            <ac:spMk id="101" creationId="{5BEE2C53-F970-432C-9EF0-B16395497DDB}"/>
           </ac:spMkLst>
         </pc:spChg>
-        <pc:spChg chg="add del mod">
-          <ac:chgData name="Fingerhut, John Andy" userId="6ad675d3-541e-4813-9336-4804cd571dc7" providerId="ADAL" clId="{AB275EFB-7DC9-4E6C-884D-530FD05132B0}" dt="2020-11-12T20:44:52.494" v="1" actId="478"/>
+        <pc:spChg chg="add mod">
+          <ac:chgData name="Fingerhut, John Andy" userId="6ad675d3-541e-4813-9336-4804cd571dc7" providerId="ADAL" clId="{4F0530BD-8DBC-4E4A-AD8B-324142F9DCDB}" dt="2020-11-22T04:40:14.518" v="93" actId="14100"/>
           <ac:spMkLst>
             <pc:docMk/>
             <pc:sldMk cId="1091789387" sldId="273"/>
-            <ac:spMk id="5" creationId="{9D40767B-136D-49AC-BC6B-F8B4B25D3336}"/>
+            <ac:spMk id="107" creationId="{A6F5D3B7-9CD0-4224-9762-C76C79E1371B}"/>
           </ac:spMkLst>
         </pc:spChg>
-        <pc:spChg chg="mod topLvl">
-          <ac:chgData name="Fingerhut, John Andy" userId="6ad675d3-541e-4813-9336-4804cd571dc7" providerId="ADAL" clId="{AB275EFB-7DC9-4E6C-884D-530FD05132B0}" dt="2020-11-13T02:33:45.728" v="78" actId="165"/>
-          <ac:spMkLst>
-            <pc:docMk/>
-            <pc:sldMk cId="1091789387" sldId="273"/>
-            <ac:spMk id="35" creationId="{8EB9B0E0-C169-48B3-BCE6-385310287F99}"/>
-          </ac:spMkLst>
-        </pc:spChg>
-        <pc:spChg chg="mod topLvl">
-          <ac:chgData name="Fingerhut, John Andy" userId="6ad675d3-541e-4813-9336-4804cd571dc7" providerId="ADAL" clId="{AB275EFB-7DC9-4E6C-884D-530FD05132B0}" dt="2020-11-13T02:33:45.728" v="78" actId="165"/>
-          <ac:spMkLst>
-            <pc:docMk/>
-            <pc:sldMk cId="1091789387" sldId="273"/>
-            <ac:spMk id="36" creationId="{3ED9F1BC-576A-4EF3-9876-126695A64636}"/>
-          </ac:spMkLst>
-        </pc:spChg>
-        <pc:spChg chg="mod topLvl">
-          <ac:chgData name="Fingerhut, John Andy" userId="6ad675d3-541e-4813-9336-4804cd571dc7" providerId="ADAL" clId="{AB275EFB-7DC9-4E6C-884D-530FD05132B0}" dt="2020-11-13T02:33:45.728" v="78" actId="165"/>
-          <ac:spMkLst>
-            <pc:docMk/>
-            <pc:sldMk cId="1091789387" sldId="273"/>
-            <ac:spMk id="37" creationId="{FEF6D1E8-CAD9-4D86-8016-9DF9D3A426B1}"/>
-          </ac:spMkLst>
-        </pc:spChg>
-        <pc:spChg chg="mod topLvl">
-          <ac:chgData name="Fingerhut, John Andy" userId="6ad675d3-541e-4813-9336-4804cd571dc7" providerId="ADAL" clId="{AB275EFB-7DC9-4E6C-884D-530FD05132B0}" dt="2020-11-13T02:33:45.728" v="78" actId="165"/>
-          <ac:spMkLst>
-            <pc:docMk/>
-            <pc:sldMk cId="1091789387" sldId="273"/>
-            <ac:spMk id="40" creationId="{A99932A6-6BD7-4FD1-93C8-8E131159E42A}"/>
-          </ac:spMkLst>
-        </pc:spChg>
-        <pc:spChg chg="mod topLvl">
-          <ac:chgData name="Fingerhut, John Andy" userId="6ad675d3-541e-4813-9336-4804cd571dc7" providerId="ADAL" clId="{AB275EFB-7DC9-4E6C-884D-530FD05132B0}" dt="2020-11-13T02:33:45.728" v="78" actId="165"/>
-          <ac:spMkLst>
-            <pc:docMk/>
-            <pc:sldMk cId="1091789387" sldId="273"/>
-            <ac:spMk id="41" creationId="{92344D8E-30F6-4766-B972-809C391435CC}"/>
-          </ac:spMkLst>
-        </pc:spChg>
-        <pc:spChg chg="add del mod">
-          <ac:chgData name="Fingerhut, John Andy" userId="6ad675d3-541e-4813-9336-4804cd571dc7" providerId="ADAL" clId="{AB275EFB-7DC9-4E6C-884D-530FD05132B0}" dt="2020-11-13T02:31:29.523" v="49" actId="478"/>
-          <ac:spMkLst>
-            <pc:docMk/>
-            <pc:sldMk cId="1091789387" sldId="273"/>
-            <ac:spMk id="108" creationId="{F7594EFE-CC19-4890-A71C-A356D27742F2}"/>
-          </ac:spMkLst>
-        </pc:spChg>
-        <pc:spChg chg="add del mod">
-          <ac:chgData name="Fingerhut, John Andy" userId="6ad675d3-541e-4813-9336-4804cd571dc7" providerId="ADAL" clId="{AB275EFB-7DC9-4E6C-884D-530FD05132B0}" dt="2020-11-13T02:31:10.509" v="45" actId="478"/>
-          <ac:spMkLst>
-            <pc:docMk/>
-            <pc:sldMk cId="1091789387" sldId="273"/>
-            <ac:spMk id="109" creationId="{8929AB5C-7DBF-4B17-9E8A-36D99FF27FCB}"/>
-          </ac:spMkLst>
-        </pc:spChg>
-        <pc:spChg chg="add mod topLvl">
-          <ac:chgData name="Fingerhut, John Andy" userId="6ad675d3-541e-4813-9336-4804cd571dc7" providerId="ADAL" clId="{AB275EFB-7DC9-4E6C-884D-530FD05132B0}" dt="2020-11-13T02:36:24.018" v="114" actId="1076"/>
+        <pc:spChg chg="mod">
+          <ac:chgData name="Fingerhut, John Andy" userId="6ad675d3-541e-4813-9336-4804cd571dc7" providerId="ADAL" clId="{4F0530BD-8DBC-4E4A-AD8B-324142F9DCDB}" dt="2020-11-22T04:17:51.475" v="13" actId="1076"/>
           <ac:spMkLst>
             <pc:docMk/>
             <pc:sldMk cId="1091789387" sldId="273"/>
             <ac:spMk id="110" creationId="{CBF41200-6B39-49A7-85D4-64606C55105F}"/>
           </ac:spMkLst>
         </pc:spChg>
-        <pc:spChg chg="add mod topLvl">
-          <ac:chgData name="Fingerhut, John Andy" userId="6ad675d3-541e-4813-9336-4804cd571dc7" providerId="ADAL" clId="{AB275EFB-7DC9-4E6C-884D-530FD05132B0}" dt="2020-11-13T02:36:24.018" v="114" actId="1076"/>
+        <pc:spChg chg="mod">
+          <ac:chgData name="Fingerhut, John Andy" userId="6ad675d3-541e-4813-9336-4804cd571dc7" providerId="ADAL" clId="{4F0530BD-8DBC-4E4A-AD8B-324142F9DCDB}" dt="2020-11-22T04:17:51.475" v="13" actId="1076"/>
           <ac:spMkLst>
             <pc:docMk/>
             <pc:sldMk cId="1091789387" sldId="273"/>
@@ -228,7 +172,7 @@
           </ac:spMkLst>
         </pc:spChg>
         <pc:spChg chg="mod">
-          <ac:chgData name="Fingerhut, John Andy" userId="6ad675d3-541e-4813-9336-4804cd571dc7" providerId="ADAL" clId="{AB275EFB-7DC9-4E6C-884D-530FD05132B0}" dt="2020-11-13T02:43:14.555" v="143" actId="1076"/>
+          <ac:chgData name="Fingerhut, John Andy" userId="6ad675d3-541e-4813-9336-4804cd571dc7" providerId="ADAL" clId="{4F0530BD-8DBC-4E4A-AD8B-324142F9DCDB}" dt="2020-11-22T04:17:51.475" v="13" actId="1076"/>
           <ac:spMkLst>
             <pc:docMk/>
             <pc:sldMk cId="1091789387" sldId="273"/>
@@ -236,23 +180,239 @@
           </ac:spMkLst>
         </pc:spChg>
         <pc:spChg chg="mod">
-          <ac:chgData name="Fingerhut, John Andy" userId="6ad675d3-541e-4813-9336-4804cd571dc7" providerId="ADAL" clId="{AB275EFB-7DC9-4E6C-884D-530FD05132B0}" dt="2020-11-13T02:43:14.555" v="143" actId="1076"/>
+          <ac:chgData name="Fingerhut, John Andy" userId="6ad675d3-541e-4813-9336-4804cd571dc7" providerId="ADAL" clId="{4F0530BD-8DBC-4E4A-AD8B-324142F9DCDB}" dt="2020-11-22T04:17:51.475" v="13" actId="1076"/>
           <ac:spMkLst>
             <pc:docMk/>
             <pc:sldMk cId="1091789387" sldId="273"/>
             <ac:spMk id="114" creationId="{8981AA32-2977-41CF-9174-51C16EB7A3C1}"/>
           </ac:spMkLst>
         </pc:spChg>
-        <pc:spChg chg="add del mod topLvl">
-          <ac:chgData name="Fingerhut, John Andy" userId="6ad675d3-541e-4813-9336-4804cd571dc7" providerId="ADAL" clId="{AB275EFB-7DC9-4E6C-884D-530FD05132B0}" dt="2020-11-13T02:34:43.356" v="103" actId="478"/>
+        <pc:spChg chg="add del">
+          <ac:chgData name="Fingerhut, John Andy" userId="6ad675d3-541e-4813-9336-4804cd571dc7" providerId="ADAL" clId="{4F0530BD-8DBC-4E4A-AD8B-324142F9DCDB}" dt="2020-11-22T04:19:37.666" v="21"/>
           <ac:spMkLst>
             <pc:docMk/>
             <pc:sldMk cId="1091789387" sldId="273"/>
-            <ac:spMk id="119" creationId="{231B9BC7-9EDF-4A13-BE99-93FD10BE7392}"/>
+            <ac:spMk id="119" creationId="{88E29AD1-43B3-485D-B363-3F6436D907E7}"/>
+          </ac:spMkLst>
+        </pc:spChg>
+        <pc:spChg chg="add mod">
+          <ac:chgData name="Fingerhut, John Andy" userId="6ad675d3-541e-4813-9336-4804cd571dc7" providerId="ADAL" clId="{4F0530BD-8DBC-4E4A-AD8B-324142F9DCDB}" dt="2020-11-22T04:20:54.462" v="49" actId="1076"/>
+          <ac:spMkLst>
+            <pc:docMk/>
+            <pc:sldMk cId="1091789387" sldId="273"/>
+            <ac:spMk id="122" creationId="{AAFB021B-F573-4955-A61C-CA26210E375D}"/>
           </ac:spMkLst>
         </pc:spChg>
         <pc:spChg chg="mod">
-          <ac:chgData name="Fingerhut, John Andy" userId="6ad675d3-541e-4813-9336-4804cd571dc7" providerId="ADAL" clId="{AB275EFB-7DC9-4E6C-884D-530FD05132B0}" dt="2020-11-13T02:27:10.361" v="24" actId="1076"/>
+          <ac:chgData name="Fingerhut, John Andy" userId="6ad675d3-541e-4813-9336-4804cd571dc7" providerId="ADAL" clId="{4F0530BD-8DBC-4E4A-AD8B-324142F9DCDB}" dt="2020-11-22T04:17:51.475" v="13" actId="1076"/>
+          <ac:spMkLst>
+            <pc:docMk/>
+            <pc:sldMk cId="1091789387" sldId="273"/>
+            <ac:spMk id="148" creationId="{0E3FF64B-C6A6-4736-9847-96B6371F20AE}"/>
+          </ac:spMkLst>
+        </pc:spChg>
+        <pc:spChg chg="mod">
+          <ac:chgData name="Fingerhut, John Andy" userId="6ad675d3-541e-4813-9336-4804cd571dc7" providerId="ADAL" clId="{4F0530BD-8DBC-4E4A-AD8B-324142F9DCDB}" dt="2020-11-22T04:38:36.499" v="75" actId="20577"/>
+          <ac:spMkLst>
+            <pc:docMk/>
+            <pc:sldMk cId="1091789387" sldId="273"/>
+            <ac:spMk id="200" creationId="{6143778A-3CAF-4C20-AA59-3CC193DB8BCB}"/>
+          </ac:spMkLst>
+        </pc:spChg>
+        <pc:grpChg chg="mod">
+          <ac:chgData name="Fingerhut, John Andy" userId="6ad675d3-541e-4813-9336-4804cd571dc7" providerId="ADAL" clId="{4F0530BD-8DBC-4E4A-AD8B-324142F9DCDB}" dt="2020-11-22T04:17:51.475" v="13" actId="1076"/>
+          <ac:grpSpMkLst>
+            <pc:docMk/>
+            <pc:sldMk cId="1091789387" sldId="273"/>
+            <ac:grpSpMk id="25" creationId="{D3A54630-E9F6-45DD-998F-E5DC0F14A399}"/>
+          </ac:grpSpMkLst>
+        </pc:grpChg>
+        <pc:grpChg chg="mod">
+          <ac:chgData name="Fingerhut, John Andy" userId="6ad675d3-541e-4813-9336-4804cd571dc7" providerId="ADAL" clId="{4F0530BD-8DBC-4E4A-AD8B-324142F9DCDB}" dt="2020-11-22T04:17:51.475" v="13" actId="1076"/>
+          <ac:grpSpMkLst>
+            <pc:docMk/>
+            <pc:sldMk cId="1091789387" sldId="273"/>
+            <ac:grpSpMk id="83" creationId="{1C834900-1FBA-4F79-9BAA-4729CB027B15}"/>
+          </ac:grpSpMkLst>
+        </pc:grpChg>
+        <pc:grpChg chg="mod">
+          <ac:chgData name="Fingerhut, John Andy" userId="6ad675d3-541e-4813-9336-4804cd571dc7" providerId="ADAL" clId="{4F0530BD-8DBC-4E4A-AD8B-324142F9DCDB}" dt="2020-11-22T04:18:39.163" v="17" actId="14100"/>
+          <ac:grpSpMkLst>
+            <pc:docMk/>
+            <pc:sldMk cId="1091789387" sldId="273"/>
+            <ac:grpSpMk id="163" creationId="{8608615B-EB0D-4D19-94C6-BA8F0B161E4B}"/>
+          </ac:grpSpMkLst>
+        </pc:grpChg>
+        <pc:grpChg chg="mod">
+          <ac:chgData name="Fingerhut, John Andy" userId="6ad675d3-541e-4813-9336-4804cd571dc7" providerId="ADAL" clId="{4F0530BD-8DBC-4E4A-AD8B-324142F9DCDB}" dt="2020-11-22T04:17:51.475" v="13" actId="1076"/>
+          <ac:grpSpMkLst>
+            <pc:docMk/>
+            <pc:sldMk cId="1091789387" sldId="273"/>
+            <ac:grpSpMk id="177" creationId="{AAC1F68D-05B8-4B51-8587-059500FE3478}"/>
+          </ac:grpSpMkLst>
+        </pc:grpChg>
+        <pc:cxnChg chg="mod">
+          <ac:chgData name="Fingerhut, John Andy" userId="6ad675d3-541e-4813-9336-4804cd571dc7" providerId="ADAL" clId="{4F0530BD-8DBC-4E4A-AD8B-324142F9DCDB}" dt="2020-11-22T04:18:22.037" v="15" actId="14100"/>
+          <ac:cxnSpMkLst>
+            <pc:docMk/>
+            <pc:sldMk cId="1091789387" sldId="273"/>
+            <ac:cxnSpMk id="80" creationId="{236BE345-2EA6-45DD-85B2-ACD4C19A91F5}"/>
+          </ac:cxnSpMkLst>
+        </pc:cxnChg>
+        <pc:cxnChg chg="add mod">
+          <ac:chgData name="Fingerhut, John Andy" userId="6ad675d3-541e-4813-9336-4804cd571dc7" providerId="ADAL" clId="{4F0530BD-8DBC-4E4A-AD8B-324142F9DCDB}" dt="2020-11-22T04:18:53.447" v="18" actId="692"/>
+          <ac:cxnSpMkLst>
+            <pc:docMk/>
+            <pc:sldMk cId="1091789387" sldId="273"/>
+            <ac:cxnSpMk id="99" creationId="{ADD4493A-5BBC-4D15-B581-A433EADD11C6}"/>
+          </ac:cxnSpMkLst>
+        </pc:cxnChg>
+        <pc:cxnChg chg="mod">
+          <ac:chgData name="Fingerhut, John Andy" userId="6ad675d3-541e-4813-9336-4804cd571dc7" providerId="ADAL" clId="{4F0530BD-8DBC-4E4A-AD8B-324142F9DCDB}" dt="2020-11-22T04:17:51.475" v="13" actId="1076"/>
+          <ac:cxnSpMkLst>
+            <pc:docMk/>
+            <pc:sldMk cId="1091789387" sldId="273"/>
+            <ac:cxnSpMk id="100" creationId="{F4860C18-D645-4EE6-BCDB-79FE3B828918}"/>
+          </ac:cxnSpMkLst>
+        </pc:cxnChg>
+        <pc:cxnChg chg="add mod">
+          <ac:chgData name="Fingerhut, John Andy" userId="6ad675d3-541e-4813-9336-4804cd571dc7" providerId="ADAL" clId="{4F0530BD-8DBC-4E4A-AD8B-324142F9DCDB}" dt="2020-11-22T04:39:04.966" v="80" actId="14100"/>
+          <ac:cxnSpMkLst>
+            <pc:docMk/>
+            <pc:sldMk cId="1091789387" sldId="273"/>
+            <ac:cxnSpMk id="102" creationId="{EB96FCB9-19D5-432B-B874-01E971C45BF4}"/>
+          </ac:cxnSpMkLst>
+        </pc:cxnChg>
+        <pc:cxnChg chg="add mod">
+          <ac:chgData name="Fingerhut, John Andy" userId="6ad675d3-541e-4813-9336-4804cd571dc7" providerId="ADAL" clId="{4F0530BD-8DBC-4E4A-AD8B-324142F9DCDB}" dt="2020-11-22T04:19:12.110" v="19" actId="14100"/>
+          <ac:cxnSpMkLst>
+            <pc:docMk/>
+            <pc:sldMk cId="1091789387" sldId="273"/>
+            <ac:cxnSpMk id="106" creationId="{16B1E8FE-E0AE-4FF6-AC2B-2BC0EAF5B4C8}"/>
+          </ac:cxnSpMkLst>
+        </pc:cxnChg>
+        <pc:cxnChg chg="mod">
+          <ac:chgData name="Fingerhut, John Andy" userId="6ad675d3-541e-4813-9336-4804cd571dc7" providerId="ADAL" clId="{4F0530BD-8DBC-4E4A-AD8B-324142F9DCDB}" dt="2020-11-22T04:17:51.475" v="13" actId="1076"/>
+          <ac:cxnSpMkLst>
+            <pc:docMk/>
+            <pc:sldMk cId="1091789387" sldId="273"/>
+            <ac:cxnSpMk id="112" creationId="{C64DEB71-3093-431E-88AF-4C2BE81668EF}"/>
+          </ac:cxnSpMkLst>
+        </pc:cxnChg>
+        <pc:cxnChg chg="mod">
+          <ac:chgData name="Fingerhut, John Andy" userId="6ad675d3-541e-4813-9336-4804cd571dc7" providerId="ADAL" clId="{4F0530BD-8DBC-4E4A-AD8B-324142F9DCDB}" dt="2020-11-22T04:17:51.475" v="13" actId="1076"/>
+          <ac:cxnSpMkLst>
+            <pc:docMk/>
+            <pc:sldMk cId="1091789387" sldId="273"/>
+            <ac:cxnSpMk id="115" creationId="{368C70F1-7509-412A-8F1A-A518E73EEB07}"/>
+          </ac:cxnSpMkLst>
+        </pc:cxnChg>
+        <pc:cxnChg chg="mod">
+          <ac:chgData name="Fingerhut, John Andy" userId="6ad675d3-541e-4813-9336-4804cd571dc7" providerId="ADAL" clId="{4F0530BD-8DBC-4E4A-AD8B-324142F9DCDB}" dt="2020-11-22T04:17:51.475" v="13" actId="1076"/>
+          <ac:cxnSpMkLst>
+            <pc:docMk/>
+            <pc:sldMk cId="1091789387" sldId="273"/>
+            <ac:cxnSpMk id="116" creationId="{D6EAE7FF-ED18-4376-A74D-07B093B5896D}"/>
+          </ac:cxnSpMkLst>
+        </pc:cxnChg>
+        <pc:cxnChg chg="mod">
+          <ac:chgData name="Fingerhut, John Andy" userId="6ad675d3-541e-4813-9336-4804cd571dc7" providerId="ADAL" clId="{4F0530BD-8DBC-4E4A-AD8B-324142F9DCDB}" dt="2020-11-22T04:17:51.475" v="13" actId="1076"/>
+          <ac:cxnSpMkLst>
+            <pc:docMk/>
+            <pc:sldMk cId="1091789387" sldId="273"/>
+            <ac:cxnSpMk id="117" creationId="{2B8B9C9F-8E4C-4C30-AB47-9A5A956DF566}"/>
+          </ac:cxnSpMkLst>
+        </pc:cxnChg>
+        <pc:cxnChg chg="mod">
+          <ac:chgData name="Fingerhut, John Andy" userId="6ad675d3-541e-4813-9336-4804cd571dc7" providerId="ADAL" clId="{4F0530BD-8DBC-4E4A-AD8B-324142F9DCDB}" dt="2020-11-22T04:17:51.475" v="13" actId="1076"/>
+          <ac:cxnSpMkLst>
+            <pc:docMk/>
+            <pc:sldMk cId="1091789387" sldId="273"/>
+            <ac:cxnSpMk id="118" creationId="{40462665-FCF8-4E8C-943A-0EF224BA3563}"/>
+          </ac:cxnSpMkLst>
+        </pc:cxnChg>
+        <pc:cxnChg chg="mod">
+          <ac:chgData name="Fingerhut, John Andy" userId="6ad675d3-541e-4813-9336-4804cd571dc7" providerId="ADAL" clId="{4F0530BD-8DBC-4E4A-AD8B-324142F9DCDB}" dt="2020-11-22T04:17:51.475" v="13" actId="1076"/>
+          <ac:cxnSpMkLst>
+            <pc:docMk/>
+            <pc:sldMk cId="1091789387" sldId="273"/>
+            <ac:cxnSpMk id="123" creationId="{64C4D15B-D90A-42A1-857E-79AACC8E1ED6}"/>
+          </ac:cxnSpMkLst>
+        </pc:cxnChg>
+        <pc:cxnChg chg="mod">
+          <ac:chgData name="Fingerhut, John Andy" userId="6ad675d3-541e-4813-9336-4804cd571dc7" providerId="ADAL" clId="{4F0530BD-8DBC-4E4A-AD8B-324142F9DCDB}" dt="2020-11-22T04:18:13.381" v="14" actId="14100"/>
+          <ac:cxnSpMkLst>
+            <pc:docMk/>
+            <pc:sldMk cId="1091789387" sldId="273"/>
+            <ac:cxnSpMk id="196" creationId="{C4648FD0-BE39-49B2-A297-6987E7ED42BA}"/>
+          </ac:cxnSpMkLst>
+        </pc:cxnChg>
+        <pc:cxnChg chg="mod">
+          <ac:chgData name="Fingerhut, John Andy" userId="6ad675d3-541e-4813-9336-4804cd571dc7" providerId="ADAL" clId="{4F0530BD-8DBC-4E4A-AD8B-324142F9DCDB}" dt="2020-11-22T04:39:19.462" v="82" actId="14100"/>
+          <ac:cxnSpMkLst>
+            <pc:docMk/>
+            <pc:sldMk cId="1091789387" sldId="273"/>
+            <ac:cxnSpMk id="199" creationId="{9B56D066-03B7-4AA5-AE48-439E5D95D240}"/>
+          </ac:cxnSpMkLst>
+        </pc:cxnChg>
+      </pc:sldChg>
+    </pc:docChg>
+  </pc:docChgLst>
+  <pc:docChgLst>
+    <pc:chgData name="Fingerhut, John Andy" userId="6ad675d3-541e-4813-9336-4804cd571dc7" providerId="ADAL" clId="{FA5602D7-A0D3-4013-A653-8499FBA519D5}"/>
+    <pc:docChg chg="modSld">
+      <pc:chgData name="Fingerhut, John Andy" userId="6ad675d3-541e-4813-9336-4804cd571dc7" providerId="ADAL" clId="{FA5602D7-A0D3-4013-A653-8499FBA519D5}" dt="2020-11-13T03:07:14.444" v="78" actId="14100"/>
+      <pc:docMkLst>
+        <pc:docMk/>
+      </pc:docMkLst>
+      <pc:sldChg chg="modSp">
+        <pc:chgData name="Fingerhut, John Andy" userId="6ad675d3-541e-4813-9336-4804cd571dc7" providerId="ADAL" clId="{FA5602D7-A0D3-4013-A653-8499FBA519D5}" dt="2020-11-13T03:07:14.444" v="78" actId="14100"/>
+        <pc:sldMkLst>
+          <pc:docMk/>
+          <pc:sldMk cId="1091789387" sldId="273"/>
+        </pc:sldMkLst>
+        <pc:spChg chg="mod">
+          <ac:chgData name="Fingerhut, John Andy" userId="6ad675d3-541e-4813-9336-4804cd571dc7" providerId="ADAL" clId="{FA5602D7-A0D3-4013-A653-8499FBA519D5}" dt="2020-11-13T03:05:33.168" v="52" actId="20577"/>
+          <ac:spMkLst>
+            <pc:docMk/>
+            <pc:sldMk cId="1091789387" sldId="273"/>
+            <ac:spMk id="9" creationId="{08CD8402-7233-47B1-A1B5-23D2E88AF40D}"/>
+          </ac:spMkLst>
+        </pc:spChg>
+        <pc:spChg chg="mod">
+          <ac:chgData name="Fingerhut, John Andy" userId="6ad675d3-541e-4813-9336-4804cd571dc7" providerId="ADAL" clId="{FA5602D7-A0D3-4013-A653-8499FBA519D5}" dt="2020-11-13T03:05:49.881" v="62" actId="255"/>
+          <ac:spMkLst>
+            <pc:docMk/>
+            <pc:sldMk cId="1091789387" sldId="273"/>
+            <ac:spMk id="11" creationId="{C5E0B604-11FA-4D85-8C27-1B6B6D7746A0}"/>
+          </ac:spMkLst>
+        </pc:spChg>
+        <pc:spChg chg="mod">
+          <ac:chgData name="Fingerhut, John Andy" userId="6ad675d3-541e-4813-9336-4804cd571dc7" providerId="ADAL" clId="{FA5602D7-A0D3-4013-A653-8499FBA519D5}" dt="2020-11-13T03:03:43.376" v="2" actId="20577"/>
+          <ac:spMkLst>
+            <pc:docMk/>
+            <pc:sldMk cId="1091789387" sldId="273"/>
+            <ac:spMk id="36" creationId="{3ED9F1BC-576A-4EF3-9876-126695A64636}"/>
+          </ac:spMkLst>
+        </pc:spChg>
+        <pc:spChg chg="mod">
+          <ac:chgData name="Fingerhut, John Andy" userId="6ad675d3-541e-4813-9336-4804cd571dc7" providerId="ADAL" clId="{FA5602D7-A0D3-4013-A653-8499FBA519D5}" dt="2020-11-13T03:03:46.584" v="5" actId="20577"/>
+          <ac:spMkLst>
+            <pc:docMk/>
+            <pc:sldMk cId="1091789387" sldId="273"/>
+            <ac:spMk id="37" creationId="{FEF6D1E8-CAD9-4D86-8016-9DF9D3A426B1}"/>
+          </ac:spMkLst>
+        </pc:spChg>
+        <pc:spChg chg="mod">
+          <ac:chgData name="Fingerhut, John Andy" userId="6ad675d3-541e-4813-9336-4804cd571dc7" providerId="ADAL" clId="{FA5602D7-A0D3-4013-A653-8499FBA519D5}" dt="2020-11-13T03:03:55.566" v="9" actId="20577"/>
+          <ac:spMkLst>
+            <pc:docMk/>
+            <pc:sldMk cId="1091789387" sldId="273"/>
+            <ac:spMk id="40" creationId="{A99932A6-6BD7-4FD1-93C8-8E131159E42A}"/>
+          </ac:spMkLst>
+        </pc:spChg>
+        <pc:spChg chg="mod">
+          <ac:chgData name="Fingerhut, John Andy" userId="6ad675d3-541e-4813-9336-4804cd571dc7" providerId="ADAL" clId="{FA5602D7-A0D3-4013-A653-8499FBA519D5}" dt="2020-11-13T03:06:34.893" v="67" actId="1076"/>
           <ac:spMkLst>
             <pc:docMk/>
             <pc:sldMk cId="1091789387" sldId="273"/>
@@ -260,263 +420,31 @@
           </ac:spMkLst>
         </pc:spChg>
         <pc:spChg chg="mod">
-          <ac:chgData name="Fingerhut, John Andy" userId="6ad675d3-541e-4813-9336-4804cd571dc7" providerId="ADAL" clId="{AB275EFB-7DC9-4E6C-884D-530FD05132B0}" dt="2020-11-13T02:26:12.034" v="17" actId="1076"/>
+          <ac:chgData name="Fingerhut, John Andy" userId="6ad675d3-541e-4813-9336-4804cd571dc7" providerId="ADAL" clId="{FA5602D7-A0D3-4013-A653-8499FBA519D5}" dt="2020-11-13T03:07:14.444" v="78" actId="14100"/>
           <ac:spMkLst>
             <pc:docMk/>
             <pc:sldMk cId="1091789387" sldId="273"/>
             <ac:spMk id="121" creationId="{C5B57169-1275-4E2F-A03B-8F7108AA0A55}"/>
           </ac:spMkLst>
         </pc:spChg>
-        <pc:spChg chg="add mod ord">
-          <ac:chgData name="Fingerhut, John Andy" userId="6ad675d3-541e-4813-9336-4804cd571dc7" providerId="ADAL" clId="{AB275EFB-7DC9-4E6C-884D-530FD05132B0}" dt="2020-11-13T02:36:24.018" v="114" actId="1076"/>
+        <pc:spChg chg="mod">
+          <ac:chgData name="Fingerhut, John Andy" userId="6ad675d3-541e-4813-9336-4804cd571dc7" providerId="ADAL" clId="{FA5602D7-A0D3-4013-A653-8499FBA519D5}" dt="2020-11-13T03:06:00.859" v="63" actId="207"/>
           <ac:spMkLst>
             <pc:docMk/>
             <pc:sldMk cId="1091789387" sldId="273"/>
             <ac:spMk id="148" creationId="{0E3FF64B-C6A6-4736-9847-96B6371F20AE}"/>
           </ac:spMkLst>
         </pc:spChg>
-        <pc:spChg chg="del mod">
-          <ac:chgData name="Fingerhut, John Andy" userId="6ad675d3-541e-4813-9336-4804cd571dc7" providerId="ADAL" clId="{AB275EFB-7DC9-4E6C-884D-530FD05132B0}" dt="2020-11-13T02:29:05.373" v="30" actId="478"/>
-          <ac:spMkLst>
-            <pc:docMk/>
-            <pc:sldMk cId="1091789387" sldId="273"/>
-            <ac:spMk id="185" creationId="{0D2D3C60-4A1A-4E38-8845-024DF1FE79E8}"/>
-          </ac:spMkLst>
-        </pc:spChg>
-        <pc:spChg chg="del mod">
-          <ac:chgData name="Fingerhut, John Andy" userId="6ad675d3-541e-4813-9336-4804cd571dc7" providerId="ADAL" clId="{AB275EFB-7DC9-4E6C-884D-530FD05132B0}" dt="2020-11-13T02:35:24.251" v="106" actId="478"/>
-          <ac:spMkLst>
-            <pc:docMk/>
-            <pc:sldMk cId="1091789387" sldId="273"/>
-            <ac:spMk id="186" creationId="{ECB7CF33-FC02-4C32-970C-EB52B3F817E6}"/>
-          </ac:spMkLst>
-        </pc:spChg>
-        <pc:spChg chg="mod">
-          <ac:chgData name="Fingerhut, John Andy" userId="6ad675d3-541e-4813-9336-4804cd571dc7" providerId="ADAL" clId="{AB275EFB-7DC9-4E6C-884D-530FD05132B0}" dt="2020-11-13T02:36:24.018" v="114" actId="1076"/>
-          <ac:spMkLst>
-            <pc:docMk/>
-            <pc:sldMk cId="1091789387" sldId="273"/>
-            <ac:spMk id="200" creationId="{6143778A-3CAF-4C20-AA59-3CC193DB8BCB}"/>
-          </ac:spMkLst>
-        </pc:spChg>
-        <pc:grpChg chg="del mod">
-          <ac:chgData name="Fingerhut, John Andy" userId="6ad675d3-541e-4813-9336-4804cd571dc7" providerId="ADAL" clId="{AB275EFB-7DC9-4E6C-884D-530FD05132B0}" dt="2020-11-13T02:33:45.728" v="78" actId="165"/>
-          <ac:grpSpMkLst>
-            <pc:docMk/>
-            <pc:sldMk cId="1091789387" sldId="273"/>
-            <ac:grpSpMk id="4" creationId="{8C98B034-85E6-458B-A9FF-1528198EAA1A}"/>
-          </ac:grpSpMkLst>
-        </pc:grpChg>
-        <pc:grpChg chg="mod">
-          <ac:chgData name="Fingerhut, John Andy" userId="6ad675d3-541e-4813-9336-4804cd571dc7" providerId="ADAL" clId="{AB275EFB-7DC9-4E6C-884D-530FD05132B0}" dt="2020-11-13T02:26:52.046" v="22" actId="1076"/>
-          <ac:grpSpMkLst>
-            <pc:docMk/>
-            <pc:sldMk cId="1091789387" sldId="273"/>
-            <ac:grpSpMk id="25" creationId="{D3A54630-E9F6-45DD-998F-E5DC0F14A399}"/>
-          </ac:grpSpMkLst>
-        </pc:grpChg>
-        <pc:grpChg chg="add del mod">
-          <ac:chgData name="Fingerhut, John Andy" userId="6ad675d3-541e-4813-9336-4804cd571dc7" providerId="ADAL" clId="{AB275EFB-7DC9-4E6C-884D-530FD05132B0}" dt="2020-11-13T02:32:10.041" v="51" actId="165"/>
-          <ac:grpSpMkLst>
-            <pc:docMk/>
-            <pc:sldMk cId="1091789387" sldId="273"/>
-            <ac:grpSpMk id="54" creationId="{4C313AC5-98CA-442B-99E2-5839162276A8}"/>
-          </ac:grpSpMkLst>
-        </pc:grpChg>
-        <pc:grpChg chg="mod">
-          <ac:chgData name="Fingerhut, John Andy" userId="6ad675d3-541e-4813-9336-4804cd571dc7" providerId="ADAL" clId="{AB275EFB-7DC9-4E6C-884D-530FD05132B0}" dt="2020-11-13T02:26:22.005" v="18" actId="1076"/>
-          <ac:grpSpMkLst>
-            <pc:docMk/>
-            <pc:sldMk cId="1091789387" sldId="273"/>
-            <ac:grpSpMk id="78" creationId="{45FA8724-A465-47A6-9A0E-9F107AF39809}"/>
-          </ac:grpSpMkLst>
-        </pc:grpChg>
-        <pc:grpChg chg="mod">
-          <ac:chgData name="Fingerhut, John Andy" userId="6ad675d3-541e-4813-9336-4804cd571dc7" providerId="ADAL" clId="{AB275EFB-7DC9-4E6C-884D-530FD05132B0}" dt="2020-11-13T02:36:24.018" v="114" actId="1076"/>
-          <ac:grpSpMkLst>
-            <pc:docMk/>
-            <pc:sldMk cId="1091789387" sldId="273"/>
-            <ac:grpSpMk id="83" creationId="{1C834900-1FBA-4F79-9BAA-4729CB027B15}"/>
-          </ac:grpSpMkLst>
-        </pc:grpChg>
-        <pc:grpChg chg="add del mod">
-          <ac:chgData name="Fingerhut, John Andy" userId="6ad675d3-541e-4813-9336-4804cd571dc7" providerId="ADAL" clId="{AB275EFB-7DC9-4E6C-884D-530FD05132B0}" dt="2020-11-13T02:33:22.076" v="59" actId="478"/>
-          <ac:grpSpMkLst>
-            <pc:docMk/>
-            <pc:sldMk cId="1091789387" sldId="273"/>
-            <ac:grpSpMk id="129" creationId="{98392EC4-FA1F-4A23-88AF-294263B04611}"/>
-          </ac:grpSpMkLst>
-        </pc:grpChg>
-        <pc:grpChg chg="add mod">
-          <ac:chgData name="Fingerhut, John Andy" userId="6ad675d3-541e-4813-9336-4804cd571dc7" providerId="ADAL" clId="{AB275EFB-7DC9-4E6C-884D-530FD05132B0}" dt="2020-11-13T02:40:36.673" v="137" actId="164"/>
-          <ac:grpSpMkLst>
-            <pc:docMk/>
-            <pc:sldMk cId="1091789387" sldId="273"/>
-            <ac:grpSpMk id="163" creationId="{8608615B-EB0D-4D19-94C6-BA8F0B161E4B}"/>
-          </ac:grpSpMkLst>
-        </pc:grpChg>
-        <pc:grpChg chg="add mod">
-          <ac:chgData name="Fingerhut, John Andy" userId="6ad675d3-541e-4813-9336-4804cd571dc7" providerId="ADAL" clId="{AB275EFB-7DC9-4E6C-884D-530FD05132B0}" dt="2020-11-13T02:41:10.275" v="142" actId="1076"/>
-          <ac:grpSpMkLst>
-            <pc:docMk/>
-            <pc:sldMk cId="1091789387" sldId="273"/>
-            <ac:grpSpMk id="177" creationId="{AAC1F68D-05B8-4B51-8587-059500FE3478}"/>
-          </ac:grpSpMkLst>
-        </pc:grpChg>
-        <pc:cxnChg chg="add mod">
-          <ac:chgData name="Fingerhut, John Andy" userId="6ad675d3-541e-4813-9336-4804cd571dc7" providerId="ADAL" clId="{AB275EFB-7DC9-4E6C-884D-530FD05132B0}" dt="2020-11-13T02:25:45.321" v="14" actId="1076"/>
-          <ac:cxnSpMkLst>
-            <pc:docMk/>
-            <pc:sldMk cId="1091789387" sldId="273"/>
-            <ac:cxnSpMk id="17" creationId="{415C7822-4030-42AD-AB86-5852B4DD265D}"/>
-          </ac:cxnSpMkLst>
-        </pc:cxnChg>
-        <pc:cxnChg chg="mod topLvl">
-          <ac:chgData name="Fingerhut, John Andy" userId="6ad675d3-541e-4813-9336-4804cd571dc7" providerId="ADAL" clId="{AB275EFB-7DC9-4E6C-884D-530FD05132B0}" dt="2020-11-13T02:33:45.728" v="78" actId="165"/>
-          <ac:cxnSpMkLst>
-            <pc:docMk/>
-            <pc:sldMk cId="1091789387" sldId="273"/>
-            <ac:cxnSpMk id="43" creationId="{9FEFDBCA-8D42-4559-B5B7-7B17A99615BD}"/>
-          </ac:cxnSpMkLst>
-        </pc:cxnChg>
-        <pc:cxnChg chg="mod topLvl">
-          <ac:chgData name="Fingerhut, John Andy" userId="6ad675d3-541e-4813-9336-4804cd571dc7" providerId="ADAL" clId="{AB275EFB-7DC9-4E6C-884D-530FD05132B0}" dt="2020-11-13T02:33:45.728" v="78" actId="165"/>
-          <ac:cxnSpMkLst>
-            <pc:docMk/>
-            <pc:sldMk cId="1091789387" sldId="273"/>
-            <ac:cxnSpMk id="49" creationId="{265B6322-C564-4122-876E-0B2152445370}"/>
-          </ac:cxnSpMkLst>
-        </pc:cxnChg>
-        <pc:cxnChg chg="mod topLvl">
-          <ac:chgData name="Fingerhut, John Andy" userId="6ad675d3-541e-4813-9336-4804cd571dc7" providerId="ADAL" clId="{AB275EFB-7DC9-4E6C-884D-530FD05132B0}" dt="2020-11-13T02:33:45.728" v="78" actId="165"/>
-          <ac:cxnSpMkLst>
-            <pc:docMk/>
-            <pc:sldMk cId="1091789387" sldId="273"/>
-            <ac:cxnSpMk id="50" creationId="{516664ED-D0D4-46ED-91FF-5BDE567A773D}"/>
-          </ac:cxnSpMkLst>
-        </pc:cxnChg>
         <pc:cxnChg chg="mod">
-          <ac:chgData name="Fingerhut, John Andy" userId="6ad675d3-541e-4813-9336-4804cd571dc7" providerId="ADAL" clId="{AB275EFB-7DC9-4E6C-884D-530FD05132B0}" dt="2020-11-13T02:32:40.016" v="55" actId="14100"/>
-          <ac:cxnSpMkLst>
-            <pc:docMk/>
-            <pc:sldMk cId="1091789387" sldId="273"/>
-            <ac:cxnSpMk id="80" creationId="{236BE345-2EA6-45DD-85B2-ACD4C19A91F5}"/>
-          </ac:cxnSpMkLst>
-        </pc:cxnChg>
-        <pc:cxnChg chg="del mod">
-          <ac:chgData name="Fingerhut, John Andy" userId="6ad675d3-541e-4813-9336-4804cd571dc7" providerId="ADAL" clId="{AB275EFB-7DC9-4E6C-884D-530FD05132B0}" dt="2020-11-13T02:30:07.584" v="37" actId="478"/>
-          <ac:cxnSpMkLst>
-            <pc:docMk/>
-            <pc:sldMk cId="1091789387" sldId="273"/>
-            <ac:cxnSpMk id="99" creationId="{4E52AAC9-DA09-4876-83F9-7D79F7233425}"/>
-          </ac:cxnSpMkLst>
-        </pc:cxnChg>
-        <pc:cxnChg chg="mod">
-          <ac:chgData name="Fingerhut, John Andy" userId="6ad675d3-541e-4813-9336-4804cd571dc7" providerId="ADAL" clId="{AB275EFB-7DC9-4E6C-884D-530FD05132B0}" dt="2020-11-13T02:36:44.586" v="116" actId="14100"/>
-          <ac:cxnSpMkLst>
-            <pc:docMk/>
-            <pc:sldMk cId="1091789387" sldId="273"/>
-            <ac:cxnSpMk id="100" creationId="{F4860C18-D645-4EE6-BCDB-79FE3B828918}"/>
-          </ac:cxnSpMkLst>
-        </pc:cxnChg>
-        <pc:cxnChg chg="del mod">
-          <ac:chgData name="Fingerhut, John Andy" userId="6ad675d3-541e-4813-9336-4804cd571dc7" providerId="ADAL" clId="{AB275EFB-7DC9-4E6C-884D-530FD05132B0}" dt="2020-11-13T02:30:11.015" v="38" actId="478"/>
-          <ac:cxnSpMkLst>
-            <pc:docMk/>
-            <pc:sldMk cId="1091789387" sldId="273"/>
-            <ac:cxnSpMk id="101" creationId="{372B96BA-804B-4311-BE3B-F167BF926D92}"/>
-          </ac:cxnSpMkLst>
-        </pc:cxnChg>
-        <pc:cxnChg chg="add del mod">
-          <ac:chgData name="Fingerhut, John Andy" userId="6ad675d3-541e-4813-9336-4804cd571dc7" providerId="ADAL" clId="{AB275EFB-7DC9-4E6C-884D-530FD05132B0}" dt="2020-11-13T02:25:06.734" v="9" actId="478"/>
-          <ac:cxnSpMkLst>
-            <pc:docMk/>
-            <pc:sldMk cId="1091789387" sldId="273"/>
-            <ac:cxnSpMk id="102" creationId="{E0BDF171-929B-4438-8B10-352CE8D0C7DE}"/>
-          </ac:cxnSpMkLst>
-        </pc:cxnChg>
-        <pc:cxnChg chg="add del mod">
-          <ac:chgData name="Fingerhut, John Andy" userId="6ad675d3-541e-4813-9336-4804cd571dc7" providerId="ADAL" clId="{AB275EFB-7DC9-4E6C-884D-530FD05132B0}" dt="2020-11-13T02:37:19.367" v="118" actId="478"/>
-          <ac:cxnSpMkLst>
-            <pc:docMk/>
-            <pc:sldMk cId="1091789387" sldId="273"/>
-            <ac:cxnSpMk id="103" creationId="{5EDE3D83-7DA1-468B-9B2D-6BC31D94DBA2}"/>
-          </ac:cxnSpMkLst>
-        </pc:cxnChg>
-        <pc:cxnChg chg="add mod">
-          <ac:chgData name="Fingerhut, John Andy" userId="6ad675d3-541e-4813-9336-4804cd571dc7" providerId="ADAL" clId="{AB275EFB-7DC9-4E6C-884D-530FD05132B0}" dt="2020-11-13T02:40:36.673" v="137" actId="164"/>
-          <ac:cxnSpMkLst>
-            <pc:docMk/>
-            <pc:sldMk cId="1091789387" sldId="273"/>
-            <ac:cxnSpMk id="105" creationId="{AAD870DC-10F4-46EA-8DD1-22D68B525CA7}"/>
-          </ac:cxnSpMkLst>
-        </pc:cxnChg>
-        <pc:cxnChg chg="add mod topLvl">
-          <ac:chgData name="Fingerhut, John Andy" userId="6ad675d3-541e-4813-9336-4804cd571dc7" providerId="ADAL" clId="{AB275EFB-7DC9-4E6C-884D-530FD05132B0}" dt="2020-11-13T02:36:24.018" v="114" actId="1076"/>
-          <ac:cxnSpMkLst>
-            <pc:docMk/>
-            <pc:sldMk cId="1091789387" sldId="273"/>
-            <ac:cxnSpMk id="112" creationId="{C64DEB71-3093-431E-88AF-4C2BE81668EF}"/>
-          </ac:cxnSpMkLst>
-        </pc:cxnChg>
-        <pc:cxnChg chg="add mod topLvl">
-          <ac:chgData name="Fingerhut, John Andy" userId="6ad675d3-541e-4813-9336-4804cd571dc7" providerId="ADAL" clId="{AB275EFB-7DC9-4E6C-884D-530FD05132B0}" dt="2020-11-13T02:36:24.018" v="114" actId="1076"/>
-          <ac:cxnSpMkLst>
-            <pc:docMk/>
-            <pc:sldMk cId="1091789387" sldId="273"/>
-            <ac:cxnSpMk id="115" creationId="{368C70F1-7509-412A-8F1A-A518E73EEB07}"/>
-          </ac:cxnSpMkLst>
-        </pc:cxnChg>
-        <pc:cxnChg chg="add mod topLvl">
-          <ac:chgData name="Fingerhut, John Andy" userId="6ad675d3-541e-4813-9336-4804cd571dc7" providerId="ADAL" clId="{AB275EFB-7DC9-4E6C-884D-530FD05132B0}" dt="2020-11-13T02:36:24.018" v="114" actId="1076"/>
-          <ac:cxnSpMkLst>
-            <pc:docMk/>
-            <pc:sldMk cId="1091789387" sldId="273"/>
-            <ac:cxnSpMk id="116" creationId="{D6EAE7FF-ED18-4376-A74D-07B093B5896D}"/>
-          </ac:cxnSpMkLst>
-        </pc:cxnChg>
-        <pc:cxnChg chg="add mod topLvl">
-          <ac:chgData name="Fingerhut, John Andy" userId="6ad675d3-541e-4813-9336-4804cd571dc7" providerId="ADAL" clId="{AB275EFB-7DC9-4E6C-884D-530FD05132B0}" dt="2020-11-13T02:36:24.018" v="114" actId="1076"/>
-          <ac:cxnSpMkLst>
-            <pc:docMk/>
-            <pc:sldMk cId="1091789387" sldId="273"/>
-            <ac:cxnSpMk id="117" creationId="{2B8B9C9F-8E4C-4C30-AB47-9A5A956DF566}"/>
-          </ac:cxnSpMkLst>
-        </pc:cxnChg>
-        <pc:cxnChg chg="add mod topLvl">
-          <ac:chgData name="Fingerhut, John Andy" userId="6ad675d3-541e-4813-9336-4804cd571dc7" providerId="ADAL" clId="{AB275EFB-7DC9-4E6C-884D-530FD05132B0}" dt="2020-11-13T02:36:24.018" v="114" actId="1076"/>
-          <ac:cxnSpMkLst>
-            <pc:docMk/>
-            <pc:sldMk cId="1091789387" sldId="273"/>
-            <ac:cxnSpMk id="118" creationId="{40462665-FCF8-4E8C-943A-0EF224BA3563}"/>
-          </ac:cxnSpMkLst>
-        </pc:cxnChg>
-        <pc:cxnChg chg="add del mod topLvl">
-          <ac:chgData name="Fingerhut, John Andy" userId="6ad675d3-541e-4813-9336-4804cd571dc7" providerId="ADAL" clId="{AB275EFB-7DC9-4E6C-884D-530FD05132B0}" dt="2020-11-13T02:32:18.911" v="53" actId="478"/>
-          <ac:cxnSpMkLst>
-            <pc:docMk/>
-            <pc:sldMk cId="1091789387" sldId="273"/>
-            <ac:cxnSpMk id="122" creationId="{343BA56B-7295-492E-94C2-9EA9D40F5D2A}"/>
-          </ac:cxnSpMkLst>
-        </pc:cxnChg>
-        <pc:cxnChg chg="mod">
-          <ac:chgData name="Fingerhut, John Andy" userId="6ad675d3-541e-4813-9336-4804cd571dc7" providerId="ADAL" clId="{AB275EFB-7DC9-4E6C-884D-530FD05132B0}" dt="2020-11-13T02:27:10.361" v="24" actId="1076"/>
+          <ac:chgData name="Fingerhut, John Andy" userId="6ad675d3-541e-4813-9336-4804cd571dc7" providerId="ADAL" clId="{FA5602D7-A0D3-4013-A653-8499FBA519D5}" dt="2020-11-13T03:06:34.893" v="67" actId="1076"/>
           <ac:cxnSpMkLst>
             <pc:docMk/>
             <pc:sldMk cId="1091789387" sldId="273"/>
             <ac:cxnSpMk id="123" creationId="{64C4D15B-D90A-42A1-857E-79AACC8E1ED6}"/>
           </ac:cxnSpMkLst>
         </pc:cxnChg>
-        <pc:cxnChg chg="add mod">
-          <ac:chgData name="Fingerhut, John Andy" userId="6ad675d3-541e-4813-9336-4804cd571dc7" providerId="ADAL" clId="{AB275EFB-7DC9-4E6C-884D-530FD05132B0}" dt="2020-11-13T02:40:36.673" v="137" actId="164"/>
-          <ac:cxnSpMkLst>
-            <pc:docMk/>
-            <pc:sldMk cId="1091789387" sldId="273"/>
-            <ac:cxnSpMk id="126" creationId="{6D1D99B2-0E86-47B6-9123-9267435A5C00}"/>
-          </ac:cxnSpMkLst>
-        </pc:cxnChg>
         <pc:cxnChg chg="mod">
-          <ac:chgData name="Fingerhut, John Andy" userId="6ad675d3-541e-4813-9336-4804cd571dc7" providerId="ADAL" clId="{AB275EFB-7DC9-4E6C-884D-530FD05132B0}" dt="2020-11-13T02:27:10.361" v="24" actId="1076"/>
+          <ac:chgData name="Fingerhut, John Andy" userId="6ad675d3-541e-4813-9336-4804cd571dc7" providerId="ADAL" clId="{FA5602D7-A0D3-4013-A653-8499FBA519D5}" dt="2020-11-13T03:06:34.893" v="67" actId="1076"/>
           <ac:cxnSpMkLst>
             <pc:docMk/>
             <pc:sldMk cId="1091789387" sldId="273"/>
@@ -524,75 +452,19 @@
           </ac:cxnSpMkLst>
         </pc:cxnChg>
         <pc:cxnChg chg="mod">
-          <ac:chgData name="Fingerhut, John Andy" userId="6ad675d3-541e-4813-9336-4804cd571dc7" providerId="ADAL" clId="{AB275EFB-7DC9-4E6C-884D-530FD05132B0}" dt="2020-11-13T02:26:22.005" v="18" actId="1076"/>
+          <ac:chgData name="Fingerhut, John Andy" userId="6ad675d3-541e-4813-9336-4804cd571dc7" providerId="ADAL" clId="{FA5602D7-A0D3-4013-A653-8499FBA519D5}" dt="2020-11-13T03:07:14.444" v="78" actId="14100"/>
           <ac:cxnSpMkLst>
             <pc:docMk/>
             <pc:sldMk cId="1091789387" sldId="273"/>
             <ac:cxnSpMk id="134" creationId="{6C8D7A4A-4E00-4E2B-A752-9407B9B8DC70}"/>
           </ac:cxnSpMkLst>
         </pc:cxnChg>
-        <pc:cxnChg chg="add mod">
-          <ac:chgData name="Fingerhut, John Andy" userId="6ad675d3-541e-4813-9336-4804cd571dc7" providerId="ADAL" clId="{AB275EFB-7DC9-4E6C-884D-530FD05132B0}" dt="2020-11-13T02:40:36.673" v="137" actId="164"/>
-          <ac:cxnSpMkLst>
-            <pc:docMk/>
-            <pc:sldMk cId="1091789387" sldId="273"/>
-            <ac:cxnSpMk id="150" creationId="{A5C1AA9D-F6C3-45F8-8EF2-65A29333F671}"/>
-          </ac:cxnSpMkLst>
-        </pc:cxnChg>
-        <pc:cxnChg chg="del mod">
-          <ac:chgData name="Fingerhut, John Andy" userId="6ad675d3-541e-4813-9336-4804cd571dc7" providerId="ADAL" clId="{AB275EFB-7DC9-4E6C-884D-530FD05132B0}" dt="2020-11-13T02:24:39.312" v="3" actId="478"/>
-          <ac:cxnSpMkLst>
-            <pc:docMk/>
-            <pc:sldMk cId="1091789387" sldId="273"/>
-            <ac:cxnSpMk id="152" creationId="{B78C3C32-E93B-4B8E-B3FB-91631530F501}"/>
-          </ac:cxnSpMkLst>
-        </pc:cxnChg>
-        <pc:cxnChg chg="add del mod">
-          <ac:chgData name="Fingerhut, John Andy" userId="6ad675d3-541e-4813-9336-4804cd571dc7" providerId="ADAL" clId="{AB275EFB-7DC9-4E6C-884D-530FD05132B0}" dt="2020-11-13T02:40:39.551" v="138" actId="478"/>
-          <ac:cxnSpMkLst>
-            <pc:docMk/>
-            <pc:sldMk cId="1091789387" sldId="273"/>
-            <ac:cxnSpMk id="158" creationId="{057CCE7E-0FB4-4C48-A5A0-75865AAA0293}"/>
-          </ac:cxnSpMkLst>
-        </pc:cxnChg>
         <pc:cxnChg chg="mod">
-          <ac:chgData name="Fingerhut, John Andy" userId="6ad675d3-541e-4813-9336-4804cd571dc7" providerId="ADAL" clId="{AB275EFB-7DC9-4E6C-884D-530FD05132B0}" dt="2020-11-13T02:26:12.034" v="17" actId="1076"/>
+          <ac:chgData name="Fingerhut, John Andy" userId="6ad675d3-541e-4813-9336-4804cd571dc7" providerId="ADAL" clId="{FA5602D7-A0D3-4013-A653-8499FBA519D5}" dt="2020-11-13T03:07:14.444" v="78" actId="14100"/>
           <ac:cxnSpMkLst>
             <pc:docMk/>
             <pc:sldMk cId="1091789387" sldId="273"/>
             <ac:cxnSpMk id="181" creationId="{90B81CF6-C291-4A3A-8CFF-4322DFD54B64}"/>
-          </ac:cxnSpMkLst>
-        </pc:cxnChg>
-        <pc:cxnChg chg="del mod">
-          <ac:chgData name="Fingerhut, John Andy" userId="6ad675d3-541e-4813-9336-4804cd571dc7" providerId="ADAL" clId="{AB275EFB-7DC9-4E6C-884D-530FD05132B0}" dt="2020-11-13T02:35:24.251" v="106" actId="478"/>
-          <ac:cxnSpMkLst>
-            <pc:docMk/>
-            <pc:sldMk cId="1091789387" sldId="273"/>
-            <ac:cxnSpMk id="188" creationId="{F0E47CE2-D6D5-43FB-9807-E7C9B02BC145}"/>
-          </ac:cxnSpMkLst>
-        </pc:cxnChg>
-        <pc:cxnChg chg="del mod">
-          <ac:chgData name="Fingerhut, John Andy" userId="6ad675d3-541e-4813-9336-4804cd571dc7" providerId="ADAL" clId="{AB275EFB-7DC9-4E6C-884D-530FD05132B0}" dt="2020-11-13T02:31:27.379" v="48" actId="478"/>
-          <ac:cxnSpMkLst>
-            <pc:docMk/>
-            <pc:sldMk cId="1091789387" sldId="273"/>
-            <ac:cxnSpMk id="190" creationId="{7F571AFD-BF02-4176-A6A5-D77F4EF8C405}"/>
-          </ac:cxnSpMkLst>
-        </pc:cxnChg>
-        <pc:cxnChg chg="mod">
-          <ac:chgData name="Fingerhut, John Andy" userId="6ad675d3-541e-4813-9336-4804cd571dc7" providerId="ADAL" clId="{AB275EFB-7DC9-4E6C-884D-530FD05132B0}" dt="2020-11-13T02:36:24.018" v="114" actId="1076"/>
-          <ac:cxnSpMkLst>
-            <pc:docMk/>
-            <pc:sldMk cId="1091789387" sldId="273"/>
-            <ac:cxnSpMk id="196" creationId="{C4648FD0-BE39-49B2-A297-6987E7ED42BA}"/>
-          </ac:cxnSpMkLst>
-        </pc:cxnChg>
-        <pc:cxnChg chg="mod">
-          <ac:chgData name="Fingerhut, John Andy" userId="6ad675d3-541e-4813-9336-4804cd571dc7" providerId="ADAL" clId="{AB275EFB-7DC9-4E6C-884D-530FD05132B0}" dt="2020-11-13T02:36:24.018" v="114" actId="1076"/>
-          <ac:cxnSpMkLst>
-            <pc:docMk/>
-            <pc:sldMk cId="1091789387" sldId="273"/>
-            <ac:cxnSpMk id="199" creationId="{9B56D066-03B7-4AA5-AE48-439E5D95D240}"/>
           </ac:cxnSpMkLst>
         </pc:cxnChg>
       </pc:sldChg>
@@ -670,60 +542,132 @@
     </pc:docChg>
   </pc:docChgLst>
   <pc:docChgLst>
-    <pc:chgData name="Fingerhut, John Andy" userId="6ad675d3-541e-4813-9336-4804cd571dc7" providerId="ADAL" clId="{FA5602D7-A0D3-4013-A653-8499FBA519D5}"/>
-    <pc:docChg chg="modSld">
-      <pc:chgData name="Fingerhut, John Andy" userId="6ad675d3-541e-4813-9336-4804cd571dc7" providerId="ADAL" clId="{FA5602D7-A0D3-4013-A653-8499FBA519D5}" dt="2020-11-13T03:07:14.444" v="78" actId="14100"/>
+    <pc:chgData name="Fingerhut, John Andy" userId="6ad675d3-541e-4813-9336-4804cd571dc7" providerId="ADAL" clId="{AB275EFB-7DC9-4E6C-884D-530FD05132B0}"/>
+    <pc:docChg chg="undo custSel modSld">
+      <pc:chgData name="Fingerhut, John Andy" userId="6ad675d3-541e-4813-9336-4804cd571dc7" providerId="ADAL" clId="{AB275EFB-7DC9-4E6C-884D-530FD05132B0}" dt="2020-11-13T02:43:14.555" v="143" actId="1076"/>
       <pc:docMkLst>
         <pc:docMk/>
       </pc:docMkLst>
-      <pc:sldChg chg="modSp">
-        <pc:chgData name="Fingerhut, John Andy" userId="6ad675d3-541e-4813-9336-4804cd571dc7" providerId="ADAL" clId="{FA5602D7-A0D3-4013-A653-8499FBA519D5}" dt="2020-11-13T03:07:14.444" v="78" actId="14100"/>
+      <pc:sldChg chg="addSp delSp modSp">
+        <pc:chgData name="Fingerhut, John Andy" userId="6ad675d3-541e-4813-9336-4804cd571dc7" providerId="ADAL" clId="{AB275EFB-7DC9-4E6C-884D-530FD05132B0}" dt="2020-11-13T02:43:14.555" v="143" actId="1076"/>
         <pc:sldMkLst>
           <pc:docMk/>
           <pc:sldMk cId="1091789387" sldId="273"/>
         </pc:sldMkLst>
-        <pc:spChg chg="mod">
-          <ac:chgData name="Fingerhut, John Andy" userId="6ad675d3-541e-4813-9336-4804cd571dc7" providerId="ADAL" clId="{FA5602D7-A0D3-4013-A653-8499FBA519D5}" dt="2020-11-13T03:05:33.168" v="52" actId="20577"/>
+        <pc:spChg chg="del">
+          <ac:chgData name="Fingerhut, John Andy" userId="6ad675d3-541e-4813-9336-4804cd571dc7" providerId="ADAL" clId="{AB275EFB-7DC9-4E6C-884D-530FD05132B0}" dt="2020-11-12T20:44:50.112" v="0" actId="478"/>
           <ac:spMkLst>
             <pc:docMk/>
             <pc:sldMk cId="1091789387" sldId="273"/>
-            <ac:spMk id="9" creationId="{08CD8402-7233-47B1-A1B5-23D2E88AF40D}"/>
+            <ac:spMk id="2" creationId="{2AEA91F8-E15F-47F9-A642-B540FBB86354}"/>
           </ac:spMkLst>
         </pc:spChg>
-        <pc:spChg chg="mod">
-          <ac:chgData name="Fingerhut, John Andy" userId="6ad675d3-541e-4813-9336-4804cd571dc7" providerId="ADAL" clId="{FA5602D7-A0D3-4013-A653-8499FBA519D5}" dt="2020-11-13T03:05:49.881" v="62" actId="255"/>
+        <pc:spChg chg="add del mod">
+          <ac:chgData name="Fingerhut, John Andy" userId="6ad675d3-541e-4813-9336-4804cd571dc7" providerId="ADAL" clId="{AB275EFB-7DC9-4E6C-884D-530FD05132B0}" dt="2020-11-12T20:44:52.494" v="1" actId="478"/>
           <ac:spMkLst>
             <pc:docMk/>
             <pc:sldMk cId="1091789387" sldId="273"/>
-            <ac:spMk id="11" creationId="{C5E0B604-11FA-4D85-8C27-1B6B6D7746A0}"/>
+            <ac:spMk id="5" creationId="{9D40767B-136D-49AC-BC6B-F8B4B25D3336}"/>
           </ac:spMkLst>
         </pc:spChg>
-        <pc:spChg chg="mod">
-          <ac:chgData name="Fingerhut, John Andy" userId="6ad675d3-541e-4813-9336-4804cd571dc7" providerId="ADAL" clId="{FA5602D7-A0D3-4013-A653-8499FBA519D5}" dt="2020-11-13T03:03:43.376" v="2" actId="20577"/>
+        <pc:spChg chg="mod topLvl">
+          <ac:chgData name="Fingerhut, John Andy" userId="6ad675d3-541e-4813-9336-4804cd571dc7" providerId="ADAL" clId="{AB275EFB-7DC9-4E6C-884D-530FD05132B0}" dt="2020-11-13T02:33:45.728" v="78" actId="165"/>
+          <ac:spMkLst>
+            <pc:docMk/>
+            <pc:sldMk cId="1091789387" sldId="273"/>
+            <ac:spMk id="35" creationId="{8EB9B0E0-C169-48B3-BCE6-385310287F99}"/>
+          </ac:spMkLst>
+        </pc:spChg>
+        <pc:spChg chg="mod topLvl">
+          <ac:chgData name="Fingerhut, John Andy" userId="6ad675d3-541e-4813-9336-4804cd571dc7" providerId="ADAL" clId="{AB275EFB-7DC9-4E6C-884D-530FD05132B0}" dt="2020-11-13T02:33:45.728" v="78" actId="165"/>
           <ac:spMkLst>
             <pc:docMk/>
             <pc:sldMk cId="1091789387" sldId="273"/>
             <ac:spMk id="36" creationId="{3ED9F1BC-576A-4EF3-9876-126695A64636}"/>
           </ac:spMkLst>
         </pc:spChg>
-        <pc:spChg chg="mod">
-          <ac:chgData name="Fingerhut, John Andy" userId="6ad675d3-541e-4813-9336-4804cd571dc7" providerId="ADAL" clId="{FA5602D7-A0D3-4013-A653-8499FBA519D5}" dt="2020-11-13T03:03:46.584" v="5" actId="20577"/>
+        <pc:spChg chg="mod topLvl">
+          <ac:chgData name="Fingerhut, John Andy" userId="6ad675d3-541e-4813-9336-4804cd571dc7" providerId="ADAL" clId="{AB275EFB-7DC9-4E6C-884D-530FD05132B0}" dt="2020-11-13T02:33:45.728" v="78" actId="165"/>
           <ac:spMkLst>
             <pc:docMk/>
             <pc:sldMk cId="1091789387" sldId="273"/>
             <ac:spMk id="37" creationId="{FEF6D1E8-CAD9-4D86-8016-9DF9D3A426B1}"/>
           </ac:spMkLst>
         </pc:spChg>
-        <pc:spChg chg="mod">
-          <ac:chgData name="Fingerhut, John Andy" userId="6ad675d3-541e-4813-9336-4804cd571dc7" providerId="ADAL" clId="{FA5602D7-A0D3-4013-A653-8499FBA519D5}" dt="2020-11-13T03:03:55.566" v="9" actId="20577"/>
+        <pc:spChg chg="mod topLvl">
+          <ac:chgData name="Fingerhut, John Andy" userId="6ad675d3-541e-4813-9336-4804cd571dc7" providerId="ADAL" clId="{AB275EFB-7DC9-4E6C-884D-530FD05132B0}" dt="2020-11-13T02:33:45.728" v="78" actId="165"/>
           <ac:spMkLst>
             <pc:docMk/>
             <pc:sldMk cId="1091789387" sldId="273"/>
             <ac:spMk id="40" creationId="{A99932A6-6BD7-4FD1-93C8-8E131159E42A}"/>
           </ac:spMkLst>
         </pc:spChg>
+        <pc:spChg chg="mod topLvl">
+          <ac:chgData name="Fingerhut, John Andy" userId="6ad675d3-541e-4813-9336-4804cd571dc7" providerId="ADAL" clId="{AB275EFB-7DC9-4E6C-884D-530FD05132B0}" dt="2020-11-13T02:33:45.728" v="78" actId="165"/>
+          <ac:spMkLst>
+            <pc:docMk/>
+            <pc:sldMk cId="1091789387" sldId="273"/>
+            <ac:spMk id="41" creationId="{92344D8E-30F6-4766-B972-809C391435CC}"/>
+          </ac:spMkLst>
+        </pc:spChg>
+        <pc:spChg chg="add del mod">
+          <ac:chgData name="Fingerhut, John Andy" userId="6ad675d3-541e-4813-9336-4804cd571dc7" providerId="ADAL" clId="{AB275EFB-7DC9-4E6C-884D-530FD05132B0}" dt="2020-11-13T02:31:29.523" v="49" actId="478"/>
+          <ac:spMkLst>
+            <pc:docMk/>
+            <pc:sldMk cId="1091789387" sldId="273"/>
+            <ac:spMk id="108" creationId="{F7594EFE-CC19-4890-A71C-A356D27742F2}"/>
+          </ac:spMkLst>
+        </pc:spChg>
+        <pc:spChg chg="add del mod">
+          <ac:chgData name="Fingerhut, John Andy" userId="6ad675d3-541e-4813-9336-4804cd571dc7" providerId="ADAL" clId="{AB275EFB-7DC9-4E6C-884D-530FD05132B0}" dt="2020-11-13T02:31:10.509" v="45" actId="478"/>
+          <ac:spMkLst>
+            <pc:docMk/>
+            <pc:sldMk cId="1091789387" sldId="273"/>
+            <ac:spMk id="109" creationId="{8929AB5C-7DBF-4B17-9E8A-36D99FF27FCB}"/>
+          </ac:spMkLst>
+        </pc:spChg>
+        <pc:spChg chg="add mod topLvl">
+          <ac:chgData name="Fingerhut, John Andy" userId="6ad675d3-541e-4813-9336-4804cd571dc7" providerId="ADAL" clId="{AB275EFB-7DC9-4E6C-884D-530FD05132B0}" dt="2020-11-13T02:36:24.018" v="114" actId="1076"/>
+          <ac:spMkLst>
+            <pc:docMk/>
+            <pc:sldMk cId="1091789387" sldId="273"/>
+            <ac:spMk id="110" creationId="{CBF41200-6B39-49A7-85D4-64606C55105F}"/>
+          </ac:spMkLst>
+        </pc:spChg>
+        <pc:spChg chg="add mod topLvl">
+          <ac:chgData name="Fingerhut, John Andy" userId="6ad675d3-541e-4813-9336-4804cd571dc7" providerId="ADAL" clId="{AB275EFB-7DC9-4E6C-884D-530FD05132B0}" dt="2020-11-13T02:36:24.018" v="114" actId="1076"/>
+          <ac:spMkLst>
+            <pc:docMk/>
+            <pc:sldMk cId="1091789387" sldId="273"/>
+            <ac:spMk id="111" creationId="{8EF40A48-3C9D-4A24-A40E-E4870584BA66}"/>
+          </ac:spMkLst>
+        </pc:spChg>
         <pc:spChg chg="mod">
-          <ac:chgData name="Fingerhut, John Andy" userId="6ad675d3-541e-4813-9336-4804cd571dc7" providerId="ADAL" clId="{FA5602D7-A0D3-4013-A653-8499FBA519D5}" dt="2020-11-13T03:06:34.893" v="67" actId="1076"/>
+          <ac:chgData name="Fingerhut, John Andy" userId="6ad675d3-541e-4813-9336-4804cd571dc7" providerId="ADAL" clId="{AB275EFB-7DC9-4E6C-884D-530FD05132B0}" dt="2020-11-13T02:43:14.555" v="143" actId="1076"/>
+          <ac:spMkLst>
+            <pc:docMk/>
+            <pc:sldMk cId="1091789387" sldId="273"/>
+            <ac:spMk id="113" creationId="{58FA7448-7B0F-43F4-A246-03BDB307CBC0}"/>
+          </ac:spMkLst>
+        </pc:spChg>
+        <pc:spChg chg="mod">
+          <ac:chgData name="Fingerhut, John Andy" userId="6ad675d3-541e-4813-9336-4804cd571dc7" providerId="ADAL" clId="{AB275EFB-7DC9-4E6C-884D-530FD05132B0}" dt="2020-11-13T02:43:14.555" v="143" actId="1076"/>
+          <ac:spMkLst>
+            <pc:docMk/>
+            <pc:sldMk cId="1091789387" sldId="273"/>
+            <ac:spMk id="114" creationId="{8981AA32-2977-41CF-9174-51C16EB7A3C1}"/>
+          </ac:spMkLst>
+        </pc:spChg>
+        <pc:spChg chg="add del mod topLvl">
+          <ac:chgData name="Fingerhut, John Andy" userId="6ad675d3-541e-4813-9336-4804cd571dc7" providerId="ADAL" clId="{AB275EFB-7DC9-4E6C-884D-530FD05132B0}" dt="2020-11-13T02:34:43.356" v="103" actId="478"/>
+          <ac:spMkLst>
+            <pc:docMk/>
+            <pc:sldMk cId="1091789387" sldId="273"/>
+            <ac:spMk id="119" creationId="{231B9BC7-9EDF-4A13-BE99-93FD10BE7392}"/>
+          </ac:spMkLst>
+        </pc:spChg>
+        <pc:spChg chg="mod">
+          <ac:chgData name="Fingerhut, John Andy" userId="6ad675d3-541e-4813-9336-4804cd571dc7" providerId="ADAL" clId="{AB275EFB-7DC9-4E6C-884D-530FD05132B0}" dt="2020-11-13T02:27:10.361" v="24" actId="1076"/>
           <ac:spMkLst>
             <pc:docMk/>
             <pc:sldMk cId="1091789387" sldId="273"/>
@@ -731,31 +675,263 @@
           </ac:spMkLst>
         </pc:spChg>
         <pc:spChg chg="mod">
-          <ac:chgData name="Fingerhut, John Andy" userId="6ad675d3-541e-4813-9336-4804cd571dc7" providerId="ADAL" clId="{FA5602D7-A0D3-4013-A653-8499FBA519D5}" dt="2020-11-13T03:07:14.444" v="78" actId="14100"/>
+          <ac:chgData name="Fingerhut, John Andy" userId="6ad675d3-541e-4813-9336-4804cd571dc7" providerId="ADAL" clId="{AB275EFB-7DC9-4E6C-884D-530FD05132B0}" dt="2020-11-13T02:26:12.034" v="17" actId="1076"/>
           <ac:spMkLst>
             <pc:docMk/>
             <pc:sldMk cId="1091789387" sldId="273"/>
             <ac:spMk id="121" creationId="{C5B57169-1275-4E2F-A03B-8F7108AA0A55}"/>
           </ac:spMkLst>
         </pc:spChg>
-        <pc:spChg chg="mod">
-          <ac:chgData name="Fingerhut, John Andy" userId="6ad675d3-541e-4813-9336-4804cd571dc7" providerId="ADAL" clId="{FA5602D7-A0D3-4013-A653-8499FBA519D5}" dt="2020-11-13T03:06:00.859" v="63" actId="207"/>
+        <pc:spChg chg="add mod ord">
+          <ac:chgData name="Fingerhut, John Andy" userId="6ad675d3-541e-4813-9336-4804cd571dc7" providerId="ADAL" clId="{AB275EFB-7DC9-4E6C-884D-530FD05132B0}" dt="2020-11-13T02:36:24.018" v="114" actId="1076"/>
           <ac:spMkLst>
             <pc:docMk/>
             <pc:sldMk cId="1091789387" sldId="273"/>
             <ac:spMk id="148" creationId="{0E3FF64B-C6A6-4736-9847-96B6371F20AE}"/>
           </ac:spMkLst>
         </pc:spChg>
+        <pc:spChg chg="del mod">
+          <ac:chgData name="Fingerhut, John Andy" userId="6ad675d3-541e-4813-9336-4804cd571dc7" providerId="ADAL" clId="{AB275EFB-7DC9-4E6C-884D-530FD05132B0}" dt="2020-11-13T02:29:05.373" v="30" actId="478"/>
+          <ac:spMkLst>
+            <pc:docMk/>
+            <pc:sldMk cId="1091789387" sldId="273"/>
+            <ac:spMk id="185" creationId="{0D2D3C60-4A1A-4E38-8845-024DF1FE79E8}"/>
+          </ac:spMkLst>
+        </pc:spChg>
+        <pc:spChg chg="del mod">
+          <ac:chgData name="Fingerhut, John Andy" userId="6ad675d3-541e-4813-9336-4804cd571dc7" providerId="ADAL" clId="{AB275EFB-7DC9-4E6C-884D-530FD05132B0}" dt="2020-11-13T02:35:24.251" v="106" actId="478"/>
+          <ac:spMkLst>
+            <pc:docMk/>
+            <pc:sldMk cId="1091789387" sldId="273"/>
+            <ac:spMk id="186" creationId="{ECB7CF33-FC02-4C32-970C-EB52B3F817E6}"/>
+          </ac:spMkLst>
+        </pc:spChg>
+        <pc:spChg chg="mod">
+          <ac:chgData name="Fingerhut, John Andy" userId="6ad675d3-541e-4813-9336-4804cd571dc7" providerId="ADAL" clId="{AB275EFB-7DC9-4E6C-884D-530FD05132B0}" dt="2020-11-13T02:36:24.018" v="114" actId="1076"/>
+          <ac:spMkLst>
+            <pc:docMk/>
+            <pc:sldMk cId="1091789387" sldId="273"/>
+            <ac:spMk id="200" creationId="{6143778A-3CAF-4C20-AA59-3CC193DB8BCB}"/>
+          </ac:spMkLst>
+        </pc:spChg>
+        <pc:grpChg chg="del mod">
+          <ac:chgData name="Fingerhut, John Andy" userId="6ad675d3-541e-4813-9336-4804cd571dc7" providerId="ADAL" clId="{AB275EFB-7DC9-4E6C-884D-530FD05132B0}" dt="2020-11-13T02:33:45.728" v="78" actId="165"/>
+          <ac:grpSpMkLst>
+            <pc:docMk/>
+            <pc:sldMk cId="1091789387" sldId="273"/>
+            <ac:grpSpMk id="4" creationId="{8C98B034-85E6-458B-A9FF-1528198EAA1A}"/>
+          </ac:grpSpMkLst>
+        </pc:grpChg>
+        <pc:grpChg chg="mod">
+          <ac:chgData name="Fingerhut, John Andy" userId="6ad675d3-541e-4813-9336-4804cd571dc7" providerId="ADAL" clId="{AB275EFB-7DC9-4E6C-884D-530FD05132B0}" dt="2020-11-13T02:26:52.046" v="22" actId="1076"/>
+          <ac:grpSpMkLst>
+            <pc:docMk/>
+            <pc:sldMk cId="1091789387" sldId="273"/>
+            <ac:grpSpMk id="25" creationId="{D3A54630-E9F6-45DD-998F-E5DC0F14A399}"/>
+          </ac:grpSpMkLst>
+        </pc:grpChg>
+        <pc:grpChg chg="add del mod">
+          <ac:chgData name="Fingerhut, John Andy" userId="6ad675d3-541e-4813-9336-4804cd571dc7" providerId="ADAL" clId="{AB275EFB-7DC9-4E6C-884D-530FD05132B0}" dt="2020-11-13T02:32:10.041" v="51" actId="165"/>
+          <ac:grpSpMkLst>
+            <pc:docMk/>
+            <pc:sldMk cId="1091789387" sldId="273"/>
+            <ac:grpSpMk id="54" creationId="{4C313AC5-98CA-442B-99E2-5839162276A8}"/>
+          </ac:grpSpMkLst>
+        </pc:grpChg>
+        <pc:grpChg chg="mod">
+          <ac:chgData name="Fingerhut, John Andy" userId="6ad675d3-541e-4813-9336-4804cd571dc7" providerId="ADAL" clId="{AB275EFB-7DC9-4E6C-884D-530FD05132B0}" dt="2020-11-13T02:26:22.005" v="18" actId="1076"/>
+          <ac:grpSpMkLst>
+            <pc:docMk/>
+            <pc:sldMk cId="1091789387" sldId="273"/>
+            <ac:grpSpMk id="78" creationId="{45FA8724-A465-47A6-9A0E-9F107AF39809}"/>
+          </ac:grpSpMkLst>
+        </pc:grpChg>
+        <pc:grpChg chg="mod">
+          <ac:chgData name="Fingerhut, John Andy" userId="6ad675d3-541e-4813-9336-4804cd571dc7" providerId="ADAL" clId="{AB275EFB-7DC9-4E6C-884D-530FD05132B0}" dt="2020-11-13T02:36:24.018" v="114" actId="1076"/>
+          <ac:grpSpMkLst>
+            <pc:docMk/>
+            <pc:sldMk cId="1091789387" sldId="273"/>
+            <ac:grpSpMk id="83" creationId="{1C834900-1FBA-4F79-9BAA-4729CB027B15}"/>
+          </ac:grpSpMkLst>
+        </pc:grpChg>
+        <pc:grpChg chg="add del mod">
+          <ac:chgData name="Fingerhut, John Andy" userId="6ad675d3-541e-4813-9336-4804cd571dc7" providerId="ADAL" clId="{AB275EFB-7DC9-4E6C-884D-530FD05132B0}" dt="2020-11-13T02:33:22.076" v="59" actId="478"/>
+          <ac:grpSpMkLst>
+            <pc:docMk/>
+            <pc:sldMk cId="1091789387" sldId="273"/>
+            <ac:grpSpMk id="129" creationId="{98392EC4-FA1F-4A23-88AF-294263B04611}"/>
+          </ac:grpSpMkLst>
+        </pc:grpChg>
+        <pc:grpChg chg="add mod">
+          <ac:chgData name="Fingerhut, John Andy" userId="6ad675d3-541e-4813-9336-4804cd571dc7" providerId="ADAL" clId="{AB275EFB-7DC9-4E6C-884D-530FD05132B0}" dt="2020-11-13T02:40:36.673" v="137" actId="164"/>
+          <ac:grpSpMkLst>
+            <pc:docMk/>
+            <pc:sldMk cId="1091789387" sldId="273"/>
+            <ac:grpSpMk id="163" creationId="{8608615B-EB0D-4D19-94C6-BA8F0B161E4B}"/>
+          </ac:grpSpMkLst>
+        </pc:grpChg>
+        <pc:grpChg chg="add mod">
+          <ac:chgData name="Fingerhut, John Andy" userId="6ad675d3-541e-4813-9336-4804cd571dc7" providerId="ADAL" clId="{AB275EFB-7DC9-4E6C-884D-530FD05132B0}" dt="2020-11-13T02:41:10.275" v="142" actId="1076"/>
+          <ac:grpSpMkLst>
+            <pc:docMk/>
+            <pc:sldMk cId="1091789387" sldId="273"/>
+            <ac:grpSpMk id="177" creationId="{AAC1F68D-05B8-4B51-8587-059500FE3478}"/>
+          </ac:grpSpMkLst>
+        </pc:grpChg>
+        <pc:cxnChg chg="add mod">
+          <ac:chgData name="Fingerhut, John Andy" userId="6ad675d3-541e-4813-9336-4804cd571dc7" providerId="ADAL" clId="{AB275EFB-7DC9-4E6C-884D-530FD05132B0}" dt="2020-11-13T02:25:45.321" v="14" actId="1076"/>
+          <ac:cxnSpMkLst>
+            <pc:docMk/>
+            <pc:sldMk cId="1091789387" sldId="273"/>
+            <ac:cxnSpMk id="17" creationId="{415C7822-4030-42AD-AB86-5852B4DD265D}"/>
+          </ac:cxnSpMkLst>
+        </pc:cxnChg>
+        <pc:cxnChg chg="mod topLvl">
+          <ac:chgData name="Fingerhut, John Andy" userId="6ad675d3-541e-4813-9336-4804cd571dc7" providerId="ADAL" clId="{AB275EFB-7DC9-4E6C-884D-530FD05132B0}" dt="2020-11-13T02:33:45.728" v="78" actId="165"/>
+          <ac:cxnSpMkLst>
+            <pc:docMk/>
+            <pc:sldMk cId="1091789387" sldId="273"/>
+            <ac:cxnSpMk id="43" creationId="{9FEFDBCA-8D42-4559-B5B7-7B17A99615BD}"/>
+          </ac:cxnSpMkLst>
+        </pc:cxnChg>
+        <pc:cxnChg chg="mod topLvl">
+          <ac:chgData name="Fingerhut, John Andy" userId="6ad675d3-541e-4813-9336-4804cd571dc7" providerId="ADAL" clId="{AB275EFB-7DC9-4E6C-884D-530FD05132B0}" dt="2020-11-13T02:33:45.728" v="78" actId="165"/>
+          <ac:cxnSpMkLst>
+            <pc:docMk/>
+            <pc:sldMk cId="1091789387" sldId="273"/>
+            <ac:cxnSpMk id="49" creationId="{265B6322-C564-4122-876E-0B2152445370}"/>
+          </ac:cxnSpMkLst>
+        </pc:cxnChg>
+        <pc:cxnChg chg="mod topLvl">
+          <ac:chgData name="Fingerhut, John Andy" userId="6ad675d3-541e-4813-9336-4804cd571dc7" providerId="ADAL" clId="{AB275EFB-7DC9-4E6C-884D-530FD05132B0}" dt="2020-11-13T02:33:45.728" v="78" actId="165"/>
+          <ac:cxnSpMkLst>
+            <pc:docMk/>
+            <pc:sldMk cId="1091789387" sldId="273"/>
+            <ac:cxnSpMk id="50" creationId="{516664ED-D0D4-46ED-91FF-5BDE567A773D}"/>
+          </ac:cxnSpMkLst>
+        </pc:cxnChg>
         <pc:cxnChg chg="mod">
-          <ac:chgData name="Fingerhut, John Andy" userId="6ad675d3-541e-4813-9336-4804cd571dc7" providerId="ADAL" clId="{FA5602D7-A0D3-4013-A653-8499FBA519D5}" dt="2020-11-13T03:06:34.893" v="67" actId="1076"/>
+          <ac:chgData name="Fingerhut, John Andy" userId="6ad675d3-541e-4813-9336-4804cd571dc7" providerId="ADAL" clId="{AB275EFB-7DC9-4E6C-884D-530FD05132B0}" dt="2020-11-13T02:32:40.016" v="55" actId="14100"/>
+          <ac:cxnSpMkLst>
+            <pc:docMk/>
+            <pc:sldMk cId="1091789387" sldId="273"/>
+            <ac:cxnSpMk id="80" creationId="{236BE345-2EA6-45DD-85B2-ACD4C19A91F5}"/>
+          </ac:cxnSpMkLst>
+        </pc:cxnChg>
+        <pc:cxnChg chg="del mod">
+          <ac:chgData name="Fingerhut, John Andy" userId="6ad675d3-541e-4813-9336-4804cd571dc7" providerId="ADAL" clId="{AB275EFB-7DC9-4E6C-884D-530FD05132B0}" dt="2020-11-13T02:30:07.584" v="37" actId="478"/>
+          <ac:cxnSpMkLst>
+            <pc:docMk/>
+            <pc:sldMk cId="1091789387" sldId="273"/>
+            <ac:cxnSpMk id="99" creationId="{4E52AAC9-DA09-4876-83F9-7D79F7233425}"/>
+          </ac:cxnSpMkLst>
+        </pc:cxnChg>
+        <pc:cxnChg chg="mod">
+          <ac:chgData name="Fingerhut, John Andy" userId="6ad675d3-541e-4813-9336-4804cd571dc7" providerId="ADAL" clId="{AB275EFB-7DC9-4E6C-884D-530FD05132B0}" dt="2020-11-13T02:36:44.586" v="116" actId="14100"/>
+          <ac:cxnSpMkLst>
+            <pc:docMk/>
+            <pc:sldMk cId="1091789387" sldId="273"/>
+            <ac:cxnSpMk id="100" creationId="{F4860C18-D645-4EE6-BCDB-79FE3B828918}"/>
+          </ac:cxnSpMkLst>
+        </pc:cxnChg>
+        <pc:cxnChg chg="del mod">
+          <ac:chgData name="Fingerhut, John Andy" userId="6ad675d3-541e-4813-9336-4804cd571dc7" providerId="ADAL" clId="{AB275EFB-7DC9-4E6C-884D-530FD05132B0}" dt="2020-11-13T02:30:11.015" v="38" actId="478"/>
+          <ac:cxnSpMkLst>
+            <pc:docMk/>
+            <pc:sldMk cId="1091789387" sldId="273"/>
+            <ac:cxnSpMk id="101" creationId="{372B96BA-804B-4311-BE3B-F167BF926D92}"/>
+          </ac:cxnSpMkLst>
+        </pc:cxnChg>
+        <pc:cxnChg chg="add del mod">
+          <ac:chgData name="Fingerhut, John Andy" userId="6ad675d3-541e-4813-9336-4804cd571dc7" providerId="ADAL" clId="{AB275EFB-7DC9-4E6C-884D-530FD05132B0}" dt="2020-11-13T02:25:06.734" v="9" actId="478"/>
+          <ac:cxnSpMkLst>
+            <pc:docMk/>
+            <pc:sldMk cId="1091789387" sldId="273"/>
+            <ac:cxnSpMk id="102" creationId="{E0BDF171-929B-4438-8B10-352CE8D0C7DE}"/>
+          </ac:cxnSpMkLst>
+        </pc:cxnChg>
+        <pc:cxnChg chg="add del mod">
+          <ac:chgData name="Fingerhut, John Andy" userId="6ad675d3-541e-4813-9336-4804cd571dc7" providerId="ADAL" clId="{AB275EFB-7DC9-4E6C-884D-530FD05132B0}" dt="2020-11-13T02:37:19.367" v="118" actId="478"/>
+          <ac:cxnSpMkLst>
+            <pc:docMk/>
+            <pc:sldMk cId="1091789387" sldId="273"/>
+            <ac:cxnSpMk id="103" creationId="{5EDE3D83-7DA1-468B-9B2D-6BC31D94DBA2}"/>
+          </ac:cxnSpMkLst>
+        </pc:cxnChg>
+        <pc:cxnChg chg="add mod">
+          <ac:chgData name="Fingerhut, John Andy" userId="6ad675d3-541e-4813-9336-4804cd571dc7" providerId="ADAL" clId="{AB275EFB-7DC9-4E6C-884D-530FD05132B0}" dt="2020-11-13T02:40:36.673" v="137" actId="164"/>
+          <ac:cxnSpMkLst>
+            <pc:docMk/>
+            <pc:sldMk cId="1091789387" sldId="273"/>
+            <ac:cxnSpMk id="105" creationId="{AAD870DC-10F4-46EA-8DD1-22D68B525CA7}"/>
+          </ac:cxnSpMkLst>
+        </pc:cxnChg>
+        <pc:cxnChg chg="add mod topLvl">
+          <ac:chgData name="Fingerhut, John Andy" userId="6ad675d3-541e-4813-9336-4804cd571dc7" providerId="ADAL" clId="{AB275EFB-7DC9-4E6C-884D-530FD05132B0}" dt="2020-11-13T02:36:24.018" v="114" actId="1076"/>
+          <ac:cxnSpMkLst>
+            <pc:docMk/>
+            <pc:sldMk cId="1091789387" sldId="273"/>
+            <ac:cxnSpMk id="112" creationId="{C64DEB71-3093-431E-88AF-4C2BE81668EF}"/>
+          </ac:cxnSpMkLst>
+        </pc:cxnChg>
+        <pc:cxnChg chg="add mod topLvl">
+          <ac:chgData name="Fingerhut, John Andy" userId="6ad675d3-541e-4813-9336-4804cd571dc7" providerId="ADAL" clId="{AB275EFB-7DC9-4E6C-884D-530FD05132B0}" dt="2020-11-13T02:36:24.018" v="114" actId="1076"/>
+          <ac:cxnSpMkLst>
+            <pc:docMk/>
+            <pc:sldMk cId="1091789387" sldId="273"/>
+            <ac:cxnSpMk id="115" creationId="{368C70F1-7509-412A-8F1A-A518E73EEB07}"/>
+          </ac:cxnSpMkLst>
+        </pc:cxnChg>
+        <pc:cxnChg chg="add mod topLvl">
+          <ac:chgData name="Fingerhut, John Andy" userId="6ad675d3-541e-4813-9336-4804cd571dc7" providerId="ADAL" clId="{AB275EFB-7DC9-4E6C-884D-530FD05132B0}" dt="2020-11-13T02:36:24.018" v="114" actId="1076"/>
+          <ac:cxnSpMkLst>
+            <pc:docMk/>
+            <pc:sldMk cId="1091789387" sldId="273"/>
+            <ac:cxnSpMk id="116" creationId="{D6EAE7FF-ED18-4376-A74D-07B093B5896D}"/>
+          </ac:cxnSpMkLst>
+        </pc:cxnChg>
+        <pc:cxnChg chg="add mod topLvl">
+          <ac:chgData name="Fingerhut, John Andy" userId="6ad675d3-541e-4813-9336-4804cd571dc7" providerId="ADAL" clId="{AB275EFB-7DC9-4E6C-884D-530FD05132B0}" dt="2020-11-13T02:36:24.018" v="114" actId="1076"/>
+          <ac:cxnSpMkLst>
+            <pc:docMk/>
+            <pc:sldMk cId="1091789387" sldId="273"/>
+            <ac:cxnSpMk id="117" creationId="{2B8B9C9F-8E4C-4C30-AB47-9A5A956DF566}"/>
+          </ac:cxnSpMkLst>
+        </pc:cxnChg>
+        <pc:cxnChg chg="add mod topLvl">
+          <ac:chgData name="Fingerhut, John Andy" userId="6ad675d3-541e-4813-9336-4804cd571dc7" providerId="ADAL" clId="{AB275EFB-7DC9-4E6C-884D-530FD05132B0}" dt="2020-11-13T02:36:24.018" v="114" actId="1076"/>
+          <ac:cxnSpMkLst>
+            <pc:docMk/>
+            <pc:sldMk cId="1091789387" sldId="273"/>
+            <ac:cxnSpMk id="118" creationId="{40462665-FCF8-4E8C-943A-0EF224BA3563}"/>
+          </ac:cxnSpMkLst>
+        </pc:cxnChg>
+        <pc:cxnChg chg="add del mod topLvl">
+          <ac:chgData name="Fingerhut, John Andy" userId="6ad675d3-541e-4813-9336-4804cd571dc7" providerId="ADAL" clId="{AB275EFB-7DC9-4E6C-884D-530FD05132B0}" dt="2020-11-13T02:32:18.911" v="53" actId="478"/>
+          <ac:cxnSpMkLst>
+            <pc:docMk/>
+            <pc:sldMk cId="1091789387" sldId="273"/>
+            <ac:cxnSpMk id="122" creationId="{343BA56B-7295-492E-94C2-9EA9D40F5D2A}"/>
+          </ac:cxnSpMkLst>
+        </pc:cxnChg>
+        <pc:cxnChg chg="mod">
+          <ac:chgData name="Fingerhut, John Andy" userId="6ad675d3-541e-4813-9336-4804cd571dc7" providerId="ADAL" clId="{AB275EFB-7DC9-4E6C-884D-530FD05132B0}" dt="2020-11-13T02:27:10.361" v="24" actId="1076"/>
           <ac:cxnSpMkLst>
             <pc:docMk/>
             <pc:sldMk cId="1091789387" sldId="273"/>
             <ac:cxnSpMk id="123" creationId="{64C4D15B-D90A-42A1-857E-79AACC8E1ED6}"/>
           </ac:cxnSpMkLst>
         </pc:cxnChg>
+        <pc:cxnChg chg="add mod">
+          <ac:chgData name="Fingerhut, John Andy" userId="6ad675d3-541e-4813-9336-4804cd571dc7" providerId="ADAL" clId="{AB275EFB-7DC9-4E6C-884D-530FD05132B0}" dt="2020-11-13T02:40:36.673" v="137" actId="164"/>
+          <ac:cxnSpMkLst>
+            <pc:docMk/>
+            <pc:sldMk cId="1091789387" sldId="273"/>
+            <ac:cxnSpMk id="126" creationId="{6D1D99B2-0E86-47B6-9123-9267435A5C00}"/>
+          </ac:cxnSpMkLst>
+        </pc:cxnChg>
         <pc:cxnChg chg="mod">
-          <ac:chgData name="Fingerhut, John Andy" userId="6ad675d3-541e-4813-9336-4804cd571dc7" providerId="ADAL" clId="{FA5602D7-A0D3-4013-A653-8499FBA519D5}" dt="2020-11-13T03:06:34.893" v="67" actId="1076"/>
+          <ac:chgData name="Fingerhut, John Andy" userId="6ad675d3-541e-4813-9336-4804cd571dc7" providerId="ADAL" clId="{AB275EFB-7DC9-4E6C-884D-530FD05132B0}" dt="2020-11-13T02:27:10.361" v="24" actId="1076"/>
           <ac:cxnSpMkLst>
             <pc:docMk/>
             <pc:sldMk cId="1091789387" sldId="273"/>
@@ -763,19 +939,75 @@
           </ac:cxnSpMkLst>
         </pc:cxnChg>
         <pc:cxnChg chg="mod">
-          <ac:chgData name="Fingerhut, John Andy" userId="6ad675d3-541e-4813-9336-4804cd571dc7" providerId="ADAL" clId="{FA5602D7-A0D3-4013-A653-8499FBA519D5}" dt="2020-11-13T03:07:14.444" v="78" actId="14100"/>
+          <ac:chgData name="Fingerhut, John Andy" userId="6ad675d3-541e-4813-9336-4804cd571dc7" providerId="ADAL" clId="{AB275EFB-7DC9-4E6C-884D-530FD05132B0}" dt="2020-11-13T02:26:22.005" v="18" actId="1076"/>
           <ac:cxnSpMkLst>
             <pc:docMk/>
             <pc:sldMk cId="1091789387" sldId="273"/>
             <ac:cxnSpMk id="134" creationId="{6C8D7A4A-4E00-4E2B-A752-9407B9B8DC70}"/>
           </ac:cxnSpMkLst>
         </pc:cxnChg>
+        <pc:cxnChg chg="add mod">
+          <ac:chgData name="Fingerhut, John Andy" userId="6ad675d3-541e-4813-9336-4804cd571dc7" providerId="ADAL" clId="{AB275EFB-7DC9-4E6C-884D-530FD05132B0}" dt="2020-11-13T02:40:36.673" v="137" actId="164"/>
+          <ac:cxnSpMkLst>
+            <pc:docMk/>
+            <pc:sldMk cId="1091789387" sldId="273"/>
+            <ac:cxnSpMk id="150" creationId="{A5C1AA9D-F6C3-45F8-8EF2-65A29333F671}"/>
+          </ac:cxnSpMkLst>
+        </pc:cxnChg>
+        <pc:cxnChg chg="del mod">
+          <ac:chgData name="Fingerhut, John Andy" userId="6ad675d3-541e-4813-9336-4804cd571dc7" providerId="ADAL" clId="{AB275EFB-7DC9-4E6C-884D-530FD05132B0}" dt="2020-11-13T02:24:39.312" v="3" actId="478"/>
+          <ac:cxnSpMkLst>
+            <pc:docMk/>
+            <pc:sldMk cId="1091789387" sldId="273"/>
+            <ac:cxnSpMk id="152" creationId="{B78C3C32-E93B-4B8E-B3FB-91631530F501}"/>
+          </ac:cxnSpMkLst>
+        </pc:cxnChg>
+        <pc:cxnChg chg="add del mod">
+          <ac:chgData name="Fingerhut, John Andy" userId="6ad675d3-541e-4813-9336-4804cd571dc7" providerId="ADAL" clId="{AB275EFB-7DC9-4E6C-884D-530FD05132B0}" dt="2020-11-13T02:40:39.551" v="138" actId="478"/>
+          <ac:cxnSpMkLst>
+            <pc:docMk/>
+            <pc:sldMk cId="1091789387" sldId="273"/>
+            <ac:cxnSpMk id="158" creationId="{057CCE7E-0FB4-4C48-A5A0-75865AAA0293}"/>
+          </ac:cxnSpMkLst>
+        </pc:cxnChg>
         <pc:cxnChg chg="mod">
-          <ac:chgData name="Fingerhut, John Andy" userId="6ad675d3-541e-4813-9336-4804cd571dc7" providerId="ADAL" clId="{FA5602D7-A0D3-4013-A653-8499FBA519D5}" dt="2020-11-13T03:07:14.444" v="78" actId="14100"/>
+          <ac:chgData name="Fingerhut, John Andy" userId="6ad675d3-541e-4813-9336-4804cd571dc7" providerId="ADAL" clId="{AB275EFB-7DC9-4E6C-884D-530FD05132B0}" dt="2020-11-13T02:26:12.034" v="17" actId="1076"/>
           <ac:cxnSpMkLst>
             <pc:docMk/>
             <pc:sldMk cId="1091789387" sldId="273"/>
             <ac:cxnSpMk id="181" creationId="{90B81CF6-C291-4A3A-8CFF-4322DFD54B64}"/>
+          </ac:cxnSpMkLst>
+        </pc:cxnChg>
+        <pc:cxnChg chg="del mod">
+          <ac:chgData name="Fingerhut, John Andy" userId="6ad675d3-541e-4813-9336-4804cd571dc7" providerId="ADAL" clId="{AB275EFB-7DC9-4E6C-884D-530FD05132B0}" dt="2020-11-13T02:35:24.251" v="106" actId="478"/>
+          <ac:cxnSpMkLst>
+            <pc:docMk/>
+            <pc:sldMk cId="1091789387" sldId="273"/>
+            <ac:cxnSpMk id="188" creationId="{F0E47CE2-D6D5-43FB-9807-E7C9B02BC145}"/>
+          </ac:cxnSpMkLst>
+        </pc:cxnChg>
+        <pc:cxnChg chg="del mod">
+          <ac:chgData name="Fingerhut, John Andy" userId="6ad675d3-541e-4813-9336-4804cd571dc7" providerId="ADAL" clId="{AB275EFB-7DC9-4E6C-884D-530FD05132B0}" dt="2020-11-13T02:31:27.379" v="48" actId="478"/>
+          <ac:cxnSpMkLst>
+            <pc:docMk/>
+            <pc:sldMk cId="1091789387" sldId="273"/>
+            <ac:cxnSpMk id="190" creationId="{7F571AFD-BF02-4176-A6A5-D77F4EF8C405}"/>
+          </ac:cxnSpMkLst>
+        </pc:cxnChg>
+        <pc:cxnChg chg="mod">
+          <ac:chgData name="Fingerhut, John Andy" userId="6ad675d3-541e-4813-9336-4804cd571dc7" providerId="ADAL" clId="{AB275EFB-7DC9-4E6C-884D-530FD05132B0}" dt="2020-11-13T02:36:24.018" v="114" actId="1076"/>
+          <ac:cxnSpMkLst>
+            <pc:docMk/>
+            <pc:sldMk cId="1091789387" sldId="273"/>
+            <ac:cxnSpMk id="196" creationId="{C4648FD0-BE39-49B2-A297-6987E7ED42BA}"/>
+          </ac:cxnSpMkLst>
+        </pc:cxnChg>
+        <pc:cxnChg chg="mod">
+          <ac:chgData name="Fingerhut, John Andy" userId="6ad675d3-541e-4813-9336-4804cd571dc7" providerId="ADAL" clId="{AB275EFB-7DC9-4E6C-884D-530FD05132B0}" dt="2020-11-13T02:36:24.018" v="114" actId="1076"/>
+          <ac:cxnSpMkLst>
+            <pc:docMk/>
+            <pc:sldMk cId="1091789387" sldId="273"/>
+            <ac:cxnSpMk id="199" creationId="{9B56D066-03B7-4AA5-AE48-439E5D95D240}"/>
           </ac:cxnSpMkLst>
         </pc:cxnChg>
       </pc:sldChg>
@@ -2355,238 +2587,6 @@
             <ac:spMk id="99" creationId="{F119881B-0804-466A-A54F-F276C61F4704}"/>
           </ac:spMkLst>
         </pc:spChg>
-      </pc:sldChg>
-    </pc:docChg>
-  </pc:docChgLst>
-  <pc:docChgLst>
-    <pc:chgData name="Fingerhut, John Andy" userId="6ad675d3-541e-4813-9336-4804cd571dc7" providerId="ADAL" clId="{4F0530BD-8DBC-4E4A-AD8B-324142F9DCDB}"/>
-    <pc:docChg chg="undo custSel modSld">
-      <pc:chgData name="Fingerhut, John Andy" userId="6ad675d3-541e-4813-9336-4804cd571dc7" providerId="ADAL" clId="{4F0530BD-8DBC-4E4A-AD8B-324142F9DCDB}" dt="2020-11-22T04:40:14.518" v="93" actId="14100"/>
-      <pc:docMkLst>
-        <pc:docMk/>
-      </pc:docMkLst>
-      <pc:sldChg chg="addSp delSp modSp">
-        <pc:chgData name="Fingerhut, John Andy" userId="6ad675d3-541e-4813-9336-4804cd571dc7" providerId="ADAL" clId="{4F0530BD-8DBC-4E4A-AD8B-324142F9DCDB}" dt="2020-11-22T04:40:14.518" v="93" actId="14100"/>
-        <pc:sldMkLst>
-          <pc:docMk/>
-          <pc:sldMk cId="1091789387" sldId="273"/>
-        </pc:sldMkLst>
-        <pc:spChg chg="add mod">
-          <ac:chgData name="Fingerhut, John Andy" userId="6ad675d3-541e-4813-9336-4804cd571dc7" providerId="ADAL" clId="{4F0530BD-8DBC-4E4A-AD8B-324142F9DCDB}" dt="2020-11-22T04:38:32.021" v="73" actId="20577"/>
-          <ac:spMkLst>
-            <pc:docMk/>
-            <pc:sldMk cId="1091789387" sldId="273"/>
-            <ac:spMk id="101" creationId="{5BEE2C53-F970-432C-9EF0-B16395497DDB}"/>
-          </ac:spMkLst>
-        </pc:spChg>
-        <pc:spChg chg="add mod">
-          <ac:chgData name="Fingerhut, John Andy" userId="6ad675d3-541e-4813-9336-4804cd571dc7" providerId="ADAL" clId="{4F0530BD-8DBC-4E4A-AD8B-324142F9DCDB}" dt="2020-11-22T04:40:14.518" v="93" actId="14100"/>
-          <ac:spMkLst>
-            <pc:docMk/>
-            <pc:sldMk cId="1091789387" sldId="273"/>
-            <ac:spMk id="107" creationId="{A6F5D3B7-9CD0-4224-9762-C76C79E1371B}"/>
-          </ac:spMkLst>
-        </pc:spChg>
-        <pc:spChg chg="mod">
-          <ac:chgData name="Fingerhut, John Andy" userId="6ad675d3-541e-4813-9336-4804cd571dc7" providerId="ADAL" clId="{4F0530BD-8DBC-4E4A-AD8B-324142F9DCDB}" dt="2020-11-22T04:17:51.475" v="13" actId="1076"/>
-          <ac:spMkLst>
-            <pc:docMk/>
-            <pc:sldMk cId="1091789387" sldId="273"/>
-            <ac:spMk id="110" creationId="{CBF41200-6B39-49A7-85D4-64606C55105F}"/>
-          </ac:spMkLst>
-        </pc:spChg>
-        <pc:spChg chg="mod">
-          <ac:chgData name="Fingerhut, John Andy" userId="6ad675d3-541e-4813-9336-4804cd571dc7" providerId="ADAL" clId="{4F0530BD-8DBC-4E4A-AD8B-324142F9DCDB}" dt="2020-11-22T04:17:51.475" v="13" actId="1076"/>
-          <ac:spMkLst>
-            <pc:docMk/>
-            <pc:sldMk cId="1091789387" sldId="273"/>
-            <ac:spMk id="111" creationId="{8EF40A48-3C9D-4A24-A40E-E4870584BA66}"/>
-          </ac:spMkLst>
-        </pc:spChg>
-        <pc:spChg chg="mod">
-          <ac:chgData name="Fingerhut, John Andy" userId="6ad675d3-541e-4813-9336-4804cd571dc7" providerId="ADAL" clId="{4F0530BD-8DBC-4E4A-AD8B-324142F9DCDB}" dt="2020-11-22T04:17:51.475" v="13" actId="1076"/>
-          <ac:spMkLst>
-            <pc:docMk/>
-            <pc:sldMk cId="1091789387" sldId="273"/>
-            <ac:spMk id="113" creationId="{58FA7448-7B0F-43F4-A246-03BDB307CBC0}"/>
-          </ac:spMkLst>
-        </pc:spChg>
-        <pc:spChg chg="mod">
-          <ac:chgData name="Fingerhut, John Andy" userId="6ad675d3-541e-4813-9336-4804cd571dc7" providerId="ADAL" clId="{4F0530BD-8DBC-4E4A-AD8B-324142F9DCDB}" dt="2020-11-22T04:17:51.475" v="13" actId="1076"/>
-          <ac:spMkLst>
-            <pc:docMk/>
-            <pc:sldMk cId="1091789387" sldId="273"/>
-            <ac:spMk id="114" creationId="{8981AA32-2977-41CF-9174-51C16EB7A3C1}"/>
-          </ac:spMkLst>
-        </pc:spChg>
-        <pc:spChg chg="add del">
-          <ac:chgData name="Fingerhut, John Andy" userId="6ad675d3-541e-4813-9336-4804cd571dc7" providerId="ADAL" clId="{4F0530BD-8DBC-4E4A-AD8B-324142F9DCDB}" dt="2020-11-22T04:19:37.666" v="21"/>
-          <ac:spMkLst>
-            <pc:docMk/>
-            <pc:sldMk cId="1091789387" sldId="273"/>
-            <ac:spMk id="119" creationId="{88E29AD1-43B3-485D-B363-3F6436D907E7}"/>
-          </ac:spMkLst>
-        </pc:spChg>
-        <pc:spChg chg="add mod">
-          <ac:chgData name="Fingerhut, John Andy" userId="6ad675d3-541e-4813-9336-4804cd571dc7" providerId="ADAL" clId="{4F0530BD-8DBC-4E4A-AD8B-324142F9DCDB}" dt="2020-11-22T04:20:54.462" v="49" actId="1076"/>
-          <ac:spMkLst>
-            <pc:docMk/>
-            <pc:sldMk cId="1091789387" sldId="273"/>
-            <ac:spMk id="122" creationId="{AAFB021B-F573-4955-A61C-CA26210E375D}"/>
-          </ac:spMkLst>
-        </pc:spChg>
-        <pc:spChg chg="mod">
-          <ac:chgData name="Fingerhut, John Andy" userId="6ad675d3-541e-4813-9336-4804cd571dc7" providerId="ADAL" clId="{4F0530BD-8DBC-4E4A-AD8B-324142F9DCDB}" dt="2020-11-22T04:17:51.475" v="13" actId="1076"/>
-          <ac:spMkLst>
-            <pc:docMk/>
-            <pc:sldMk cId="1091789387" sldId="273"/>
-            <ac:spMk id="148" creationId="{0E3FF64B-C6A6-4736-9847-96B6371F20AE}"/>
-          </ac:spMkLst>
-        </pc:spChg>
-        <pc:spChg chg="mod">
-          <ac:chgData name="Fingerhut, John Andy" userId="6ad675d3-541e-4813-9336-4804cd571dc7" providerId="ADAL" clId="{4F0530BD-8DBC-4E4A-AD8B-324142F9DCDB}" dt="2020-11-22T04:38:36.499" v="75" actId="20577"/>
-          <ac:spMkLst>
-            <pc:docMk/>
-            <pc:sldMk cId="1091789387" sldId="273"/>
-            <ac:spMk id="200" creationId="{6143778A-3CAF-4C20-AA59-3CC193DB8BCB}"/>
-          </ac:spMkLst>
-        </pc:spChg>
-        <pc:grpChg chg="mod">
-          <ac:chgData name="Fingerhut, John Andy" userId="6ad675d3-541e-4813-9336-4804cd571dc7" providerId="ADAL" clId="{4F0530BD-8DBC-4E4A-AD8B-324142F9DCDB}" dt="2020-11-22T04:17:51.475" v="13" actId="1076"/>
-          <ac:grpSpMkLst>
-            <pc:docMk/>
-            <pc:sldMk cId="1091789387" sldId="273"/>
-            <ac:grpSpMk id="25" creationId="{D3A54630-E9F6-45DD-998F-E5DC0F14A399}"/>
-          </ac:grpSpMkLst>
-        </pc:grpChg>
-        <pc:grpChg chg="mod">
-          <ac:chgData name="Fingerhut, John Andy" userId="6ad675d3-541e-4813-9336-4804cd571dc7" providerId="ADAL" clId="{4F0530BD-8DBC-4E4A-AD8B-324142F9DCDB}" dt="2020-11-22T04:17:51.475" v="13" actId="1076"/>
-          <ac:grpSpMkLst>
-            <pc:docMk/>
-            <pc:sldMk cId="1091789387" sldId="273"/>
-            <ac:grpSpMk id="83" creationId="{1C834900-1FBA-4F79-9BAA-4729CB027B15}"/>
-          </ac:grpSpMkLst>
-        </pc:grpChg>
-        <pc:grpChg chg="mod">
-          <ac:chgData name="Fingerhut, John Andy" userId="6ad675d3-541e-4813-9336-4804cd571dc7" providerId="ADAL" clId="{4F0530BD-8DBC-4E4A-AD8B-324142F9DCDB}" dt="2020-11-22T04:18:39.163" v="17" actId="14100"/>
-          <ac:grpSpMkLst>
-            <pc:docMk/>
-            <pc:sldMk cId="1091789387" sldId="273"/>
-            <ac:grpSpMk id="163" creationId="{8608615B-EB0D-4D19-94C6-BA8F0B161E4B}"/>
-          </ac:grpSpMkLst>
-        </pc:grpChg>
-        <pc:grpChg chg="mod">
-          <ac:chgData name="Fingerhut, John Andy" userId="6ad675d3-541e-4813-9336-4804cd571dc7" providerId="ADAL" clId="{4F0530BD-8DBC-4E4A-AD8B-324142F9DCDB}" dt="2020-11-22T04:17:51.475" v="13" actId="1076"/>
-          <ac:grpSpMkLst>
-            <pc:docMk/>
-            <pc:sldMk cId="1091789387" sldId="273"/>
-            <ac:grpSpMk id="177" creationId="{AAC1F68D-05B8-4B51-8587-059500FE3478}"/>
-          </ac:grpSpMkLst>
-        </pc:grpChg>
-        <pc:cxnChg chg="mod">
-          <ac:chgData name="Fingerhut, John Andy" userId="6ad675d3-541e-4813-9336-4804cd571dc7" providerId="ADAL" clId="{4F0530BD-8DBC-4E4A-AD8B-324142F9DCDB}" dt="2020-11-22T04:18:22.037" v="15" actId="14100"/>
-          <ac:cxnSpMkLst>
-            <pc:docMk/>
-            <pc:sldMk cId="1091789387" sldId="273"/>
-            <ac:cxnSpMk id="80" creationId="{236BE345-2EA6-45DD-85B2-ACD4C19A91F5}"/>
-          </ac:cxnSpMkLst>
-        </pc:cxnChg>
-        <pc:cxnChg chg="add mod">
-          <ac:chgData name="Fingerhut, John Andy" userId="6ad675d3-541e-4813-9336-4804cd571dc7" providerId="ADAL" clId="{4F0530BD-8DBC-4E4A-AD8B-324142F9DCDB}" dt="2020-11-22T04:18:53.447" v="18" actId="692"/>
-          <ac:cxnSpMkLst>
-            <pc:docMk/>
-            <pc:sldMk cId="1091789387" sldId="273"/>
-            <ac:cxnSpMk id="99" creationId="{ADD4493A-5BBC-4D15-B581-A433EADD11C6}"/>
-          </ac:cxnSpMkLst>
-        </pc:cxnChg>
-        <pc:cxnChg chg="mod">
-          <ac:chgData name="Fingerhut, John Andy" userId="6ad675d3-541e-4813-9336-4804cd571dc7" providerId="ADAL" clId="{4F0530BD-8DBC-4E4A-AD8B-324142F9DCDB}" dt="2020-11-22T04:17:51.475" v="13" actId="1076"/>
-          <ac:cxnSpMkLst>
-            <pc:docMk/>
-            <pc:sldMk cId="1091789387" sldId="273"/>
-            <ac:cxnSpMk id="100" creationId="{F4860C18-D645-4EE6-BCDB-79FE3B828918}"/>
-          </ac:cxnSpMkLst>
-        </pc:cxnChg>
-        <pc:cxnChg chg="add mod">
-          <ac:chgData name="Fingerhut, John Andy" userId="6ad675d3-541e-4813-9336-4804cd571dc7" providerId="ADAL" clId="{4F0530BD-8DBC-4E4A-AD8B-324142F9DCDB}" dt="2020-11-22T04:39:04.966" v="80" actId="14100"/>
-          <ac:cxnSpMkLst>
-            <pc:docMk/>
-            <pc:sldMk cId="1091789387" sldId="273"/>
-            <ac:cxnSpMk id="102" creationId="{EB96FCB9-19D5-432B-B874-01E971C45BF4}"/>
-          </ac:cxnSpMkLst>
-        </pc:cxnChg>
-        <pc:cxnChg chg="add mod">
-          <ac:chgData name="Fingerhut, John Andy" userId="6ad675d3-541e-4813-9336-4804cd571dc7" providerId="ADAL" clId="{4F0530BD-8DBC-4E4A-AD8B-324142F9DCDB}" dt="2020-11-22T04:19:12.110" v="19" actId="14100"/>
-          <ac:cxnSpMkLst>
-            <pc:docMk/>
-            <pc:sldMk cId="1091789387" sldId="273"/>
-            <ac:cxnSpMk id="106" creationId="{16B1E8FE-E0AE-4FF6-AC2B-2BC0EAF5B4C8}"/>
-          </ac:cxnSpMkLst>
-        </pc:cxnChg>
-        <pc:cxnChg chg="mod">
-          <ac:chgData name="Fingerhut, John Andy" userId="6ad675d3-541e-4813-9336-4804cd571dc7" providerId="ADAL" clId="{4F0530BD-8DBC-4E4A-AD8B-324142F9DCDB}" dt="2020-11-22T04:17:51.475" v="13" actId="1076"/>
-          <ac:cxnSpMkLst>
-            <pc:docMk/>
-            <pc:sldMk cId="1091789387" sldId="273"/>
-            <ac:cxnSpMk id="112" creationId="{C64DEB71-3093-431E-88AF-4C2BE81668EF}"/>
-          </ac:cxnSpMkLst>
-        </pc:cxnChg>
-        <pc:cxnChg chg="mod">
-          <ac:chgData name="Fingerhut, John Andy" userId="6ad675d3-541e-4813-9336-4804cd571dc7" providerId="ADAL" clId="{4F0530BD-8DBC-4E4A-AD8B-324142F9DCDB}" dt="2020-11-22T04:17:51.475" v="13" actId="1076"/>
-          <ac:cxnSpMkLst>
-            <pc:docMk/>
-            <pc:sldMk cId="1091789387" sldId="273"/>
-            <ac:cxnSpMk id="115" creationId="{368C70F1-7509-412A-8F1A-A518E73EEB07}"/>
-          </ac:cxnSpMkLst>
-        </pc:cxnChg>
-        <pc:cxnChg chg="mod">
-          <ac:chgData name="Fingerhut, John Andy" userId="6ad675d3-541e-4813-9336-4804cd571dc7" providerId="ADAL" clId="{4F0530BD-8DBC-4E4A-AD8B-324142F9DCDB}" dt="2020-11-22T04:17:51.475" v="13" actId="1076"/>
-          <ac:cxnSpMkLst>
-            <pc:docMk/>
-            <pc:sldMk cId="1091789387" sldId="273"/>
-            <ac:cxnSpMk id="116" creationId="{D6EAE7FF-ED18-4376-A74D-07B093B5896D}"/>
-          </ac:cxnSpMkLst>
-        </pc:cxnChg>
-        <pc:cxnChg chg="mod">
-          <ac:chgData name="Fingerhut, John Andy" userId="6ad675d3-541e-4813-9336-4804cd571dc7" providerId="ADAL" clId="{4F0530BD-8DBC-4E4A-AD8B-324142F9DCDB}" dt="2020-11-22T04:17:51.475" v="13" actId="1076"/>
-          <ac:cxnSpMkLst>
-            <pc:docMk/>
-            <pc:sldMk cId="1091789387" sldId="273"/>
-            <ac:cxnSpMk id="117" creationId="{2B8B9C9F-8E4C-4C30-AB47-9A5A956DF566}"/>
-          </ac:cxnSpMkLst>
-        </pc:cxnChg>
-        <pc:cxnChg chg="mod">
-          <ac:chgData name="Fingerhut, John Andy" userId="6ad675d3-541e-4813-9336-4804cd571dc7" providerId="ADAL" clId="{4F0530BD-8DBC-4E4A-AD8B-324142F9DCDB}" dt="2020-11-22T04:17:51.475" v="13" actId="1076"/>
-          <ac:cxnSpMkLst>
-            <pc:docMk/>
-            <pc:sldMk cId="1091789387" sldId="273"/>
-            <ac:cxnSpMk id="118" creationId="{40462665-FCF8-4E8C-943A-0EF224BA3563}"/>
-          </ac:cxnSpMkLst>
-        </pc:cxnChg>
-        <pc:cxnChg chg="mod">
-          <ac:chgData name="Fingerhut, John Andy" userId="6ad675d3-541e-4813-9336-4804cd571dc7" providerId="ADAL" clId="{4F0530BD-8DBC-4E4A-AD8B-324142F9DCDB}" dt="2020-11-22T04:17:51.475" v="13" actId="1076"/>
-          <ac:cxnSpMkLst>
-            <pc:docMk/>
-            <pc:sldMk cId="1091789387" sldId="273"/>
-            <ac:cxnSpMk id="123" creationId="{64C4D15B-D90A-42A1-857E-79AACC8E1ED6}"/>
-          </ac:cxnSpMkLst>
-        </pc:cxnChg>
-        <pc:cxnChg chg="mod">
-          <ac:chgData name="Fingerhut, John Andy" userId="6ad675d3-541e-4813-9336-4804cd571dc7" providerId="ADAL" clId="{4F0530BD-8DBC-4E4A-AD8B-324142F9DCDB}" dt="2020-11-22T04:18:13.381" v="14" actId="14100"/>
-          <ac:cxnSpMkLst>
-            <pc:docMk/>
-            <pc:sldMk cId="1091789387" sldId="273"/>
-            <ac:cxnSpMk id="196" creationId="{C4648FD0-BE39-49B2-A297-6987E7ED42BA}"/>
-          </ac:cxnSpMkLst>
-        </pc:cxnChg>
-        <pc:cxnChg chg="mod">
-          <ac:chgData name="Fingerhut, John Andy" userId="6ad675d3-541e-4813-9336-4804cd571dc7" providerId="ADAL" clId="{4F0530BD-8DBC-4E4A-AD8B-324142F9DCDB}" dt="2020-11-22T04:39:19.462" v="82" actId="14100"/>
-          <ac:cxnSpMkLst>
-            <pc:docMk/>
-            <pc:sldMk cId="1091789387" sldId="273"/>
-            <ac:cxnSpMk id="199" creationId="{9B56D066-03B7-4AA5-AE48-439E5D95D240}"/>
-          </ac:cxnSpMkLst>
-        </pc:cxnChg>
       </pc:sldChg>
     </pc:docChg>
   </pc:docChgLst>
@@ -2740,7 +2740,7 @@
           <a:p>
             <a:fld id="{B72825D7-6CAC-4DD9-81D1-F420B7F343C3}" type="datetimeFigureOut">
               <a:rPr lang="en-US" smtClean="0"/>
-              <a:t>4/12/2021</a:t>
+              <a:t>4/24/21</a:t>
             </a:fld>
             <a:endParaRPr lang="en-US"/>
           </a:p>
@@ -2938,7 +2938,7 @@
           <a:p>
             <a:fld id="{B72825D7-6CAC-4DD9-81D1-F420B7F343C3}" type="datetimeFigureOut">
               <a:rPr lang="en-US" smtClean="0"/>
-              <a:t>4/12/2021</a:t>
+              <a:t>4/24/21</a:t>
             </a:fld>
             <a:endParaRPr lang="en-US"/>
           </a:p>
@@ -3146,7 +3146,7 @@
           <a:p>
             <a:fld id="{B72825D7-6CAC-4DD9-81D1-F420B7F343C3}" type="datetimeFigureOut">
               <a:rPr lang="en-US" smtClean="0"/>
-              <a:t>4/12/2021</a:t>
+              <a:t>4/24/21</a:t>
             </a:fld>
             <a:endParaRPr lang="en-US"/>
           </a:p>
@@ -3344,7 +3344,7 @@
           <a:p>
             <a:fld id="{B72825D7-6CAC-4DD9-81D1-F420B7F343C3}" type="datetimeFigureOut">
               <a:rPr lang="en-US" smtClean="0"/>
-              <a:t>4/12/2021</a:t>
+              <a:t>4/24/21</a:t>
             </a:fld>
             <a:endParaRPr lang="en-US"/>
           </a:p>
@@ -3619,7 +3619,7 @@
           <a:p>
             <a:fld id="{B72825D7-6CAC-4DD9-81D1-F420B7F343C3}" type="datetimeFigureOut">
               <a:rPr lang="en-US" smtClean="0"/>
-              <a:t>4/12/2021</a:t>
+              <a:t>4/24/21</a:t>
             </a:fld>
             <a:endParaRPr lang="en-US"/>
           </a:p>
@@ -3884,7 +3884,7 @@
           <a:p>
             <a:fld id="{B72825D7-6CAC-4DD9-81D1-F420B7F343C3}" type="datetimeFigureOut">
               <a:rPr lang="en-US" smtClean="0"/>
-              <a:t>4/12/2021</a:t>
+              <a:t>4/24/21</a:t>
             </a:fld>
             <a:endParaRPr lang="en-US"/>
           </a:p>
@@ -4296,7 +4296,7 @@
           <a:p>
             <a:fld id="{B72825D7-6CAC-4DD9-81D1-F420B7F343C3}" type="datetimeFigureOut">
               <a:rPr lang="en-US" smtClean="0"/>
-              <a:t>4/12/2021</a:t>
+              <a:t>4/24/21</a:t>
             </a:fld>
             <a:endParaRPr lang="en-US"/>
           </a:p>
@@ -4437,7 +4437,7 @@
           <a:p>
             <a:fld id="{B72825D7-6CAC-4DD9-81D1-F420B7F343C3}" type="datetimeFigureOut">
               <a:rPr lang="en-US" smtClean="0"/>
-              <a:t>4/12/2021</a:t>
+              <a:t>4/24/21</a:t>
             </a:fld>
             <a:endParaRPr lang="en-US"/>
           </a:p>
@@ -4550,7 +4550,7 @@
           <a:p>
             <a:fld id="{B72825D7-6CAC-4DD9-81D1-F420B7F343C3}" type="datetimeFigureOut">
               <a:rPr lang="en-US" smtClean="0"/>
-              <a:t>4/12/2021</a:t>
+              <a:t>4/24/21</a:t>
             </a:fld>
             <a:endParaRPr lang="en-US"/>
           </a:p>
@@ -4861,7 +4861,7 @@
           <a:p>
             <a:fld id="{B72825D7-6CAC-4DD9-81D1-F420B7F343C3}" type="datetimeFigureOut">
               <a:rPr lang="en-US" smtClean="0"/>
-              <a:t>4/12/2021</a:t>
+              <a:t>4/24/21</a:t>
             </a:fld>
             <a:endParaRPr lang="en-US"/>
           </a:p>
@@ -5149,7 +5149,7 @@
           <a:p>
             <a:fld id="{B72825D7-6CAC-4DD9-81D1-F420B7F343C3}" type="datetimeFigureOut">
               <a:rPr lang="en-US" smtClean="0"/>
-              <a:t>4/12/2021</a:t>
+              <a:t>4/24/21</a:t>
             </a:fld>
             <a:endParaRPr lang="en-US"/>
           </a:p>
@@ -5390,7 +5390,7 @@
           <a:p>
             <a:fld id="{B72825D7-6CAC-4DD9-81D1-F420B7F343C3}" type="datetimeFigureOut">
               <a:rPr lang="en-US" smtClean="0"/>
-              <a:t>4/12/2021</a:t>
+              <a:t>4/24/21</a:t>
             </a:fld>
             <a:endParaRPr lang="en-US"/>
           </a:p>
@@ -5827,9 +5827,14 @@
           <a:prstGeom prst="rect">
             <a:avLst/>
           </a:prstGeom>
-          <a:solidFill>
-            <a:srgbClr val="00B050"/>
-          </a:solidFill>
+          <a:pattFill prst="wdDnDiag">
+            <a:fgClr>
+              <a:srgbClr val="00B050"/>
+            </a:fgClr>
+            <a:bgClr>
+              <a:srgbClr val="92D050"/>
+            </a:bgClr>
+          </a:pattFill>
         </p:spPr>
         <p:style>
           <a:lnRef idx="2">
@@ -8655,7 +8660,7 @@
         </p:nvSpPr>
         <p:spPr>
           <a:xfrm>
-            <a:off x="8692145" y="2113631"/>
+            <a:off x="8692145" y="1905798"/>
             <a:ext cx="2089254" cy="224589"/>
           </a:xfrm>
           <a:prstGeom prst="rect">
@@ -9674,6 +9679,63 @@
           </a:fontRef>
         </p:style>
       </p:cxnSp>
+      <p:sp>
+        <p:nvSpPr>
+          <p:cNvPr id="99" name="Rectangle 98">
+            <a:extLst>
+              <a:ext uri="{FF2B5EF4-FFF2-40B4-BE49-F238E27FC236}">
+                <a16:creationId xmlns:a16="http://schemas.microsoft.com/office/drawing/2014/main" id="{D3612241-259E-A342-A533-0148EB81CF40}"/>
+              </a:ext>
+            </a:extLst>
+          </p:cNvPr>
+          <p:cNvSpPr/>
+          <p:nvPr/>
+        </p:nvSpPr>
+        <p:spPr>
+          <a:xfrm>
+            <a:off x="8692145" y="2126236"/>
+            <a:ext cx="2089254" cy="224589"/>
+          </a:xfrm>
+          <a:prstGeom prst="rect">
+            <a:avLst/>
+          </a:prstGeom>
+          <a:pattFill prst="wdDnDiag">
+            <a:fgClr>
+              <a:srgbClr val="00B050"/>
+            </a:fgClr>
+            <a:bgClr>
+              <a:srgbClr val="92D050"/>
+            </a:bgClr>
+          </a:pattFill>
+        </p:spPr>
+        <p:style>
+          <a:lnRef idx="2">
+            <a:schemeClr val="accent1">
+              <a:shade val="50000"/>
+            </a:schemeClr>
+          </a:lnRef>
+          <a:fillRef idx="1">
+            <a:schemeClr val="accent1"/>
+          </a:fillRef>
+          <a:effectRef idx="0">
+            <a:schemeClr val="accent1"/>
+          </a:effectRef>
+          <a:fontRef idx="minor">
+            <a:schemeClr val="lt1"/>
+          </a:fontRef>
+        </p:style>
+        <p:txBody>
+          <a:bodyPr rtlCol="0" anchor="ctr"/>
+          <a:lstStyle/>
+          <a:p>
+            <a:pPr algn="ctr"/>
+            <a:r>
+              <a:rPr lang="en-US" dirty="0"/>
+              <a:t>Planned Extension</a:t>
+            </a:r>
+          </a:p>
+        </p:txBody>
+      </p:sp>
     </p:spTree>
     <p:extLst>
       <p:ext uri="{BB962C8B-B14F-4D97-AF65-F5344CB8AC3E}">
@@ -12540,58 +12602,6 @@
       </p:sp>
       <p:sp>
         <p:nvSpPr>
-          <p:cNvPr id="113" name="Rectangle 112">
-            <a:extLst>
-              <a:ext uri="{FF2B5EF4-FFF2-40B4-BE49-F238E27FC236}">
-                <a16:creationId xmlns:a16="http://schemas.microsoft.com/office/drawing/2014/main" id="{58FA7448-7B0F-43F4-A246-03BDB307CBC0}"/>
-              </a:ext>
-            </a:extLst>
-          </p:cNvPr>
-          <p:cNvSpPr/>
-          <p:nvPr/>
-        </p:nvSpPr>
-        <p:spPr>
-          <a:xfrm>
-            <a:off x="8692145" y="2113631"/>
-            <a:ext cx="2089254" cy="224589"/>
-          </a:xfrm>
-          <a:prstGeom prst="rect">
-            <a:avLst/>
-          </a:prstGeom>
-          <a:solidFill>
-            <a:srgbClr val="00B050"/>
-          </a:solidFill>
-        </p:spPr>
-        <p:style>
-          <a:lnRef idx="2">
-            <a:schemeClr val="accent1">
-              <a:shade val="50000"/>
-            </a:schemeClr>
-          </a:lnRef>
-          <a:fillRef idx="1">
-            <a:schemeClr val="accent1"/>
-          </a:fillRef>
-          <a:effectRef idx="0">
-            <a:schemeClr val="accent1"/>
-          </a:effectRef>
-          <a:fontRef idx="minor">
-            <a:schemeClr val="lt1"/>
-          </a:fontRef>
-        </p:style>
-        <p:txBody>
-          <a:bodyPr rtlCol="0" anchor="ctr"/>
-          <a:lstStyle/>
-          <a:p>
-            <a:pPr algn="ctr"/>
-            <a:r>
-              <a:rPr lang="en-US" dirty="0"/>
-              <a:t>Programmed in P4</a:t>
-            </a:r>
-          </a:p>
-        </p:txBody>
-      </p:sp>
-      <p:sp>
-        <p:nvSpPr>
           <p:cNvPr id="114" name="Rectangle 113">
             <a:extLst>
               <a:ext uri="{FF2B5EF4-FFF2-40B4-BE49-F238E27FC236}">
@@ -14535,6 +14545,115 @@
           </a:p>
         </p:txBody>
       </p:sp>
+      <p:sp>
+        <p:nvSpPr>
+          <p:cNvPr id="104" name="Rectangle 103">
+            <a:extLst>
+              <a:ext uri="{FF2B5EF4-FFF2-40B4-BE49-F238E27FC236}">
+                <a16:creationId xmlns:a16="http://schemas.microsoft.com/office/drawing/2014/main" id="{08F0BEBA-C408-594E-BDBB-9BB825502633}"/>
+              </a:ext>
+            </a:extLst>
+          </p:cNvPr>
+          <p:cNvSpPr/>
+          <p:nvPr/>
+        </p:nvSpPr>
+        <p:spPr>
+          <a:xfrm>
+            <a:off x="8692145" y="1905798"/>
+            <a:ext cx="2089254" cy="224589"/>
+          </a:xfrm>
+          <a:prstGeom prst="rect">
+            <a:avLst/>
+          </a:prstGeom>
+          <a:solidFill>
+            <a:srgbClr val="00B050"/>
+          </a:solidFill>
+        </p:spPr>
+        <p:style>
+          <a:lnRef idx="2">
+            <a:schemeClr val="accent1">
+              <a:shade val="50000"/>
+            </a:schemeClr>
+          </a:lnRef>
+          <a:fillRef idx="1">
+            <a:schemeClr val="accent1"/>
+          </a:fillRef>
+          <a:effectRef idx="0">
+            <a:schemeClr val="accent1"/>
+          </a:effectRef>
+          <a:fontRef idx="minor">
+            <a:schemeClr val="lt1"/>
+          </a:fontRef>
+        </p:style>
+        <p:txBody>
+          <a:bodyPr rtlCol="0" anchor="ctr"/>
+          <a:lstStyle/>
+          <a:p>
+            <a:pPr algn="ctr"/>
+            <a:r>
+              <a:rPr lang="en-US" dirty="0"/>
+              <a:t>Programmed in P4</a:t>
+            </a:r>
+          </a:p>
+        </p:txBody>
+      </p:sp>
+      <p:sp>
+        <p:nvSpPr>
+          <p:cNvPr id="108" name="Rectangle 107">
+            <a:extLst>
+              <a:ext uri="{FF2B5EF4-FFF2-40B4-BE49-F238E27FC236}">
+                <a16:creationId xmlns:a16="http://schemas.microsoft.com/office/drawing/2014/main" id="{96DADA13-2E11-3748-88E3-1DA6AB1B39C1}"/>
+              </a:ext>
+            </a:extLst>
+          </p:cNvPr>
+          <p:cNvSpPr/>
+          <p:nvPr/>
+        </p:nvSpPr>
+        <p:spPr>
+          <a:xfrm>
+            <a:off x="8692145" y="2126236"/>
+            <a:ext cx="2089254" cy="224589"/>
+          </a:xfrm>
+          <a:prstGeom prst="rect">
+            <a:avLst/>
+          </a:prstGeom>
+          <a:pattFill prst="wdDnDiag">
+            <a:fgClr>
+              <a:srgbClr val="00B050"/>
+            </a:fgClr>
+            <a:bgClr>
+              <a:srgbClr val="92D050"/>
+            </a:bgClr>
+          </a:pattFill>
+        </p:spPr>
+        <p:style>
+          <a:lnRef idx="2">
+            <a:schemeClr val="accent1">
+              <a:shade val="50000"/>
+            </a:schemeClr>
+          </a:lnRef>
+          <a:fillRef idx="1">
+            <a:schemeClr val="accent1"/>
+          </a:fillRef>
+          <a:effectRef idx="0">
+            <a:schemeClr val="accent1"/>
+          </a:effectRef>
+          <a:fontRef idx="minor">
+            <a:schemeClr val="lt1"/>
+          </a:fontRef>
+        </p:style>
+        <p:txBody>
+          <a:bodyPr rtlCol="0" anchor="ctr"/>
+          <a:lstStyle/>
+          <a:p>
+            <a:pPr algn="ctr"/>
+            <a:r>
+              <a:rPr lang="en-US" dirty="0"/>
+              <a:t>Planned Extension</a:t>
+            </a:r>
+          </a:p>
+        </p:txBody>
+      </p:sp>
     </p:spTree>
     <p:extLst>
       <p:ext uri="{BB962C8B-B14F-4D97-AF65-F5344CB8AC3E}">
@@ -14585,9 +14704,14 @@
           <a:prstGeom prst="rect">
             <a:avLst/>
           </a:prstGeom>
-          <a:solidFill>
-            <a:srgbClr val="00B050"/>
-          </a:solidFill>
+          <a:pattFill prst="wdDnDiag">
+            <a:fgClr>
+              <a:srgbClr val="00B050"/>
+            </a:fgClr>
+            <a:bgClr>
+              <a:srgbClr val="92D050"/>
+            </a:bgClr>
+          </a:pattFill>
         </p:spPr>
         <p:style>
           <a:lnRef idx="2">
@@ -17866,58 +17990,6 @@
       </p:sp>
       <p:sp>
         <p:nvSpPr>
-          <p:cNvPr id="113" name="Rectangle 112">
-            <a:extLst>
-              <a:ext uri="{FF2B5EF4-FFF2-40B4-BE49-F238E27FC236}">
-                <a16:creationId xmlns:a16="http://schemas.microsoft.com/office/drawing/2014/main" id="{58FA7448-7B0F-43F4-A246-03BDB307CBC0}"/>
-              </a:ext>
-            </a:extLst>
-          </p:cNvPr>
-          <p:cNvSpPr/>
-          <p:nvPr/>
-        </p:nvSpPr>
-        <p:spPr>
-          <a:xfrm>
-            <a:off x="8692145" y="2113631"/>
-            <a:ext cx="2089254" cy="224589"/>
-          </a:xfrm>
-          <a:prstGeom prst="rect">
-            <a:avLst/>
-          </a:prstGeom>
-          <a:solidFill>
-            <a:srgbClr val="00B050"/>
-          </a:solidFill>
-        </p:spPr>
-        <p:style>
-          <a:lnRef idx="2">
-            <a:schemeClr val="accent1">
-              <a:shade val="50000"/>
-            </a:schemeClr>
-          </a:lnRef>
-          <a:fillRef idx="1">
-            <a:schemeClr val="accent1"/>
-          </a:fillRef>
-          <a:effectRef idx="0">
-            <a:schemeClr val="accent1"/>
-          </a:effectRef>
-          <a:fontRef idx="minor">
-            <a:schemeClr val="lt1"/>
-          </a:fontRef>
-        </p:style>
-        <p:txBody>
-          <a:bodyPr rtlCol="0" anchor="ctr"/>
-          <a:lstStyle/>
-          <a:p>
-            <a:pPr algn="ctr"/>
-            <a:r>
-              <a:rPr lang="en-US" dirty="0"/>
-              <a:t>Programmed in P4</a:t>
-            </a:r>
-          </a:p>
-        </p:txBody>
-      </p:sp>
-      <p:sp>
-        <p:nvSpPr>
           <p:cNvPr id="114" name="Rectangle 113">
             <a:extLst>
               <a:ext uri="{FF2B5EF4-FFF2-40B4-BE49-F238E27FC236}">
@@ -18935,6 +19007,115 @@
           </a:p>
         </p:txBody>
       </p:sp>
+      <p:sp>
+        <p:nvSpPr>
+          <p:cNvPr id="104" name="Rectangle 103">
+            <a:extLst>
+              <a:ext uri="{FF2B5EF4-FFF2-40B4-BE49-F238E27FC236}">
+                <a16:creationId xmlns:a16="http://schemas.microsoft.com/office/drawing/2014/main" id="{3BAF85B2-D22D-9245-AE44-E86DF13656F0}"/>
+              </a:ext>
+            </a:extLst>
+          </p:cNvPr>
+          <p:cNvSpPr/>
+          <p:nvPr/>
+        </p:nvSpPr>
+        <p:spPr>
+          <a:xfrm>
+            <a:off x="8692145" y="1905798"/>
+            <a:ext cx="2089254" cy="224589"/>
+          </a:xfrm>
+          <a:prstGeom prst="rect">
+            <a:avLst/>
+          </a:prstGeom>
+          <a:solidFill>
+            <a:srgbClr val="00B050"/>
+          </a:solidFill>
+        </p:spPr>
+        <p:style>
+          <a:lnRef idx="2">
+            <a:schemeClr val="accent1">
+              <a:shade val="50000"/>
+            </a:schemeClr>
+          </a:lnRef>
+          <a:fillRef idx="1">
+            <a:schemeClr val="accent1"/>
+          </a:fillRef>
+          <a:effectRef idx="0">
+            <a:schemeClr val="accent1"/>
+          </a:effectRef>
+          <a:fontRef idx="minor">
+            <a:schemeClr val="lt1"/>
+          </a:fontRef>
+        </p:style>
+        <p:txBody>
+          <a:bodyPr rtlCol="0" anchor="ctr"/>
+          <a:lstStyle/>
+          <a:p>
+            <a:pPr algn="ctr"/>
+            <a:r>
+              <a:rPr lang="en-US" dirty="0"/>
+              <a:t>Programmed in P4</a:t>
+            </a:r>
+          </a:p>
+        </p:txBody>
+      </p:sp>
+      <p:sp>
+        <p:nvSpPr>
+          <p:cNvPr id="108" name="Rectangle 107">
+            <a:extLst>
+              <a:ext uri="{FF2B5EF4-FFF2-40B4-BE49-F238E27FC236}">
+                <a16:creationId xmlns:a16="http://schemas.microsoft.com/office/drawing/2014/main" id="{50AB1ED2-1D03-AF43-AB28-3164205478F1}"/>
+              </a:ext>
+            </a:extLst>
+          </p:cNvPr>
+          <p:cNvSpPr/>
+          <p:nvPr/>
+        </p:nvSpPr>
+        <p:spPr>
+          <a:xfrm>
+            <a:off x="8692145" y="2126236"/>
+            <a:ext cx="2089254" cy="224589"/>
+          </a:xfrm>
+          <a:prstGeom prst="rect">
+            <a:avLst/>
+          </a:prstGeom>
+          <a:pattFill prst="wdDnDiag">
+            <a:fgClr>
+              <a:srgbClr val="00B050"/>
+            </a:fgClr>
+            <a:bgClr>
+              <a:srgbClr val="92D050"/>
+            </a:bgClr>
+          </a:pattFill>
+        </p:spPr>
+        <p:style>
+          <a:lnRef idx="2">
+            <a:schemeClr val="accent1">
+              <a:shade val="50000"/>
+            </a:schemeClr>
+          </a:lnRef>
+          <a:fillRef idx="1">
+            <a:schemeClr val="accent1"/>
+          </a:fillRef>
+          <a:effectRef idx="0">
+            <a:schemeClr val="accent1"/>
+          </a:effectRef>
+          <a:fontRef idx="minor">
+            <a:schemeClr val="lt1"/>
+          </a:fontRef>
+        </p:style>
+        <p:txBody>
+          <a:bodyPr rtlCol="0" anchor="ctr"/>
+          <a:lstStyle/>
+          <a:p>
+            <a:pPr algn="ctr"/>
+            <a:r>
+              <a:rPr lang="en-US" dirty="0"/>
+              <a:t>Planned Extension</a:t>
+            </a:r>
+          </a:p>
+        </p:txBody>
+      </p:sp>
     </p:spTree>
     <p:extLst>
       <p:ext uri="{BB962C8B-B14F-4D97-AF65-F5344CB8AC3E}">
@@ -18979,10 +19160,10 @@
         </p:nvGrpSpPr>
         <p:grpSpPr>
           <a:xfrm>
-            <a:off x="2324466" y="1412987"/>
-            <a:ext cx="7543068" cy="2424370"/>
-            <a:chOff x="2324466" y="1412987"/>
-            <a:chExt cx="7543068" cy="2424370"/>
+            <a:off x="2324466" y="1592920"/>
+            <a:ext cx="7543068" cy="2244437"/>
+            <a:chOff x="2324466" y="1592920"/>
+            <a:chExt cx="7543068" cy="2244437"/>
           </a:xfrm>
         </p:grpSpPr>
         <p:sp>
@@ -19005,9 +19186,14 @@
             <a:prstGeom prst="rect">
               <a:avLst/>
             </a:prstGeom>
-            <a:solidFill>
-              <a:srgbClr val="00B050"/>
-            </a:solidFill>
+            <a:pattFill prst="wdDnDiag">
+              <a:fgClr>
+                <a:srgbClr val="00B050"/>
+              </a:fgClr>
+              <a:bgClr>
+                <a:srgbClr val="92D050"/>
+              </a:bgClr>
+            </a:pattFill>
           </p:spPr>
           <p:style>
             <a:lnRef idx="2">
@@ -22287,58 +22473,6 @@
         </p:sp>
         <p:sp>
           <p:nvSpPr>
-            <p:cNvPr id="157" name="Rectangle 156">
-              <a:extLst>
-                <a:ext uri="{FF2B5EF4-FFF2-40B4-BE49-F238E27FC236}">
-                  <a16:creationId xmlns:a16="http://schemas.microsoft.com/office/drawing/2014/main" id="{4CB11AD3-6580-4A44-8817-E365BFBBBAB7}"/>
-                </a:ext>
-              </a:extLst>
-            </p:cNvPr>
-            <p:cNvSpPr/>
-            <p:nvPr/>
-          </p:nvSpPr>
-          <p:spPr>
-            <a:xfrm>
-              <a:off x="8264930" y="1412987"/>
-              <a:ext cx="1602604" cy="172276"/>
-            </a:xfrm>
-            <a:prstGeom prst="rect">
-              <a:avLst/>
-            </a:prstGeom>
-            <a:solidFill>
-              <a:srgbClr val="00B050"/>
-            </a:solidFill>
-          </p:spPr>
-          <p:style>
-            <a:lnRef idx="2">
-              <a:schemeClr val="accent1">
-                <a:shade val="50000"/>
-              </a:schemeClr>
-            </a:lnRef>
-            <a:fillRef idx="1">
-              <a:schemeClr val="accent1"/>
-            </a:fillRef>
-            <a:effectRef idx="0">
-              <a:schemeClr val="accent1"/>
-            </a:effectRef>
-            <a:fontRef idx="minor">
-              <a:schemeClr val="lt1"/>
-            </a:fontRef>
-          </p:style>
-          <p:txBody>
-            <a:bodyPr rtlCol="0" anchor="ctr"/>
-            <a:lstStyle/>
-            <a:p>
-              <a:pPr algn="ctr"/>
-              <a:r>
-                <a:rPr lang="en-US" sz="1400" dirty="0"/>
-                <a:t>Programmed in P4</a:t>
-              </a:r>
-            </a:p>
-          </p:txBody>
-        </p:sp>
-        <p:sp>
-          <p:nvSpPr>
             <p:cNvPr id="158" name="Rectangle 157">
               <a:extLst>
                 <a:ext uri="{FF2B5EF4-FFF2-40B4-BE49-F238E27FC236}">
@@ -23362,6 +23496,115 @@
           </a:p>
         </p:txBody>
       </p:sp>
+      <p:sp>
+        <p:nvSpPr>
+          <p:cNvPr id="110" name="Rectangle 109">
+            <a:extLst>
+              <a:ext uri="{FF2B5EF4-FFF2-40B4-BE49-F238E27FC236}">
+                <a16:creationId xmlns:a16="http://schemas.microsoft.com/office/drawing/2014/main" id="{E2A5E8E0-93AC-D049-AF7A-D636F895FB25}"/>
+              </a:ext>
+            </a:extLst>
+          </p:cNvPr>
+          <p:cNvSpPr/>
+          <p:nvPr/>
+        </p:nvSpPr>
+        <p:spPr>
+          <a:xfrm>
+            <a:off x="8264930" y="1230086"/>
+            <a:ext cx="1602604" cy="172275"/>
+          </a:xfrm>
+          <a:prstGeom prst="rect">
+            <a:avLst/>
+          </a:prstGeom>
+          <a:solidFill>
+            <a:srgbClr val="00B050"/>
+          </a:solidFill>
+        </p:spPr>
+        <p:style>
+          <a:lnRef idx="2">
+            <a:schemeClr val="accent1">
+              <a:shade val="50000"/>
+            </a:schemeClr>
+          </a:lnRef>
+          <a:fillRef idx="1">
+            <a:schemeClr val="accent1"/>
+          </a:fillRef>
+          <a:effectRef idx="0">
+            <a:schemeClr val="accent1"/>
+          </a:effectRef>
+          <a:fontRef idx="minor">
+            <a:schemeClr val="lt1"/>
+          </a:fontRef>
+        </p:style>
+        <p:txBody>
+          <a:bodyPr rtlCol="0" anchor="ctr"/>
+          <a:lstStyle/>
+          <a:p>
+            <a:pPr algn="ctr"/>
+            <a:r>
+              <a:rPr lang="en-US" sz="1400" dirty="0"/>
+              <a:t>Programmed in P4</a:t>
+            </a:r>
+          </a:p>
+        </p:txBody>
+      </p:sp>
+      <p:sp>
+        <p:nvSpPr>
+          <p:cNvPr id="111" name="Rectangle 110">
+            <a:extLst>
+              <a:ext uri="{FF2B5EF4-FFF2-40B4-BE49-F238E27FC236}">
+                <a16:creationId xmlns:a16="http://schemas.microsoft.com/office/drawing/2014/main" id="{ADB2EAFD-6876-FC41-92A2-9537D0E9B78E}"/>
+              </a:ext>
+            </a:extLst>
+          </p:cNvPr>
+          <p:cNvSpPr/>
+          <p:nvPr/>
+        </p:nvSpPr>
+        <p:spPr>
+          <a:xfrm>
+            <a:off x="8264930" y="1409428"/>
+            <a:ext cx="1602604" cy="172275"/>
+          </a:xfrm>
+          <a:prstGeom prst="rect">
+            <a:avLst/>
+          </a:prstGeom>
+          <a:pattFill prst="wdDnDiag">
+            <a:fgClr>
+              <a:srgbClr val="00B050"/>
+            </a:fgClr>
+            <a:bgClr>
+              <a:srgbClr val="92D050"/>
+            </a:bgClr>
+          </a:pattFill>
+        </p:spPr>
+        <p:style>
+          <a:lnRef idx="2">
+            <a:schemeClr val="accent1">
+              <a:shade val="50000"/>
+            </a:schemeClr>
+          </a:lnRef>
+          <a:fillRef idx="1">
+            <a:schemeClr val="accent1"/>
+          </a:fillRef>
+          <a:effectRef idx="0">
+            <a:schemeClr val="accent1"/>
+          </a:effectRef>
+          <a:fontRef idx="minor">
+            <a:schemeClr val="lt1"/>
+          </a:fontRef>
+        </p:style>
+        <p:txBody>
+          <a:bodyPr rtlCol="0" anchor="ctr"/>
+          <a:lstStyle/>
+          <a:p>
+            <a:pPr algn="ctr"/>
+            <a:r>
+              <a:rPr lang="en-US" sz="1400" dirty="0"/>
+              <a:t>Planned Extension</a:t>
+            </a:r>
+          </a:p>
+        </p:txBody>
+      </p:sp>
     </p:spTree>
     <p:extLst>
       <p:ext uri="{BB962C8B-B14F-4D97-AF65-F5344CB8AC3E}">
@@ -23412,9 +23655,14 @@
           <a:prstGeom prst="rect">
             <a:avLst/>
           </a:prstGeom>
-          <a:solidFill>
-            <a:srgbClr val="00B050"/>
-          </a:solidFill>
+          <a:pattFill prst="wdDnDiag">
+            <a:fgClr>
+              <a:srgbClr val="00B050"/>
+            </a:fgClr>
+            <a:bgClr>
+              <a:srgbClr val="92D050"/>
+            </a:bgClr>
+          </a:pattFill>
         </p:spPr>
         <p:style>
           <a:lnRef idx="2">
@@ -26228,58 +26476,6 @@
       </p:sp>
       <p:sp>
         <p:nvSpPr>
-          <p:cNvPr id="113" name="Rectangle 112">
-            <a:extLst>
-              <a:ext uri="{FF2B5EF4-FFF2-40B4-BE49-F238E27FC236}">
-                <a16:creationId xmlns:a16="http://schemas.microsoft.com/office/drawing/2014/main" id="{58FA7448-7B0F-43F4-A246-03BDB307CBC0}"/>
-              </a:ext>
-            </a:extLst>
-          </p:cNvPr>
-          <p:cNvSpPr/>
-          <p:nvPr/>
-        </p:nvSpPr>
-        <p:spPr>
-          <a:xfrm>
-            <a:off x="8692145" y="2113631"/>
-            <a:ext cx="2089254" cy="224589"/>
-          </a:xfrm>
-          <a:prstGeom prst="rect">
-            <a:avLst/>
-          </a:prstGeom>
-          <a:solidFill>
-            <a:srgbClr val="00B050"/>
-          </a:solidFill>
-        </p:spPr>
-        <p:style>
-          <a:lnRef idx="2">
-            <a:schemeClr val="accent1">
-              <a:shade val="50000"/>
-            </a:schemeClr>
-          </a:lnRef>
-          <a:fillRef idx="1">
-            <a:schemeClr val="accent1"/>
-          </a:fillRef>
-          <a:effectRef idx="0">
-            <a:schemeClr val="accent1"/>
-          </a:effectRef>
-          <a:fontRef idx="minor">
-            <a:schemeClr val="lt1"/>
-          </a:fontRef>
-        </p:style>
-        <p:txBody>
-          <a:bodyPr rtlCol="0" anchor="ctr"/>
-          <a:lstStyle/>
-          <a:p>
-            <a:pPr algn="ctr"/>
-            <a:r>
-              <a:rPr lang="en-US" dirty="0"/>
-              <a:t>Programmed in P4</a:t>
-            </a:r>
-          </a:p>
-        </p:txBody>
-      </p:sp>
-      <p:sp>
-        <p:nvSpPr>
           <p:cNvPr id="114" name="Rectangle 113">
             <a:extLst>
               <a:ext uri="{FF2B5EF4-FFF2-40B4-BE49-F238E27FC236}">
@@ -27294,6 +27490,115 @@
             <a:r>
               <a:rPr lang="en-US" sz="1400" dirty="0"/>
               <a:t>: This was proposed and discussed at 2020-Dec-07 PNA meeting. It seems possible that organizing P4 code in 4 blocks as shown here would be straightforward for a P4 compiler to take and target a hardware architecture that looks more like v3.  (Clearly code organized like this should be easy to target to a hardware architecture that looks like v4).</a:t>
+            </a:r>
+          </a:p>
+        </p:txBody>
+      </p:sp>
+      <p:sp>
+        <p:nvSpPr>
+          <p:cNvPr id="103" name="Rectangle 102">
+            <a:extLst>
+              <a:ext uri="{FF2B5EF4-FFF2-40B4-BE49-F238E27FC236}">
+                <a16:creationId xmlns:a16="http://schemas.microsoft.com/office/drawing/2014/main" id="{90AA3EF1-9A53-2043-8F06-A468C3004721}"/>
+              </a:ext>
+            </a:extLst>
+          </p:cNvPr>
+          <p:cNvSpPr/>
+          <p:nvPr/>
+        </p:nvSpPr>
+        <p:spPr>
+          <a:xfrm>
+            <a:off x="8692145" y="1905798"/>
+            <a:ext cx="2089254" cy="224589"/>
+          </a:xfrm>
+          <a:prstGeom prst="rect">
+            <a:avLst/>
+          </a:prstGeom>
+          <a:solidFill>
+            <a:srgbClr val="00B050"/>
+          </a:solidFill>
+        </p:spPr>
+        <p:style>
+          <a:lnRef idx="2">
+            <a:schemeClr val="accent1">
+              <a:shade val="50000"/>
+            </a:schemeClr>
+          </a:lnRef>
+          <a:fillRef idx="1">
+            <a:schemeClr val="accent1"/>
+          </a:fillRef>
+          <a:effectRef idx="0">
+            <a:schemeClr val="accent1"/>
+          </a:effectRef>
+          <a:fontRef idx="minor">
+            <a:schemeClr val="lt1"/>
+          </a:fontRef>
+        </p:style>
+        <p:txBody>
+          <a:bodyPr rtlCol="0" anchor="ctr"/>
+          <a:lstStyle/>
+          <a:p>
+            <a:pPr algn="ctr"/>
+            <a:r>
+              <a:rPr lang="en-US" dirty="0"/>
+              <a:t>Programmed in P4</a:t>
+            </a:r>
+          </a:p>
+        </p:txBody>
+      </p:sp>
+      <p:sp>
+        <p:nvSpPr>
+          <p:cNvPr id="104" name="Rectangle 103">
+            <a:extLst>
+              <a:ext uri="{FF2B5EF4-FFF2-40B4-BE49-F238E27FC236}">
+                <a16:creationId xmlns:a16="http://schemas.microsoft.com/office/drawing/2014/main" id="{5B83BFDE-E372-B749-AB61-A4A2BA416ACA}"/>
+              </a:ext>
+            </a:extLst>
+          </p:cNvPr>
+          <p:cNvSpPr/>
+          <p:nvPr/>
+        </p:nvSpPr>
+        <p:spPr>
+          <a:xfrm>
+            <a:off x="8692145" y="2126236"/>
+            <a:ext cx="2089254" cy="224589"/>
+          </a:xfrm>
+          <a:prstGeom prst="rect">
+            <a:avLst/>
+          </a:prstGeom>
+          <a:pattFill prst="wdDnDiag">
+            <a:fgClr>
+              <a:srgbClr val="00B050"/>
+            </a:fgClr>
+            <a:bgClr>
+              <a:srgbClr val="92D050"/>
+            </a:bgClr>
+          </a:pattFill>
+        </p:spPr>
+        <p:style>
+          <a:lnRef idx="2">
+            <a:schemeClr val="accent1">
+              <a:shade val="50000"/>
+            </a:schemeClr>
+          </a:lnRef>
+          <a:fillRef idx="1">
+            <a:schemeClr val="accent1"/>
+          </a:fillRef>
+          <a:effectRef idx="0">
+            <a:schemeClr val="accent1"/>
+          </a:effectRef>
+          <a:fontRef idx="minor">
+            <a:schemeClr val="lt1"/>
+          </a:fontRef>
+        </p:style>
+        <p:txBody>
+          <a:bodyPr rtlCol="0" anchor="ctr"/>
+          <a:lstStyle/>
+          <a:p>
+            <a:pPr algn="ctr"/>
+            <a:r>
+              <a:rPr lang="en-US" dirty="0"/>
+              <a:t>Planned Extension</a:t>
             </a:r>
           </a:p>
         </p:txBody>
@@ -27607,21 +27912,12 @@
 </file>
 
 <file path=customXml/item1.xml><?xml version="1.0" encoding="utf-8"?>
-<?mso-contentType ?>
-<FormTemplates xmlns="http://schemas.microsoft.com/sharepoint/v3/contenttype/forms">
-  <Display>DocumentLibraryForm</Display>
-  <Edit>DocumentLibraryForm</Edit>
-  <New>DocumentLibraryForm</New>
-</FormTemplates>
-</file>
-
-<file path=customXml/item2.xml><?xml version="1.0" encoding="utf-8"?>
 <p:properties xmlns:p="http://schemas.microsoft.com/office/2006/metadata/properties" xmlns:xsi="http://www.w3.org/2001/XMLSchema-instance" xmlns:pc="http://schemas.microsoft.com/office/infopath/2007/PartnerControls">
   <documentManagement/>
 </p:properties>
 </file>
 
-<file path=customXml/item3.xml><?xml version="1.0" encoding="utf-8"?>
+<file path=customXml/item2.xml><?xml version="1.0" encoding="utf-8"?>
 <ct:contentTypeSchema xmlns:ct="http://schemas.microsoft.com/office/2006/metadata/contentType" xmlns:ma="http://schemas.microsoft.com/office/2006/metadata/properties/metaAttributes" ct:_="" ma:_="" ma:contentTypeName="Document" ma:contentTypeID="0x01010074D2001F796B5842ACB4675D256F8FDC" ma:contentTypeVersion="12" ma:contentTypeDescription="Create a new document." ma:contentTypeScope="" ma:versionID="c85e048fa781f40110e66b592c02dbca">
   <xsd:schema xmlns:xsd="http://www.w3.org/2001/XMLSchema" xmlns:xs="http://www.w3.org/2001/XMLSchema" xmlns:p="http://schemas.microsoft.com/office/2006/metadata/properties" xmlns:ns3="88a3e169-3f2e-4cb2-84e3-0f816f3920de" xmlns:ns4="6d44ab1e-4f7a-423e-9215-d8d8e61f56e6" targetNamespace="http://schemas.microsoft.com/office/2006/metadata/properties" ma:root="true" ma:fieldsID="6538c91a1e992d8cfb9fb30155d82126" ns3:_="" ns4:_="">
     <xsd:import namespace="88a3e169-3f2e-4cb2-84e3-0f816f3920de"/>
@@ -27838,15 +28134,16 @@
 </ct:contentTypeSchema>
 </file>
 
-<file path=customXml/itemProps1.xml><?xml version="1.0" encoding="utf-8"?>
-<ds:datastoreItem xmlns:ds="http://schemas.openxmlformats.org/officeDocument/2006/customXml" ds:itemID="{7F29137C-F1C0-4930-80A0-A7C0C38F3D82}">
-  <ds:schemaRefs>
-    <ds:schemaRef ds:uri="http://schemas.microsoft.com/sharepoint/v3/contenttype/forms"/>
-  </ds:schemaRefs>
-</ds:datastoreItem>
+<file path=customXml/item3.xml><?xml version="1.0" encoding="utf-8"?>
+<?mso-contentType ?>
+<FormTemplates xmlns="http://schemas.microsoft.com/sharepoint/v3/contenttype/forms">
+  <Display>DocumentLibraryForm</Display>
+  <Edit>DocumentLibraryForm</Edit>
+  <New>DocumentLibraryForm</New>
+</FormTemplates>
 </file>
 
-<file path=customXml/itemProps2.xml><?xml version="1.0" encoding="utf-8"?>
+<file path=customXml/itemProps1.xml><?xml version="1.0" encoding="utf-8"?>
 <ds:datastoreItem xmlns:ds="http://schemas.openxmlformats.org/officeDocument/2006/customXml" ds:itemID="{05F4B324-A6F8-4FC0-BBBB-05E2337781BA}">
   <ds:schemaRefs>
     <ds:schemaRef ds:uri="http://purl.org/dc/dcmitype/"/>
@@ -27863,7 +28160,7 @@
 </ds:datastoreItem>
 </file>
 
-<file path=customXml/itemProps3.xml><?xml version="1.0" encoding="utf-8"?>
+<file path=customXml/itemProps2.xml><?xml version="1.0" encoding="utf-8"?>
 <ds:datastoreItem xmlns:ds="http://schemas.openxmlformats.org/officeDocument/2006/customXml" ds:itemID="{BE4DBC62-83C7-4C26-A85C-6023E4D35A02}">
   <ds:schemaRefs>
     <ds:schemaRef ds:uri="http://schemas.microsoft.com/office/2006/metadata/contentType"/>
@@ -27880,4 +28177,12 @@
     <ds:schemaRef ds:uri="http://schemas.microsoft.com/internal/obd"/>
   </ds:schemaRefs>
 </ds:datastoreItem>
+</file>
+
+<file path=customXml/itemProps3.xml><?xml version="1.0" encoding="utf-8"?>
+<ds:datastoreItem xmlns:ds="http://schemas.openxmlformats.org/officeDocument/2006/customXml" ds:itemID="{7F29137C-F1C0-4930-80A0-A7C0C38F3D82}">
+  <ds:schemaRefs>
+    <ds:schemaRef ds:uri="http://schemas.microsoft.com/sharepoint/v3/contenttype/forms"/>
+  </ds:schemaRefs>
+</ds:datastoreItem>
 </file>
</xml_diff>